<commit_message>
Deploying to gh-pages from @ shnezam/BUAD1560@1eec2c5d5f158de806f344b106fbb43e57602595 🚀
</commit_message>
<xml_diff>
--- a/slides/pdf/Chapt9.pptx
+++ b/slides/pdf/Chapt9.pptx
@@ -5,10 +5,10 @@
     <p:sldMasterId id="2147483701" r:id="rId1"/>
   </p:sldMasterIdLst>
   <p:notesMasterIdLst>
-    <p:notesMasterId r:id="rId24"/>
+    <p:notesMasterId r:id="rId23"/>
   </p:notesMasterIdLst>
   <p:handoutMasterIdLst>
-    <p:handoutMasterId r:id="rId25"/>
+    <p:handoutMasterId r:id="rId24"/>
   </p:handoutMasterIdLst>
   <p:sldIdLst>
     <p:sldId id="392" r:id="rId2"/>
@@ -27,12 +27,11 @@
     <p:sldId id="382" r:id="rId15"/>
     <p:sldId id="377" r:id="rId16"/>
     <p:sldId id="383" r:id="rId17"/>
-    <p:sldId id="384" r:id="rId18"/>
-    <p:sldId id="378" r:id="rId19"/>
-    <p:sldId id="385" r:id="rId20"/>
-    <p:sldId id="386" r:id="rId21"/>
-    <p:sldId id="379" r:id="rId22"/>
-    <p:sldId id="391" r:id="rId23"/>
+    <p:sldId id="378" r:id="rId18"/>
+    <p:sldId id="385" r:id="rId19"/>
+    <p:sldId id="386" r:id="rId20"/>
+    <p:sldId id="379" r:id="rId21"/>
+    <p:sldId id="391" r:id="rId22"/>
   </p:sldIdLst>
   <p:sldSz cx="9144000" cy="6858000" type="screen4x3"/>
   <p:notesSz cx="6858000" cy="9144000"/>
@@ -18315,7 +18314,7 @@
           <a:p>
             <a:r>
               <a:rPr lang="en-US" dirty="0"/>
-              <a:t>Example 8.1 </a:t>
+              <a:t>Example 2 </a:t>
             </a:r>
             <a:r>
               <a:rPr lang="en-US" dirty="0" err="1"/>
@@ -18325,8 +18324,8 @@
           </a:p>
         </p:txBody>
       </p:sp>
-      <mc:AlternateContent xmlns:mc="http://schemas.openxmlformats.org/markup-compatibility/2006" xmlns:a14="http://schemas.microsoft.com/office/drawing/2010/main">
-        <mc:Choice Requires="a14">
+      <mc:AlternateContent xmlns:mc="http://schemas.openxmlformats.org/markup-compatibility/2006">
+        <mc:Choice xmlns:a14="http://schemas.microsoft.com/office/drawing/2010/main" Requires="a14">
           <p:sp>
             <p:nvSpPr>
               <p:cNvPr id="3" name="Content Placeholder 2"/>
@@ -18349,7 +18348,7 @@
               <a:p>
                 <a:r>
                   <a:rPr lang="en-US" sz="2400" dirty="0"/>
-                  <a:t>Cereal and snacks:   	</a:t>
+                  <a:t>Instructor-Led:   	</a:t>
                 </a:r>
                 <a14:m>
                   <m:oMath xmlns:m="http://schemas.openxmlformats.org/officeDocument/2006/math">
@@ -18473,7 +18472,7 @@
               <a:p>
                 <a:r>
                   <a:rPr lang="en-US" sz="2400" dirty="0"/>
-                  <a:t>Energy bars:		</a:t>
+                  <a:t>Online Self-Paced :	</a:t>
                 </a:r>
                 <a14:m>
                   <m:oMath xmlns:m="http://schemas.openxmlformats.org/officeDocument/2006/math">
@@ -18603,7 +18602,7 @@
               <a:p>
                 <a:r>
                   <a:rPr lang="en-US" sz="2400" dirty="0"/>
-                  <a:t>Veggie burger:	</a:t>
+                  <a:t>Shadowing:    	</a:t>
                 </a:r>
                 <a14:m>
                   <m:oMath xmlns:m="http://schemas.openxmlformats.org/officeDocument/2006/math">
@@ -18730,15 +18729,15 @@
               <a:p>
                 <a:r>
                   <a:rPr lang="en-US" sz="2400" dirty="0"/>
-                  <a:t>Is there a sufficient evidence to conclude that the amount of </a:t>
+                  <a:t>Is </a:t>
                 </a:r>
                 <a:r>
                   <a:rPr lang="en-US" sz="2400" dirty="0" err="1"/>
-                  <a:t>isoflavones</a:t>
+                  <a:t>therea</a:t>
                 </a:r>
                 <a:r>
                   <a:rPr lang="en-US" sz="2400" dirty="0"/>
-                  <a:t> varies among these food items? </a:t>
+                  <a:t> statistically significant difference in the mean productivity scores of employees who participated in the three different training programs? </a:t>
                 </a:r>
                 <a14:m>
                   <m:oMath xmlns:m="http://schemas.openxmlformats.org/officeDocument/2006/math">
@@ -18756,9 +18755,6 @@
                     </m:r>
                   </m:oMath>
                 </a14:m>
-                <a:endParaRPr lang="en-US" sz="2400" dirty="0"/>
-              </a:p>
-              <a:p>
                 <a:endParaRPr lang="en-US" sz="2400" dirty="0"/>
               </a:p>
               <a:p>
@@ -19132,7 +19128,7 @@
                 <a:pPr lvl="1"/>
                 <a:r>
                   <a:rPr lang="en-US" sz="2400" dirty="0"/>
-                  <a:t>Data is generated from normal distribution for each type of food.</a:t>
+                  <a:t>Data is generated from normal distribution for each training methods.</a:t>
                 </a:r>
               </a:p>
               <a:p>
@@ -19141,7 +19137,7 @@
             </p:txBody>
           </p:sp>
         </mc:Choice>
-        <mc:Fallback xmlns="">
+        <mc:Fallback>
           <p:sp>
             <p:nvSpPr>
               <p:cNvPr id="3" name="Content Placeholder 2"/>
@@ -19157,10 +19153,10 @@
                 <a:off x="685800" y="838200"/>
                 <a:ext cx="7772400" cy="4495800"/>
               </a:xfrm>
-              <a:blipFill rotWithShape="0">
+              <a:blipFill>
                 <a:blip r:embed="rId2"/>
                 <a:stretch>
-                  <a:fillRect l="-1176" t="-950" r="-706" b="-38128"/>
+                  <a:fillRect l="-1176" t="-950" r="-392" b="-36499"/>
                 </a:stretch>
               </a:blipFill>
             </p:spPr>
@@ -19352,7 +19348,7 @@
                                         <p:tgtEl>
                                           <p:spTgt spid="3">
                                             <p:txEl>
-                                              <p:pRg st="6" end="6"/>
+                                              <p:pRg st="5" end="5"/>
                                             </p:txEl>
                                           </p:spTgt>
                                         </p:tgtEl>
@@ -19370,7 +19366,7 @@
                                         <p:tgtEl>
                                           <p:spTgt spid="3">
                                             <p:txEl>
-                                              <p:pRg st="6" end="6"/>
+                                              <p:pRg st="5" end="5"/>
                                             </p:txEl>
                                           </p:spTgt>
                                         </p:tgtEl>
@@ -19395,7 +19391,7 @@
                                         <p:tgtEl>
                                           <p:spTgt spid="3">
                                             <p:txEl>
-                                              <p:pRg st="7" end="7"/>
+                                              <p:pRg st="6" end="6"/>
                                             </p:txEl>
                                           </p:spTgt>
                                         </p:tgtEl>
@@ -19413,7 +19409,7 @@
                                         <p:tgtEl>
                                           <p:spTgt spid="3">
                                             <p:txEl>
-                                              <p:pRg st="7" end="7"/>
+                                              <p:pRg st="6" end="6"/>
                                             </p:txEl>
                                           </p:spTgt>
                                         </p:tgtEl>
@@ -19456,6 +19452,130 @@
                                         <p:tgtEl>
                                           <p:spTgt spid="3">
                                             <p:txEl>
+                                              <p:pRg st="8" end="8"/>
+                                            </p:txEl>
+                                          </p:spTgt>
+                                        </p:tgtEl>
+                                        <p:attrNameLst>
+                                          <p:attrName>style.visibility</p:attrName>
+                                        </p:attrNameLst>
+                                      </p:cBhvr>
+                                      <p:to>
+                                        <p:strVal val="visible"/>
+                                      </p:to>
+                                    </p:set>
+                                    <p:anim calcmode="lin" valueType="num">
+                                      <p:cBhvr>
+                                        <p:cTn id="21" dur="1000" fill="hold"/>
+                                        <p:tgtEl>
+                                          <p:spTgt spid="3">
+                                            <p:txEl>
+                                              <p:pRg st="8" end="8"/>
+                                            </p:txEl>
+                                          </p:spTgt>
+                                        </p:tgtEl>
+                                        <p:attrNameLst>
+                                          <p:attrName>ppt_w</p:attrName>
+                                        </p:attrNameLst>
+                                      </p:cBhvr>
+                                      <p:tavLst>
+                                        <p:tav tm="0">
+                                          <p:val>
+                                            <p:fltVal val="0"/>
+                                          </p:val>
+                                        </p:tav>
+                                        <p:tav tm="100000">
+                                          <p:val>
+                                            <p:strVal val="#ppt_w"/>
+                                          </p:val>
+                                        </p:tav>
+                                      </p:tavLst>
+                                    </p:anim>
+                                    <p:anim calcmode="lin" valueType="num">
+                                      <p:cBhvr>
+                                        <p:cTn id="22" dur="1000" fill="hold"/>
+                                        <p:tgtEl>
+                                          <p:spTgt spid="3">
+                                            <p:txEl>
+                                              <p:pRg st="8" end="8"/>
+                                            </p:txEl>
+                                          </p:spTgt>
+                                        </p:tgtEl>
+                                        <p:attrNameLst>
+                                          <p:attrName>ppt_h</p:attrName>
+                                        </p:attrNameLst>
+                                      </p:cBhvr>
+                                      <p:tavLst>
+                                        <p:tav tm="0">
+                                          <p:val>
+                                            <p:fltVal val="0"/>
+                                          </p:val>
+                                        </p:tav>
+                                        <p:tav tm="100000">
+                                          <p:val>
+                                            <p:strVal val="#ppt_h"/>
+                                          </p:val>
+                                        </p:tav>
+                                      </p:tavLst>
+                                    </p:anim>
+                                    <p:anim calcmode="lin" valueType="num">
+                                      <p:cBhvr>
+                                        <p:cTn id="23" dur="1000" fill="hold"/>
+                                        <p:tgtEl>
+                                          <p:spTgt spid="3">
+                                            <p:txEl>
+                                              <p:pRg st="8" end="8"/>
+                                            </p:txEl>
+                                          </p:spTgt>
+                                        </p:tgtEl>
+                                        <p:attrNameLst>
+                                          <p:attrName>style.rotation</p:attrName>
+                                        </p:attrNameLst>
+                                      </p:cBhvr>
+                                      <p:tavLst>
+                                        <p:tav tm="0">
+                                          <p:val>
+                                            <p:fltVal val="90"/>
+                                          </p:val>
+                                        </p:tav>
+                                        <p:tav tm="100000">
+                                          <p:val>
+                                            <p:fltVal val="0"/>
+                                          </p:val>
+                                        </p:tav>
+                                      </p:tavLst>
+                                    </p:anim>
+                                    <p:animEffect transition="in" filter="fade">
+                                      <p:cBhvr>
+                                        <p:cTn id="24" dur="1000"/>
+                                        <p:tgtEl>
+                                          <p:spTgt spid="3">
+                                            <p:txEl>
+                                              <p:pRg st="8" end="8"/>
+                                            </p:txEl>
+                                          </p:spTgt>
+                                        </p:tgtEl>
+                                      </p:cBhvr>
+                                    </p:animEffect>
+                                  </p:childTnLst>
+                                </p:cTn>
+                              </p:par>
+                              <p:par>
+                                <p:cTn id="25" presetID="31" presetClass="entr" presetSubtype="0" fill="hold" nodeType="withEffect">
+                                  <p:stCondLst>
+                                    <p:cond delay="0"/>
+                                  </p:stCondLst>
+                                  <p:childTnLst>
+                                    <p:set>
+                                      <p:cBhvr>
+                                        <p:cTn id="26" dur="1" fill="hold">
+                                          <p:stCondLst>
+                                            <p:cond delay="0"/>
+                                          </p:stCondLst>
+                                        </p:cTn>
+                                        <p:tgtEl>
+                                          <p:spTgt spid="3">
+                                            <p:txEl>
                                               <p:pRg st="9" end="9"/>
                                             </p:txEl>
                                           </p:spTgt>
@@ -19470,7 +19590,7 @@
                                     </p:set>
                                     <p:anim calcmode="lin" valueType="num">
                                       <p:cBhvr>
-                                        <p:cTn id="21" dur="1000" fill="hold"/>
+                                        <p:cTn id="27" dur="1000" fill="hold"/>
                                         <p:tgtEl>
                                           <p:spTgt spid="3">
                                             <p:txEl>
@@ -19497,7 +19617,7 @@
                                     </p:anim>
                                     <p:anim calcmode="lin" valueType="num">
                                       <p:cBhvr>
-                                        <p:cTn id="22" dur="1000" fill="hold"/>
+                                        <p:cTn id="28" dur="1000" fill="hold"/>
                                         <p:tgtEl>
                                           <p:spTgt spid="3">
                                             <p:txEl>
@@ -19524,7 +19644,7 @@
                                     </p:anim>
                                     <p:anim calcmode="lin" valueType="num">
                                       <p:cBhvr>
-                                        <p:cTn id="23" dur="1000" fill="hold"/>
+                                        <p:cTn id="29" dur="1000" fill="hold"/>
                                         <p:tgtEl>
                                           <p:spTgt spid="3">
                                             <p:txEl>
@@ -19551,7 +19671,7 @@
                                     </p:anim>
                                     <p:animEffect transition="in" filter="fade">
                                       <p:cBhvr>
-                                        <p:cTn id="24" dur="1000"/>
+                                        <p:cTn id="30" dur="1000"/>
                                         <p:tgtEl>
                                           <p:spTgt spid="3">
                                             <p:txEl>
@@ -19565,14 +19685,14 @@
                                 </p:cTn>
                               </p:par>
                               <p:par>
-                                <p:cTn id="25" presetID="31" presetClass="entr" presetSubtype="0" fill="hold" nodeType="withEffect">
+                                <p:cTn id="31" presetID="31" presetClass="entr" presetSubtype="0" fill="hold" nodeType="withEffect">
                                   <p:stCondLst>
                                     <p:cond delay="0"/>
                                   </p:stCondLst>
                                   <p:childTnLst>
                                     <p:set>
                                       <p:cBhvr>
-                                        <p:cTn id="26" dur="1" fill="hold">
+                                        <p:cTn id="32" dur="1" fill="hold">
                                           <p:stCondLst>
                                             <p:cond delay="0"/>
                                           </p:stCondLst>
@@ -19594,7 +19714,7 @@
                                     </p:set>
                                     <p:anim calcmode="lin" valueType="num">
                                       <p:cBhvr>
-                                        <p:cTn id="27" dur="1000" fill="hold"/>
+                                        <p:cTn id="33" dur="1000" fill="hold"/>
                                         <p:tgtEl>
                                           <p:spTgt spid="3">
                                             <p:txEl>
@@ -19621,7 +19741,7 @@
                                     </p:anim>
                                     <p:anim calcmode="lin" valueType="num">
                                       <p:cBhvr>
-                                        <p:cTn id="28" dur="1000" fill="hold"/>
+                                        <p:cTn id="34" dur="1000" fill="hold"/>
                                         <p:tgtEl>
                                           <p:spTgt spid="3">
                                             <p:txEl>
@@ -19648,7 +19768,7 @@
                                     </p:anim>
                                     <p:anim calcmode="lin" valueType="num">
                                       <p:cBhvr>
-                                        <p:cTn id="29" dur="1000" fill="hold"/>
+                                        <p:cTn id="35" dur="1000" fill="hold"/>
                                         <p:tgtEl>
                                           <p:spTgt spid="3">
                                             <p:txEl>
@@ -19675,135 +19795,11 @@
                                     </p:anim>
                                     <p:animEffect transition="in" filter="fade">
                                       <p:cBhvr>
-                                        <p:cTn id="30" dur="1000"/>
+                                        <p:cTn id="36" dur="1000"/>
                                         <p:tgtEl>
                                           <p:spTgt spid="3">
                                             <p:txEl>
                                               <p:pRg st="10" end="10"/>
-                                            </p:txEl>
-                                          </p:spTgt>
-                                        </p:tgtEl>
-                                      </p:cBhvr>
-                                    </p:animEffect>
-                                  </p:childTnLst>
-                                </p:cTn>
-                              </p:par>
-                              <p:par>
-                                <p:cTn id="31" presetID="31" presetClass="entr" presetSubtype="0" fill="hold" nodeType="withEffect">
-                                  <p:stCondLst>
-                                    <p:cond delay="0"/>
-                                  </p:stCondLst>
-                                  <p:childTnLst>
-                                    <p:set>
-                                      <p:cBhvr>
-                                        <p:cTn id="32" dur="1" fill="hold">
-                                          <p:stCondLst>
-                                            <p:cond delay="0"/>
-                                          </p:stCondLst>
-                                        </p:cTn>
-                                        <p:tgtEl>
-                                          <p:spTgt spid="3">
-                                            <p:txEl>
-                                              <p:pRg st="11" end="11"/>
-                                            </p:txEl>
-                                          </p:spTgt>
-                                        </p:tgtEl>
-                                        <p:attrNameLst>
-                                          <p:attrName>style.visibility</p:attrName>
-                                        </p:attrNameLst>
-                                      </p:cBhvr>
-                                      <p:to>
-                                        <p:strVal val="visible"/>
-                                      </p:to>
-                                    </p:set>
-                                    <p:anim calcmode="lin" valueType="num">
-                                      <p:cBhvr>
-                                        <p:cTn id="33" dur="1000" fill="hold"/>
-                                        <p:tgtEl>
-                                          <p:spTgt spid="3">
-                                            <p:txEl>
-                                              <p:pRg st="11" end="11"/>
-                                            </p:txEl>
-                                          </p:spTgt>
-                                        </p:tgtEl>
-                                        <p:attrNameLst>
-                                          <p:attrName>ppt_w</p:attrName>
-                                        </p:attrNameLst>
-                                      </p:cBhvr>
-                                      <p:tavLst>
-                                        <p:tav tm="0">
-                                          <p:val>
-                                            <p:fltVal val="0"/>
-                                          </p:val>
-                                        </p:tav>
-                                        <p:tav tm="100000">
-                                          <p:val>
-                                            <p:strVal val="#ppt_w"/>
-                                          </p:val>
-                                        </p:tav>
-                                      </p:tavLst>
-                                    </p:anim>
-                                    <p:anim calcmode="lin" valueType="num">
-                                      <p:cBhvr>
-                                        <p:cTn id="34" dur="1000" fill="hold"/>
-                                        <p:tgtEl>
-                                          <p:spTgt spid="3">
-                                            <p:txEl>
-                                              <p:pRg st="11" end="11"/>
-                                            </p:txEl>
-                                          </p:spTgt>
-                                        </p:tgtEl>
-                                        <p:attrNameLst>
-                                          <p:attrName>ppt_h</p:attrName>
-                                        </p:attrNameLst>
-                                      </p:cBhvr>
-                                      <p:tavLst>
-                                        <p:tav tm="0">
-                                          <p:val>
-                                            <p:fltVal val="0"/>
-                                          </p:val>
-                                        </p:tav>
-                                        <p:tav tm="100000">
-                                          <p:val>
-                                            <p:strVal val="#ppt_h"/>
-                                          </p:val>
-                                        </p:tav>
-                                      </p:tavLst>
-                                    </p:anim>
-                                    <p:anim calcmode="lin" valueType="num">
-                                      <p:cBhvr>
-                                        <p:cTn id="35" dur="1000" fill="hold"/>
-                                        <p:tgtEl>
-                                          <p:spTgt spid="3">
-                                            <p:txEl>
-                                              <p:pRg st="11" end="11"/>
-                                            </p:txEl>
-                                          </p:spTgt>
-                                        </p:tgtEl>
-                                        <p:attrNameLst>
-                                          <p:attrName>style.rotation</p:attrName>
-                                        </p:attrNameLst>
-                                      </p:cBhvr>
-                                      <p:tavLst>
-                                        <p:tav tm="0">
-                                          <p:val>
-                                            <p:fltVal val="90"/>
-                                          </p:val>
-                                        </p:tav>
-                                        <p:tav tm="100000">
-                                          <p:val>
-                                            <p:fltVal val="0"/>
-                                          </p:val>
-                                        </p:tav>
-                                      </p:tavLst>
-                                    </p:anim>
-                                    <p:animEffect transition="in" filter="fade">
-                                      <p:cBhvr>
-                                        <p:cTn id="36" dur="1000"/>
-                                        <p:tgtEl>
-                                          <p:spTgt spid="3">
-                                            <p:txEl>
-                                              <p:pRg st="11" end="11"/>
                                             </p:txEl>
                                           </p:spTgt>
                                         </p:tgtEl>
@@ -19872,1691 +19868,6 @@
         </p:nvSpPr>
         <p:spPr>
           <a:xfrm>
-            <a:off x="685800" y="228600"/>
-            <a:ext cx="7772400" cy="762000"/>
-          </a:xfrm>
-        </p:spPr>
-        <p:txBody>
-          <a:bodyPr/>
-          <a:lstStyle/>
-          <a:p>
-            <a:r>
-              <a:rPr lang="en-US" dirty="0"/>
-              <a:t>Example 8.1 Assumptions</a:t>
-            </a:r>
-          </a:p>
-        </p:txBody>
-      </p:sp>
-      <mc:AlternateContent xmlns:mc="http://schemas.openxmlformats.org/markup-compatibility/2006" xmlns:a14="http://schemas.microsoft.com/office/drawing/2010/main">
-        <mc:Choice Requires="a14">
-          <p:sp>
-            <p:nvSpPr>
-              <p:cNvPr id="3" name="Content Placeholder 2"/>
-              <p:cNvSpPr>
-                <a:spLocks noGrp="1"/>
-              </p:cNvSpPr>
-              <p:nvPr>
-                <p:ph idx="1"/>
-              </p:nvPr>
-            </p:nvSpPr>
-            <p:spPr>
-              <a:xfrm>
-                <a:off x="313182" y="1216152"/>
-                <a:ext cx="3839718" cy="4495800"/>
-              </a:xfrm>
-            </p:spPr>
-            <p:txBody>
-              <a:bodyPr/>
-              <a:lstStyle/>
-              <a:p>
-                <a14:m>
-                  <m:oMath xmlns:m="http://schemas.openxmlformats.org/officeDocument/2006/math">
-                    <m:sSub>
-                      <m:sSubPr>
-                        <m:ctrlPr>
-                          <a:rPr lang="en-US" sz="2400" b="0" i="1" smtClean="0">
-                            <a:latin typeface="Cambria Math" panose="02040503050406030204" pitchFamily="18" charset="0"/>
-                          </a:rPr>
-                        </m:ctrlPr>
-                      </m:sSubPr>
-                      <m:e>
-                        <m:r>
-                          <a:rPr lang="en-US" sz="2400" b="0" i="1" smtClean="0">
-                            <a:latin typeface="Cambria Math" panose="02040503050406030204" pitchFamily="18" charset="0"/>
-                          </a:rPr>
-                          <m:t>𝐻</m:t>
-                        </m:r>
-                      </m:e>
-                      <m:sub>
-                        <m:r>
-                          <a:rPr lang="en-US" sz="2400" b="0" i="1" smtClean="0">
-                            <a:latin typeface="Cambria Math" panose="02040503050406030204" pitchFamily="18" charset="0"/>
-                          </a:rPr>
-                          <m:t>0</m:t>
-                        </m:r>
-                      </m:sub>
-                    </m:sSub>
-                    <m:r>
-                      <a:rPr lang="en-US" sz="2400" b="0" i="1" smtClean="0">
-                        <a:latin typeface="Cambria Math" panose="02040503050406030204" pitchFamily="18" charset="0"/>
-                      </a:rPr>
-                      <m:t>:</m:t>
-                    </m:r>
-                    <m:sSub>
-                      <m:sSubPr>
-                        <m:ctrlPr>
-                          <a:rPr lang="en-US" sz="2400" i="1">
-                            <a:latin typeface="Cambria Math" panose="02040503050406030204" pitchFamily="18" charset="0"/>
-                          </a:rPr>
-                        </m:ctrlPr>
-                      </m:sSubPr>
-                      <m:e>
-                        <m:r>
-                          <a:rPr lang="en-US" sz="2400" i="1">
-                            <a:latin typeface="Cambria Math"/>
-                          </a:rPr>
-                          <m:t>𝜎</m:t>
-                        </m:r>
-                      </m:e>
-                      <m:sub>
-                        <m:r>
-                          <a:rPr lang="en-US" sz="2400" i="1">
-                            <a:latin typeface="Cambria Math"/>
-                          </a:rPr>
-                          <m:t>1</m:t>
-                        </m:r>
-                      </m:sub>
-                    </m:sSub>
-                    <m:r>
-                      <a:rPr lang="en-US" sz="2400" i="1">
-                        <a:latin typeface="Cambria Math"/>
-                      </a:rPr>
-                      <m:t>=</m:t>
-                    </m:r>
-                    <m:sSub>
-                      <m:sSubPr>
-                        <m:ctrlPr>
-                          <a:rPr lang="en-US" sz="2400" i="1">
-                            <a:latin typeface="Cambria Math" panose="02040503050406030204" pitchFamily="18" charset="0"/>
-                          </a:rPr>
-                        </m:ctrlPr>
-                      </m:sSubPr>
-                      <m:e>
-                        <m:r>
-                          <a:rPr lang="en-US" sz="2400" i="1">
-                            <a:latin typeface="Cambria Math"/>
-                          </a:rPr>
-                          <m:t>𝜎</m:t>
-                        </m:r>
-                      </m:e>
-                      <m:sub>
-                        <m:r>
-                          <a:rPr lang="en-US" sz="2400" i="1">
-                            <a:latin typeface="Cambria Math"/>
-                          </a:rPr>
-                          <m:t>2</m:t>
-                        </m:r>
-                      </m:sub>
-                    </m:sSub>
-                    <m:r>
-                      <a:rPr lang="en-US" sz="2400" i="1">
-                        <a:latin typeface="Cambria Math"/>
-                      </a:rPr>
-                      <m:t>=</m:t>
-                    </m:r>
-                    <m:sSub>
-                      <m:sSubPr>
-                        <m:ctrlPr>
-                          <a:rPr lang="en-US" sz="2400" i="1">
-                            <a:latin typeface="Cambria Math" panose="02040503050406030204" pitchFamily="18" charset="0"/>
-                          </a:rPr>
-                        </m:ctrlPr>
-                      </m:sSubPr>
-                      <m:e>
-                        <m:r>
-                          <a:rPr lang="en-US" sz="2400" i="1">
-                            <a:latin typeface="Cambria Math"/>
-                          </a:rPr>
-                          <m:t>𝜎</m:t>
-                        </m:r>
-                      </m:e>
-                      <m:sub>
-                        <m:r>
-                          <a:rPr lang="en-US" sz="2400" i="1">
-                            <a:latin typeface="Cambria Math" panose="02040503050406030204" pitchFamily="18" charset="0"/>
-                          </a:rPr>
-                          <m:t>3</m:t>
-                        </m:r>
-                      </m:sub>
-                    </m:sSub>
-                  </m:oMath>
-                </a14:m>
-                <a:endParaRPr lang="en-US" sz="2400" dirty="0"/>
-              </a:p>
-              <a:p>
-                <a:pPr>
-                  <a:buFont typeface="Wingdings" panose="05000000000000000000" pitchFamily="2" charset="2"/>
-                  <a:buChar char="Ø"/>
-                </a:pPr>
-                <a:r>
-                  <a:rPr lang="en-US" sz="1200" dirty="0">
-                    <a:latin typeface="+mn-lt"/>
-                    <a:ea typeface="Calibri" panose="020F0502020204030204" pitchFamily="34" charset="0"/>
-                    <a:cs typeface="Calibri" panose="020F0502020204030204" pitchFamily="34" charset="0"/>
-                  </a:rPr>
-                  <a:t>In R: </a:t>
-                </a:r>
-                <a:r>
-                  <a:rPr lang="en-US" sz="1200" dirty="0">
-                    <a:latin typeface="Calibri" panose="020F0502020204030204" pitchFamily="34" charset="0"/>
-                    <a:ea typeface="Calibri" panose="020F0502020204030204" pitchFamily="34" charset="0"/>
-                    <a:cs typeface="Calibri" panose="020F0502020204030204" pitchFamily="34" charset="0"/>
-                  </a:rPr>
-                  <a:t>car::</a:t>
-                </a:r>
-                <a:r>
-                  <a:rPr lang="en-US" sz="1200" dirty="0" err="1">
-                    <a:latin typeface="Calibri" panose="020F0502020204030204" pitchFamily="34" charset="0"/>
-                    <a:ea typeface="Calibri" panose="020F0502020204030204" pitchFamily="34" charset="0"/>
-                    <a:cs typeface="Calibri" panose="020F0502020204030204" pitchFamily="34" charset="0"/>
-                  </a:rPr>
-                  <a:t>leveneTest</a:t>
-                </a:r>
-                <a:r>
-                  <a:rPr lang="en-US" sz="1200" dirty="0">
-                    <a:latin typeface="Calibri" panose="020F0502020204030204" pitchFamily="34" charset="0"/>
-                    <a:ea typeface="Calibri" panose="020F0502020204030204" pitchFamily="34" charset="0"/>
-                    <a:cs typeface="Calibri" panose="020F0502020204030204" pitchFamily="34" charset="0"/>
-                  </a:rPr>
-                  <a:t>(exmp8.1$isof, exmp8.1$source)</a:t>
-                </a:r>
-              </a:p>
-              <a:p>
-                <a:pPr>
-                  <a:buFont typeface="Wingdings" panose="05000000000000000000" pitchFamily="2" charset="2"/>
-                  <a:buChar char="Ø"/>
-                </a:pPr>
-                <a:r>
-                  <a:rPr lang="en-US" sz="1200" dirty="0" err="1">
-                    <a:latin typeface="Calibri" panose="020F0502020204030204" pitchFamily="34" charset="0"/>
-                    <a:ea typeface="Calibri" panose="020F0502020204030204" pitchFamily="34" charset="0"/>
-                    <a:cs typeface="Calibri" panose="020F0502020204030204" pitchFamily="34" charset="0"/>
-                  </a:rPr>
-                  <a:t>lawstat</a:t>
-                </a:r>
-                <a:r>
-                  <a:rPr lang="en-US" sz="1200" dirty="0">
-                    <a:latin typeface="Calibri" panose="020F0502020204030204" pitchFamily="34" charset="0"/>
-                    <a:ea typeface="Calibri" panose="020F0502020204030204" pitchFamily="34" charset="0"/>
-                    <a:cs typeface="Calibri" panose="020F0502020204030204" pitchFamily="34" charset="0"/>
-                  </a:rPr>
-                  <a:t>::</a:t>
-                </a:r>
-                <a:r>
-                  <a:rPr lang="en-US" sz="1200" dirty="0" err="1">
-                    <a:latin typeface="Calibri" panose="020F0502020204030204" pitchFamily="34" charset="0"/>
-                    <a:ea typeface="Calibri" panose="020F0502020204030204" pitchFamily="34" charset="0"/>
-                    <a:cs typeface="Calibri" panose="020F0502020204030204" pitchFamily="34" charset="0"/>
-                  </a:rPr>
-                  <a:t>levene.test</a:t>
-                </a:r>
-                <a:r>
-                  <a:rPr lang="en-US" sz="1200" dirty="0">
-                    <a:latin typeface="Calibri" panose="020F0502020204030204" pitchFamily="34" charset="0"/>
-                    <a:ea typeface="Calibri" panose="020F0502020204030204" pitchFamily="34" charset="0"/>
-                    <a:cs typeface="Calibri" panose="020F0502020204030204" pitchFamily="34" charset="0"/>
-                  </a:rPr>
-                  <a:t>(exmp8.1$isof, exmp8.1$source)</a:t>
-                </a:r>
-              </a:p>
-              <a:p>
-                <a:endParaRPr lang="en-US" dirty="0"/>
-              </a:p>
-              <a:p>
-                <a:endParaRPr lang="en-US" dirty="0"/>
-              </a:p>
-              <a:p>
-                <a:endParaRPr lang="en-US" dirty="0"/>
-              </a:p>
-              <a:p>
-                <a:endParaRPr lang="en-US" dirty="0"/>
-              </a:p>
-              <a:p>
-                <a:endParaRPr lang="en-US" dirty="0"/>
-              </a:p>
-              <a:p>
-                <a:endParaRPr lang="en-US" dirty="0"/>
-              </a:p>
-              <a:p>
-                <a:r>
-                  <a:rPr lang="en-US" dirty="0" err="1"/>
-                  <a:t>Levene’s</a:t>
-                </a:r>
-                <a:r>
-                  <a:rPr lang="en-US" dirty="0"/>
-                  <a:t> test </a:t>
-                </a:r>
-                <a14:m>
-                  <m:oMath xmlns:m="http://schemas.openxmlformats.org/officeDocument/2006/math">
-                    <m:r>
-                      <a:rPr lang="en-US" i="1" dirty="0" smtClean="0">
-                        <a:latin typeface="Cambria Math" panose="02040503050406030204" pitchFamily="18" charset="0"/>
-                      </a:rPr>
-                      <m:t>𝑝</m:t>
-                    </m:r>
-                    <m:r>
-                      <a:rPr lang="en-US" i="1" dirty="0" smtClean="0">
-                        <a:latin typeface="Cambria Math" panose="02040503050406030204" pitchFamily="18" charset="0"/>
-                      </a:rPr>
-                      <m:t>−</m:t>
-                    </m:r>
-                    <m:r>
-                      <a:rPr lang="en-US" i="1" dirty="0" smtClean="0">
-                        <a:latin typeface="Cambria Math" panose="02040503050406030204" pitchFamily="18" charset="0"/>
-                      </a:rPr>
-                      <m:t>𝑣𝑎𝑙𝑢𝑒</m:t>
-                    </m:r>
-                  </m:oMath>
-                </a14:m>
-                <a:r>
-                  <a:rPr lang="en-US" dirty="0"/>
-                  <a:t> is </a:t>
-                </a:r>
-                <a14:m>
-                  <m:oMath xmlns:m="http://schemas.openxmlformats.org/officeDocument/2006/math">
-                    <m:r>
-                      <a:rPr lang="en-US" i="1" dirty="0" smtClean="0">
-                        <a:latin typeface="Cambria Math" panose="02040503050406030204" pitchFamily="18" charset="0"/>
-                      </a:rPr>
-                      <m:t>0.89</m:t>
-                    </m:r>
-                    <m:r>
-                      <a:rPr lang="en-US" i="1" dirty="0">
-                        <a:latin typeface="Cambria Math" panose="02040503050406030204" pitchFamily="18" charset="0"/>
-                      </a:rPr>
-                      <m:t>6</m:t>
-                    </m:r>
-                  </m:oMath>
-                </a14:m>
-                <a:r>
-                  <a:rPr lang="en-US" dirty="0"/>
-                  <a:t>. Fail to reject equality of the variances</a:t>
-                </a:r>
-              </a:p>
-            </p:txBody>
-          </p:sp>
-        </mc:Choice>
-        <mc:Fallback xmlns="">
-          <p:sp>
-            <p:nvSpPr>
-              <p:cNvPr id="3" name="Content Placeholder 2"/>
-              <p:cNvSpPr>
-                <a:spLocks noGrp="1" noRot="1" noChangeAspect="1" noMove="1" noResize="1" noEditPoints="1" noAdjustHandles="1" noChangeArrowheads="1" noChangeShapeType="1" noTextEdit="1"/>
-              </p:cNvSpPr>
-              <p:nvPr>
-                <p:ph idx="1"/>
-              </p:nvPr>
-            </p:nvSpPr>
-            <p:spPr>
-              <a:xfrm>
-                <a:off x="313182" y="1216152"/>
-                <a:ext cx="3839718" cy="4495800"/>
-              </a:xfrm>
-              <a:blipFill>
-                <a:blip r:embed="rId2"/>
-                <a:stretch>
-                  <a:fillRect l="-2540" t="-950" b="-15197"/>
-                </a:stretch>
-              </a:blipFill>
-            </p:spPr>
-            <p:txBody>
-              <a:bodyPr/>
-              <a:lstStyle/>
-              <a:p>
-                <a:r>
-                  <a:rPr lang="en-US">
-                    <a:noFill/>
-                  </a:rPr>
-                  <a:t> </a:t>
-                </a:r>
-              </a:p>
-            </p:txBody>
-          </p:sp>
-        </mc:Fallback>
-      </mc:AlternateContent>
-      <p:sp>
-        <p:nvSpPr>
-          <p:cNvPr id="7" name="Slide Number Placeholder 6"/>
-          <p:cNvSpPr>
-            <a:spLocks noGrp="1"/>
-          </p:cNvSpPr>
-          <p:nvPr>
-            <p:ph type="sldNum" sz="quarter" idx="4"/>
-          </p:nvPr>
-        </p:nvSpPr>
-        <p:spPr/>
-        <p:txBody>
-          <a:bodyPr/>
-          <a:lstStyle/>
-          <a:p>
-            <a:fld id="{A9A949EE-02F8-4E24-B346-EA33FC0EA551}" type="slidenum">
-              <a:rPr lang="en-US" smtClean="0"/>
-              <a:t>17</a:t>
-            </a:fld>
-            <a:endParaRPr lang="en-US"/>
-          </a:p>
-        </p:txBody>
-      </p:sp>
-      <p:pic>
-        <p:nvPicPr>
-          <p:cNvPr id="4" name="Picture 3"/>
-          <p:cNvPicPr>
-            <a:picLocks noChangeAspect="1"/>
-          </p:cNvPicPr>
-          <p:nvPr/>
-        </p:nvPicPr>
-        <p:blipFill>
-          <a:blip r:embed="rId3"/>
-          <a:stretch>
-            <a:fillRect/>
-          </a:stretch>
-        </p:blipFill>
-        <p:spPr>
-          <a:xfrm>
-            <a:off x="413385" y="2286000"/>
-            <a:ext cx="3639312" cy="2197320"/>
-          </a:xfrm>
-          <a:prstGeom prst="rect">
-            <a:avLst/>
-          </a:prstGeom>
-        </p:spPr>
-      </p:pic>
-      <p:graphicFrame>
-        <p:nvGraphicFramePr>
-          <p:cNvPr id="5" name="Object 4"/>
-          <p:cNvGraphicFramePr>
-            <a:graphicFrameLocks noChangeAspect="1"/>
-          </p:cNvGraphicFramePr>
-          <p:nvPr>
-            <p:extLst>
-              <p:ext uri="{D42A27DB-BD31-4B8C-83A1-F6EECF244321}">
-                <p14:modId xmlns:p14="http://schemas.microsoft.com/office/powerpoint/2010/main" val="556591610"/>
-              </p:ext>
-            </p:extLst>
-          </p:nvPr>
-        </p:nvGraphicFramePr>
-        <p:xfrm>
-          <a:off x="4724400" y="2286000"/>
-          <a:ext cx="4114800" cy="2743200"/>
-        </p:xfrm>
-        <a:graphic>
-          <a:graphicData uri="http://schemas.openxmlformats.org/presentationml/2006/ole">
-            <mc:AlternateContent xmlns:mc="http://schemas.openxmlformats.org/markup-compatibility/2006">
-              <mc:Choice xmlns:v="urn:schemas-microsoft-com:vml" Requires="v">
-                <p:oleObj name="Graph" r:id="rId4" imgW="5486400" imgH="3657600" progId="MtbGraph.Document.16">
-                  <p:embed/>
-                </p:oleObj>
-              </mc:Choice>
-              <mc:Fallback>
-                <p:oleObj name="Graph" r:id="rId4" imgW="5486400" imgH="3657600" progId="MtbGraph.Document.16">
-                  <p:embed/>
-                  <p:pic>
-                    <p:nvPicPr>
-                      <p:cNvPr id="0" name=""/>
-                      <p:cNvPicPr/>
-                      <p:nvPr/>
-                    </p:nvPicPr>
-                    <p:blipFill>
-                      <a:blip r:embed="rId5"/>
-                      <a:stretch>
-                        <a:fillRect/>
-                      </a:stretch>
-                    </p:blipFill>
-                    <p:spPr>
-                      <a:xfrm>
-                        <a:off x="4724400" y="2286000"/>
-                        <a:ext cx="4114800" cy="2743200"/>
-                      </a:xfrm>
-                      <a:prstGeom prst="rect">
-                        <a:avLst/>
-                      </a:prstGeom>
-                    </p:spPr>
-                  </p:pic>
-                </p:oleObj>
-              </mc:Fallback>
-            </mc:AlternateContent>
-          </a:graphicData>
-        </a:graphic>
-      </p:graphicFrame>
-      <mc:AlternateContent xmlns:mc="http://schemas.openxmlformats.org/markup-compatibility/2006" xmlns:a14="http://schemas.microsoft.com/office/drawing/2010/main">
-        <mc:Choice Requires="a14">
-          <p:sp>
-            <p:nvSpPr>
-              <p:cNvPr id="6" name="Content Placeholder 2"/>
-              <p:cNvSpPr txBox="1">
-                <a:spLocks/>
-              </p:cNvSpPr>
-              <p:nvPr/>
-            </p:nvSpPr>
-            <p:spPr bwMode="auto">
-              <a:xfrm>
-                <a:off x="4495800" y="1216152"/>
-                <a:ext cx="4572000" cy="4495800"/>
-              </a:xfrm>
-              <a:prstGeom prst="rect">
-                <a:avLst/>
-              </a:prstGeom>
-              <a:noFill/>
-              <a:ln>
-                <a:noFill/>
-              </a:ln>
-              <a:extLst>
-                <a:ext uri="{909E8E84-426E-40DD-AFC4-6F175D3DCCD1}">
-                  <a14:hiddenFill>
-                    <a:solidFill>
-                      <a:srgbClr val="FFFFFF"/>
-                    </a:solidFill>
-                  </a14:hiddenFill>
-                </a:ext>
-                <a:ext uri="{91240B29-F687-4F45-9708-019B960494DF}">
-                  <a14:hiddenLine w="9525">
-                    <a:solidFill>
-                      <a:srgbClr val="000000"/>
-                    </a:solidFill>
-                    <a:miter lim="800000"/>
-                    <a:headEnd/>
-                    <a:tailEnd/>
-                  </a14:hiddenLine>
-                </a:ext>
-              </a:extLst>
-            </p:spPr>
-            <p:txBody>
-              <a:bodyPr vert="horz" wrap="square" lIns="91440" tIns="45720" rIns="91440" bIns="45720" numCol="1" anchor="t" anchorCtr="0" compatLnSpc="1">
-                <a:prstTxWarp prst="textNoShape">
-                  <a:avLst/>
-                </a:prstTxWarp>
-              </a:bodyPr>
-              <a:lstStyle>
-                <a:lvl1pPr marL="342900" indent="-342900" algn="l" rtl="0" eaLnBrk="0" fontAlgn="base" hangingPunct="0">
-                  <a:spcBef>
-                    <a:spcPct val="20000"/>
-                  </a:spcBef>
-                  <a:spcAft>
-                    <a:spcPct val="0"/>
-                  </a:spcAft>
-                  <a:buChar char="•"/>
-                  <a:defRPr sz="2600" baseline="0">
-                    <a:solidFill>
-                      <a:srgbClr val="003366"/>
-                    </a:solidFill>
-                    <a:latin typeface="Franklin Gothic Demi Cond" panose="020B0706030402020204" pitchFamily="34" charset="0"/>
-                    <a:ea typeface="ＭＳ Ｐゴシック" charset="-128"/>
-                    <a:cs typeface="+mn-cs"/>
-                  </a:defRPr>
-                </a:lvl1pPr>
-                <a:lvl2pPr marL="742950" indent="-285750" algn="l" rtl="0" eaLnBrk="0" fontAlgn="base" hangingPunct="0">
-                  <a:spcBef>
-                    <a:spcPct val="20000"/>
-                  </a:spcBef>
-                  <a:spcAft>
-                    <a:spcPct val="0"/>
-                  </a:spcAft>
-                  <a:buChar char="–"/>
-                  <a:defRPr sz="2000" baseline="0">
-                    <a:solidFill>
-                      <a:srgbClr val="003366"/>
-                    </a:solidFill>
-                    <a:latin typeface="Franklin Gothic Demi Cond" panose="020B0706030402020204" pitchFamily="34" charset="0"/>
-                    <a:ea typeface="ＭＳ Ｐゴシック" charset="-128"/>
-                  </a:defRPr>
-                </a:lvl2pPr>
-                <a:lvl3pPr marL="1143000" indent="-228600" algn="l" rtl="0" eaLnBrk="0" fontAlgn="base" hangingPunct="0">
-                  <a:spcBef>
-                    <a:spcPct val="20000"/>
-                  </a:spcBef>
-                  <a:spcAft>
-                    <a:spcPct val="0"/>
-                  </a:spcAft>
-                  <a:buChar char="•"/>
-                  <a:defRPr baseline="0">
-                    <a:solidFill>
-                      <a:srgbClr val="003366"/>
-                    </a:solidFill>
-                    <a:latin typeface="Franklin Gothic Demi Cond" panose="020B0706030402020204" pitchFamily="34" charset="0"/>
-                    <a:ea typeface="ＭＳ Ｐゴシック" charset="-128"/>
-                  </a:defRPr>
-                </a:lvl3pPr>
-                <a:lvl4pPr marL="1600200" indent="-228600" algn="l" rtl="0" eaLnBrk="0" fontAlgn="base" hangingPunct="0">
-                  <a:spcBef>
-                    <a:spcPct val="20000"/>
-                  </a:spcBef>
-                  <a:spcAft>
-                    <a:spcPct val="0"/>
-                  </a:spcAft>
-                  <a:buChar char="–"/>
-                  <a:defRPr sz="1600" baseline="0">
-                    <a:solidFill>
-                      <a:srgbClr val="003366"/>
-                    </a:solidFill>
-                    <a:latin typeface="Franklin Gothic Demi Cond" panose="020B0706030402020204" pitchFamily="34" charset="0"/>
-                    <a:ea typeface="ＭＳ Ｐゴシック" charset="-128"/>
-                  </a:defRPr>
-                </a:lvl4pPr>
-                <a:lvl5pPr marL="2057400" indent="-228600" algn="l" rtl="0" eaLnBrk="0" fontAlgn="base" hangingPunct="0">
-                  <a:spcBef>
-                    <a:spcPct val="20000"/>
-                  </a:spcBef>
-                  <a:spcAft>
-                    <a:spcPct val="0"/>
-                  </a:spcAft>
-                  <a:buChar char="»"/>
-                  <a:defRPr sz="1500" baseline="0">
-                    <a:solidFill>
-                      <a:srgbClr val="003366"/>
-                    </a:solidFill>
-                    <a:latin typeface="Franklin Gothic Demi Cond" panose="020B0706030402020204" pitchFamily="34" charset="0"/>
-                    <a:ea typeface="ＭＳ Ｐゴシック" charset="-128"/>
-                  </a:defRPr>
-                </a:lvl5pPr>
-                <a:lvl6pPr marL="2514600" indent="-228600" algn="l" rtl="0" fontAlgn="base">
-                  <a:spcBef>
-                    <a:spcPct val="20000"/>
-                  </a:spcBef>
-                  <a:spcAft>
-                    <a:spcPct val="0"/>
-                  </a:spcAft>
-                  <a:buChar char="»"/>
-                  <a:defRPr sz="1500">
-                    <a:solidFill>
-                      <a:schemeClr val="tx1"/>
-                    </a:solidFill>
-                    <a:latin typeface="+mn-lt"/>
-                    <a:ea typeface="ＭＳ Ｐゴシック" charset="-128"/>
-                  </a:defRPr>
-                </a:lvl6pPr>
-                <a:lvl7pPr marL="2971800" indent="-228600" algn="l" rtl="0" fontAlgn="base">
-                  <a:spcBef>
-                    <a:spcPct val="20000"/>
-                  </a:spcBef>
-                  <a:spcAft>
-                    <a:spcPct val="0"/>
-                  </a:spcAft>
-                  <a:buChar char="»"/>
-                  <a:defRPr sz="1500">
-                    <a:solidFill>
-                      <a:schemeClr val="tx1"/>
-                    </a:solidFill>
-                    <a:latin typeface="+mn-lt"/>
-                    <a:ea typeface="ＭＳ Ｐゴシック" charset="-128"/>
-                  </a:defRPr>
-                </a:lvl7pPr>
-                <a:lvl8pPr marL="3429000" indent="-228600" algn="l" rtl="0" fontAlgn="base">
-                  <a:spcBef>
-                    <a:spcPct val="20000"/>
-                  </a:spcBef>
-                  <a:spcAft>
-                    <a:spcPct val="0"/>
-                  </a:spcAft>
-                  <a:buChar char="»"/>
-                  <a:defRPr sz="1500">
-                    <a:solidFill>
-                      <a:schemeClr val="tx1"/>
-                    </a:solidFill>
-                    <a:latin typeface="+mn-lt"/>
-                    <a:ea typeface="ＭＳ Ｐゴシック" charset="-128"/>
-                  </a:defRPr>
-                </a:lvl8pPr>
-                <a:lvl9pPr marL="3886200" indent="-228600" algn="l" rtl="0" fontAlgn="base">
-                  <a:spcBef>
-                    <a:spcPct val="20000"/>
-                  </a:spcBef>
-                  <a:spcAft>
-                    <a:spcPct val="0"/>
-                  </a:spcAft>
-                  <a:buChar char="»"/>
-                  <a:defRPr sz="1500">
-                    <a:solidFill>
-                      <a:schemeClr val="tx1"/>
-                    </a:solidFill>
-                    <a:latin typeface="+mn-lt"/>
-                    <a:ea typeface="ＭＳ Ｐゴシック" charset="-128"/>
-                  </a:defRPr>
-                </a:lvl9pPr>
-              </a:lstStyle>
-              <a:p>
-                <a14:m>
-                  <m:oMath xmlns:m="http://schemas.openxmlformats.org/officeDocument/2006/math">
-                    <m:sSub>
-                      <m:sSubPr>
-                        <m:ctrlPr>
-                          <a:rPr lang="en-US" sz="2400" i="1">
-                            <a:latin typeface="Cambria Math" panose="02040503050406030204" pitchFamily="18" charset="0"/>
-                          </a:rPr>
-                        </m:ctrlPr>
-                      </m:sSubPr>
-                      <m:e>
-                        <m:r>
-                          <a:rPr lang="en-US" sz="2400" i="1">
-                            <a:latin typeface="Cambria Math" panose="02040503050406030204" pitchFamily="18" charset="0"/>
-                          </a:rPr>
-                          <m:t>𝐻</m:t>
-                        </m:r>
-                      </m:e>
-                      <m:sub>
-                        <m:r>
-                          <a:rPr lang="en-US" sz="2400" i="1">
-                            <a:latin typeface="Cambria Math" panose="02040503050406030204" pitchFamily="18" charset="0"/>
-                          </a:rPr>
-                          <m:t>0</m:t>
-                        </m:r>
-                      </m:sub>
-                    </m:sSub>
-                    <m:r>
-                      <a:rPr lang="en-US" sz="2400" i="1">
-                        <a:latin typeface="Cambria Math" panose="02040503050406030204" pitchFamily="18" charset="0"/>
-                      </a:rPr>
-                      <m:t>: </m:t>
-                    </m:r>
-                  </m:oMath>
-                </a14:m>
-                <a:r>
-                  <a:rPr lang="en-US" sz="2400" dirty="0"/>
-                  <a:t>Data is generated from normal distribution for each type of food.</a:t>
-                </a:r>
-              </a:p>
-              <a:p>
-                <a:endParaRPr lang="en-US" sz="2400" dirty="0"/>
-              </a:p>
-              <a:p>
-                <a:endParaRPr lang="en-US" sz="2400" dirty="0"/>
-              </a:p>
-              <a:p>
-                <a:endParaRPr lang="en-US" sz="2400" dirty="0"/>
-              </a:p>
-              <a:p>
-                <a:endParaRPr lang="en-US" sz="2400" dirty="0"/>
-              </a:p>
-              <a:p>
-                <a:endParaRPr lang="en-US" sz="2400" dirty="0"/>
-              </a:p>
-              <a:p>
-                <a:endParaRPr lang="en-US" sz="2400" dirty="0"/>
-              </a:p>
-              <a:p>
-                <a:endParaRPr lang="en-US" sz="2400" dirty="0"/>
-              </a:p>
-              <a:p>
-                <a:endParaRPr lang="en-US" sz="2400" dirty="0"/>
-              </a:p>
-              <a:p>
-                <a:r>
-                  <a:rPr lang="en-US" sz="2400" dirty="0"/>
-                  <a:t>Large  </a:t>
-                </a:r>
-                <a14:m>
-                  <m:oMath xmlns:m="http://schemas.openxmlformats.org/officeDocument/2006/math">
-                    <m:r>
-                      <a:rPr lang="en-US" sz="2400" i="1" dirty="0">
-                        <a:latin typeface="Cambria Math" panose="02040503050406030204" pitchFamily="18" charset="0"/>
-                      </a:rPr>
-                      <m:t>𝑝</m:t>
-                    </m:r>
-                    <m:r>
-                      <a:rPr lang="en-US" sz="2400" i="1" dirty="0">
-                        <a:latin typeface="Cambria Math" panose="02040503050406030204" pitchFamily="18" charset="0"/>
-                      </a:rPr>
-                      <m:t>−</m:t>
-                    </m:r>
-                    <m:r>
-                      <a:rPr lang="en-US" sz="2400" i="1" dirty="0">
-                        <a:latin typeface="Cambria Math" panose="02040503050406030204" pitchFamily="18" charset="0"/>
-                      </a:rPr>
-                      <m:t>𝑣𝑎𝑙𝑢𝑒</m:t>
-                    </m:r>
-                  </m:oMath>
-                </a14:m>
-                <a:r>
-                  <a:rPr lang="en-US" sz="2400" dirty="0"/>
-                  <a:t>s. Fail to reject Normality assumption.</a:t>
-                </a:r>
-              </a:p>
-            </p:txBody>
-          </p:sp>
-        </mc:Choice>
-        <mc:Fallback xmlns="">
-          <p:sp>
-            <p:nvSpPr>
-              <p:cNvPr id="6" name="Content Placeholder 2"/>
-              <p:cNvSpPr txBox="1">
-                <a:spLocks noRot="1" noChangeAspect="1" noMove="1" noResize="1" noEditPoints="1" noAdjustHandles="1" noChangeArrowheads="1" noChangeShapeType="1" noTextEdit="1"/>
-              </p:cNvSpPr>
-              <p:nvPr/>
-            </p:nvSpPr>
-            <p:spPr bwMode="auto">
-              <a:xfrm>
-                <a:off x="4495800" y="1216152"/>
-                <a:ext cx="4572000" cy="4495800"/>
-              </a:xfrm>
-              <a:prstGeom prst="rect">
-                <a:avLst/>
-              </a:prstGeom>
-              <a:blipFill rotWithShape="0">
-                <a:blip r:embed="rId7"/>
-                <a:stretch>
-                  <a:fillRect l="-2000" t="-950" r="-2533" b="-17503"/>
-                </a:stretch>
-              </a:blipFill>
-              <a:ln>
-                <a:noFill/>
-              </a:ln>
-              <a:extLst>
-                <a:ext uri="{909E8E84-426E-40DD-AFC4-6F175D3DCCD1}">
-                  <a14:hiddenFill xmlns:a14="http://schemas.microsoft.com/office/drawing/2010/main">
-                    <a:solidFill>
-                      <a:srgbClr val="FFFFFF"/>
-                    </a:solidFill>
-                  </a14:hiddenFill>
-                </a:ext>
-                <a:ext uri="{91240B29-F687-4F45-9708-019B960494DF}">
-                  <a14:hiddenLine xmlns:a14="http://schemas.microsoft.com/office/drawing/2010/main" w="9525">
-                    <a:solidFill>
-                      <a:srgbClr val="000000"/>
-                    </a:solidFill>
-                    <a:miter lim="800000"/>
-                    <a:headEnd/>
-                    <a:tailEnd/>
-                  </a14:hiddenLine>
-                </a:ext>
-              </a:extLst>
-            </p:spPr>
-            <p:txBody>
-              <a:bodyPr/>
-              <a:lstStyle/>
-              <a:p>
-                <a:r>
-                  <a:rPr lang="en-US">
-                    <a:noFill/>
-                  </a:rPr>
-                  <a:t> </a:t>
-                </a:r>
-              </a:p>
-            </p:txBody>
-          </p:sp>
-        </mc:Fallback>
-      </mc:AlternateContent>
-      <p:sp>
-        <p:nvSpPr>
-          <p:cNvPr id="8" name="Oval 7"/>
-          <p:cNvSpPr/>
-          <p:nvPr/>
-        </p:nvSpPr>
-        <p:spPr>
-          <a:xfrm>
-            <a:off x="313182" y="4038600"/>
-            <a:ext cx="2811018" cy="444720"/>
-          </a:xfrm>
-          <a:prstGeom prst="ellipse">
-            <a:avLst/>
-          </a:prstGeom>
-          <a:noFill/>
-        </p:spPr>
-        <p:style>
-          <a:lnRef idx="1">
-            <a:schemeClr val="accent1"/>
-          </a:lnRef>
-          <a:fillRef idx="3">
-            <a:schemeClr val="accent1"/>
-          </a:fillRef>
-          <a:effectRef idx="2">
-            <a:schemeClr val="accent1"/>
-          </a:effectRef>
-          <a:fontRef idx="minor">
-            <a:schemeClr val="lt1"/>
-          </a:fontRef>
-        </p:style>
-        <p:txBody>
-          <a:bodyPr rtlCol="0" anchor="ctr"/>
-          <a:lstStyle/>
-          <a:p>
-            <a:pPr algn="ctr"/>
-            <a:endParaRPr lang="en-US"/>
-          </a:p>
-        </p:txBody>
-      </p:sp>
-      <p:cxnSp>
-        <p:nvCxnSpPr>
-          <p:cNvPr id="10" name="Straight Arrow Connector 9"/>
-          <p:cNvCxnSpPr>
-            <a:endCxn id="8" idx="5"/>
-          </p:cNvCxnSpPr>
-          <p:nvPr/>
-        </p:nvCxnSpPr>
-        <p:spPr>
-          <a:xfrm flipH="1" flipV="1">
-            <a:off x="2712536" y="4418192"/>
-            <a:ext cx="492055" cy="611008"/>
-          </a:xfrm>
-          <a:prstGeom prst="straightConnector1">
-            <a:avLst/>
-          </a:prstGeom>
-          <a:ln>
-            <a:tailEnd type="triangle"/>
-          </a:ln>
-        </p:spPr>
-        <p:style>
-          <a:lnRef idx="2">
-            <a:schemeClr val="accent1"/>
-          </a:lnRef>
-          <a:fillRef idx="0">
-            <a:schemeClr val="accent1"/>
-          </a:fillRef>
-          <a:effectRef idx="1">
-            <a:schemeClr val="accent1"/>
-          </a:effectRef>
-          <a:fontRef idx="minor">
-            <a:schemeClr val="tx1"/>
-          </a:fontRef>
-        </p:style>
-      </p:cxnSp>
-      <p:sp>
-        <p:nvSpPr>
-          <p:cNvPr id="11" name="Oval 10"/>
-          <p:cNvSpPr/>
-          <p:nvPr/>
-        </p:nvSpPr>
-        <p:spPr>
-          <a:xfrm>
-            <a:off x="8458200" y="3124200"/>
-            <a:ext cx="381000" cy="609600"/>
-          </a:xfrm>
-          <a:prstGeom prst="ellipse">
-            <a:avLst/>
-          </a:prstGeom>
-          <a:noFill/>
-        </p:spPr>
-        <p:style>
-          <a:lnRef idx="1">
-            <a:schemeClr val="accent1"/>
-          </a:lnRef>
-          <a:fillRef idx="3">
-            <a:schemeClr val="accent1"/>
-          </a:fillRef>
-          <a:effectRef idx="2">
-            <a:schemeClr val="accent1"/>
-          </a:effectRef>
-          <a:fontRef idx="minor">
-            <a:schemeClr val="lt1"/>
-          </a:fontRef>
-        </p:style>
-        <p:txBody>
-          <a:bodyPr rtlCol="0" anchor="ctr"/>
-          <a:lstStyle/>
-          <a:p>
-            <a:pPr algn="ctr"/>
-            <a:endParaRPr lang="en-US"/>
-          </a:p>
-        </p:txBody>
-      </p:sp>
-      <p:cxnSp>
-        <p:nvCxnSpPr>
-          <p:cNvPr id="13" name="Straight Arrow Connector 12"/>
-          <p:cNvCxnSpPr/>
-          <p:nvPr/>
-        </p:nvCxnSpPr>
-        <p:spPr>
-          <a:xfrm flipV="1">
-            <a:off x="6705600" y="3657600"/>
-            <a:ext cx="1828800" cy="1978152"/>
-          </a:xfrm>
-          <a:prstGeom prst="straightConnector1">
-            <a:avLst/>
-          </a:prstGeom>
-          <a:ln>
-            <a:tailEnd type="triangle"/>
-          </a:ln>
-        </p:spPr>
-        <p:style>
-          <a:lnRef idx="2">
-            <a:schemeClr val="accent1"/>
-          </a:lnRef>
-          <a:fillRef idx="0">
-            <a:schemeClr val="accent1"/>
-          </a:fillRef>
-          <a:effectRef idx="1">
-            <a:schemeClr val="accent1"/>
-          </a:effectRef>
-          <a:fontRef idx="minor">
-            <a:schemeClr val="tx1"/>
-          </a:fontRef>
-        </p:style>
-      </p:cxnSp>
-    </p:spTree>
-    <p:extLst>
-      <p:ext uri="{BB962C8B-B14F-4D97-AF65-F5344CB8AC3E}">
-        <p14:creationId xmlns:p14="http://schemas.microsoft.com/office/powerpoint/2010/main" val="1519734511"/>
-      </p:ext>
-    </p:extLst>
-  </p:cSld>
-  <p:clrMapOvr>
-    <a:masterClrMapping/>
-  </p:clrMapOvr>
-  <p:transition advClick="0"/>
-  <p:timing>
-    <p:tnLst>
-      <p:par>
-        <p:cTn id="1" dur="indefinite" restart="never" nodeType="tmRoot">
-          <p:childTnLst>
-            <p:seq concurrent="1" nextAc="seek">
-              <p:cTn id="2" dur="indefinite" nodeType="mainSeq">
-                <p:childTnLst>
-                  <p:par>
-                    <p:cTn id="3" fill="hold">
-                      <p:stCondLst>
-                        <p:cond delay="indefinite"/>
-                      </p:stCondLst>
-                      <p:childTnLst>
-                        <p:par>
-                          <p:cTn id="4" fill="hold">
-                            <p:stCondLst>
-                              <p:cond delay="0"/>
-                            </p:stCondLst>
-                            <p:childTnLst>
-                              <p:par>
-                                <p:cTn id="5" presetID="53" presetClass="entr" presetSubtype="16" fill="hold" nodeType="clickEffect">
-                                  <p:stCondLst>
-                                    <p:cond delay="0"/>
-                                  </p:stCondLst>
-                                  <p:childTnLst>
-                                    <p:set>
-                                      <p:cBhvr>
-                                        <p:cTn id="6" dur="1" fill="hold">
-                                          <p:stCondLst>
-                                            <p:cond delay="0"/>
-                                          </p:stCondLst>
-                                        </p:cTn>
-                                        <p:tgtEl>
-                                          <p:spTgt spid="4"/>
-                                        </p:tgtEl>
-                                        <p:attrNameLst>
-                                          <p:attrName>style.visibility</p:attrName>
-                                        </p:attrNameLst>
-                                      </p:cBhvr>
-                                      <p:to>
-                                        <p:strVal val="visible"/>
-                                      </p:to>
-                                    </p:set>
-                                    <p:anim calcmode="lin" valueType="num">
-                                      <p:cBhvr>
-                                        <p:cTn id="7" dur="500" fill="hold"/>
-                                        <p:tgtEl>
-                                          <p:spTgt spid="4"/>
-                                        </p:tgtEl>
-                                        <p:attrNameLst>
-                                          <p:attrName>ppt_w</p:attrName>
-                                        </p:attrNameLst>
-                                      </p:cBhvr>
-                                      <p:tavLst>
-                                        <p:tav tm="0">
-                                          <p:val>
-                                            <p:fltVal val="0"/>
-                                          </p:val>
-                                        </p:tav>
-                                        <p:tav tm="100000">
-                                          <p:val>
-                                            <p:strVal val="#ppt_w"/>
-                                          </p:val>
-                                        </p:tav>
-                                      </p:tavLst>
-                                    </p:anim>
-                                    <p:anim calcmode="lin" valueType="num">
-                                      <p:cBhvr>
-                                        <p:cTn id="8" dur="500" fill="hold"/>
-                                        <p:tgtEl>
-                                          <p:spTgt spid="4"/>
-                                        </p:tgtEl>
-                                        <p:attrNameLst>
-                                          <p:attrName>ppt_h</p:attrName>
-                                        </p:attrNameLst>
-                                      </p:cBhvr>
-                                      <p:tavLst>
-                                        <p:tav tm="0">
-                                          <p:val>
-                                            <p:fltVal val="0"/>
-                                          </p:val>
-                                        </p:tav>
-                                        <p:tav tm="100000">
-                                          <p:val>
-                                            <p:strVal val="#ppt_h"/>
-                                          </p:val>
-                                        </p:tav>
-                                      </p:tavLst>
-                                    </p:anim>
-                                    <p:animEffect transition="in" filter="fade">
-                                      <p:cBhvr>
-                                        <p:cTn id="9" dur="500"/>
-                                        <p:tgtEl>
-                                          <p:spTgt spid="4"/>
-                                        </p:tgtEl>
-                                      </p:cBhvr>
-                                    </p:animEffect>
-                                  </p:childTnLst>
-                                </p:cTn>
-                              </p:par>
-                            </p:childTnLst>
-                          </p:cTn>
-                        </p:par>
-                      </p:childTnLst>
-                    </p:cTn>
-                  </p:par>
-                  <p:par>
-                    <p:cTn id="10" fill="hold">
-                      <p:stCondLst>
-                        <p:cond delay="indefinite"/>
-                      </p:stCondLst>
-                      <p:childTnLst>
-                        <p:par>
-                          <p:cTn id="11" fill="hold">
-                            <p:stCondLst>
-                              <p:cond delay="0"/>
-                            </p:stCondLst>
-                            <p:childTnLst>
-                              <p:par>
-                                <p:cTn id="12" presetID="2" presetClass="entr" presetSubtype="4" fill="hold" nodeType="clickEffect">
-                                  <p:stCondLst>
-                                    <p:cond delay="0"/>
-                                  </p:stCondLst>
-                                  <p:childTnLst>
-                                    <p:set>
-                                      <p:cBhvr>
-                                        <p:cTn id="13" dur="1" fill="hold">
-                                          <p:stCondLst>
-                                            <p:cond delay="0"/>
-                                          </p:stCondLst>
-                                        </p:cTn>
-                                        <p:tgtEl>
-                                          <p:spTgt spid="3">
-                                            <p:txEl>
-                                              <p:pRg st="9" end="9"/>
-                                            </p:txEl>
-                                          </p:spTgt>
-                                        </p:tgtEl>
-                                        <p:attrNameLst>
-                                          <p:attrName>style.visibility</p:attrName>
-                                        </p:attrNameLst>
-                                      </p:cBhvr>
-                                      <p:to>
-                                        <p:strVal val="visible"/>
-                                      </p:to>
-                                    </p:set>
-                                    <p:anim calcmode="lin" valueType="num">
-                                      <p:cBhvr additive="base">
-                                        <p:cTn id="14" dur="500" fill="hold"/>
-                                        <p:tgtEl>
-                                          <p:spTgt spid="3">
-                                            <p:txEl>
-                                              <p:pRg st="9" end="9"/>
-                                            </p:txEl>
-                                          </p:spTgt>
-                                        </p:tgtEl>
-                                        <p:attrNameLst>
-                                          <p:attrName>ppt_x</p:attrName>
-                                        </p:attrNameLst>
-                                      </p:cBhvr>
-                                      <p:tavLst>
-                                        <p:tav tm="0">
-                                          <p:val>
-                                            <p:strVal val="#ppt_x"/>
-                                          </p:val>
-                                        </p:tav>
-                                        <p:tav tm="100000">
-                                          <p:val>
-                                            <p:strVal val="#ppt_x"/>
-                                          </p:val>
-                                        </p:tav>
-                                      </p:tavLst>
-                                    </p:anim>
-                                    <p:anim calcmode="lin" valueType="num">
-                                      <p:cBhvr additive="base">
-                                        <p:cTn id="15" dur="500" fill="hold"/>
-                                        <p:tgtEl>
-                                          <p:spTgt spid="3">
-                                            <p:txEl>
-                                              <p:pRg st="9" end="9"/>
-                                            </p:txEl>
-                                          </p:spTgt>
-                                        </p:tgtEl>
-                                        <p:attrNameLst>
-                                          <p:attrName>ppt_y</p:attrName>
-                                        </p:attrNameLst>
-                                      </p:cBhvr>
-                                      <p:tavLst>
-                                        <p:tav tm="0">
-                                          <p:val>
-                                            <p:strVal val="1+#ppt_h/2"/>
-                                          </p:val>
-                                        </p:tav>
-                                        <p:tav tm="100000">
-                                          <p:val>
-                                            <p:strVal val="#ppt_y"/>
-                                          </p:val>
-                                        </p:tav>
-                                      </p:tavLst>
-                                    </p:anim>
-                                  </p:childTnLst>
-                                </p:cTn>
-                              </p:par>
-                              <p:par>
-                                <p:cTn id="16" presetID="2" presetClass="entr" presetSubtype="4" fill="hold" grpId="0" nodeType="withEffect">
-                                  <p:stCondLst>
-                                    <p:cond delay="0"/>
-                                  </p:stCondLst>
-                                  <p:childTnLst>
-                                    <p:set>
-                                      <p:cBhvr>
-                                        <p:cTn id="17" dur="1" fill="hold">
-                                          <p:stCondLst>
-                                            <p:cond delay="0"/>
-                                          </p:stCondLst>
-                                        </p:cTn>
-                                        <p:tgtEl>
-                                          <p:spTgt spid="8"/>
-                                        </p:tgtEl>
-                                        <p:attrNameLst>
-                                          <p:attrName>style.visibility</p:attrName>
-                                        </p:attrNameLst>
-                                      </p:cBhvr>
-                                      <p:to>
-                                        <p:strVal val="visible"/>
-                                      </p:to>
-                                    </p:set>
-                                    <p:anim calcmode="lin" valueType="num">
-                                      <p:cBhvr additive="base">
-                                        <p:cTn id="18" dur="500" fill="hold"/>
-                                        <p:tgtEl>
-                                          <p:spTgt spid="8"/>
-                                        </p:tgtEl>
-                                        <p:attrNameLst>
-                                          <p:attrName>ppt_x</p:attrName>
-                                        </p:attrNameLst>
-                                      </p:cBhvr>
-                                      <p:tavLst>
-                                        <p:tav tm="0">
-                                          <p:val>
-                                            <p:strVal val="#ppt_x"/>
-                                          </p:val>
-                                        </p:tav>
-                                        <p:tav tm="100000">
-                                          <p:val>
-                                            <p:strVal val="#ppt_x"/>
-                                          </p:val>
-                                        </p:tav>
-                                      </p:tavLst>
-                                    </p:anim>
-                                    <p:anim calcmode="lin" valueType="num">
-                                      <p:cBhvr additive="base">
-                                        <p:cTn id="19" dur="500" fill="hold"/>
-                                        <p:tgtEl>
-                                          <p:spTgt spid="8"/>
-                                        </p:tgtEl>
-                                        <p:attrNameLst>
-                                          <p:attrName>ppt_y</p:attrName>
-                                        </p:attrNameLst>
-                                      </p:cBhvr>
-                                      <p:tavLst>
-                                        <p:tav tm="0">
-                                          <p:val>
-                                            <p:strVal val="1+#ppt_h/2"/>
-                                          </p:val>
-                                        </p:tav>
-                                        <p:tav tm="100000">
-                                          <p:val>
-                                            <p:strVal val="#ppt_y"/>
-                                          </p:val>
-                                        </p:tav>
-                                      </p:tavLst>
-                                    </p:anim>
-                                  </p:childTnLst>
-                                </p:cTn>
-                              </p:par>
-                              <p:par>
-                                <p:cTn id="20" presetID="2" presetClass="entr" presetSubtype="4" fill="hold" nodeType="withEffect">
-                                  <p:stCondLst>
-                                    <p:cond delay="0"/>
-                                  </p:stCondLst>
-                                  <p:childTnLst>
-                                    <p:set>
-                                      <p:cBhvr>
-                                        <p:cTn id="21" dur="1" fill="hold">
-                                          <p:stCondLst>
-                                            <p:cond delay="0"/>
-                                          </p:stCondLst>
-                                        </p:cTn>
-                                        <p:tgtEl>
-                                          <p:spTgt spid="10"/>
-                                        </p:tgtEl>
-                                        <p:attrNameLst>
-                                          <p:attrName>style.visibility</p:attrName>
-                                        </p:attrNameLst>
-                                      </p:cBhvr>
-                                      <p:to>
-                                        <p:strVal val="visible"/>
-                                      </p:to>
-                                    </p:set>
-                                    <p:anim calcmode="lin" valueType="num">
-                                      <p:cBhvr additive="base">
-                                        <p:cTn id="22" dur="500" fill="hold"/>
-                                        <p:tgtEl>
-                                          <p:spTgt spid="10"/>
-                                        </p:tgtEl>
-                                        <p:attrNameLst>
-                                          <p:attrName>ppt_x</p:attrName>
-                                        </p:attrNameLst>
-                                      </p:cBhvr>
-                                      <p:tavLst>
-                                        <p:tav tm="0">
-                                          <p:val>
-                                            <p:strVal val="#ppt_x"/>
-                                          </p:val>
-                                        </p:tav>
-                                        <p:tav tm="100000">
-                                          <p:val>
-                                            <p:strVal val="#ppt_x"/>
-                                          </p:val>
-                                        </p:tav>
-                                      </p:tavLst>
-                                    </p:anim>
-                                    <p:anim calcmode="lin" valueType="num">
-                                      <p:cBhvr additive="base">
-                                        <p:cTn id="23" dur="500" fill="hold"/>
-                                        <p:tgtEl>
-                                          <p:spTgt spid="10"/>
-                                        </p:tgtEl>
-                                        <p:attrNameLst>
-                                          <p:attrName>ppt_y</p:attrName>
-                                        </p:attrNameLst>
-                                      </p:cBhvr>
-                                      <p:tavLst>
-                                        <p:tav tm="0">
-                                          <p:val>
-                                            <p:strVal val="1+#ppt_h/2"/>
-                                          </p:val>
-                                        </p:tav>
-                                        <p:tav tm="100000">
-                                          <p:val>
-                                            <p:strVal val="#ppt_y"/>
-                                          </p:val>
-                                        </p:tav>
-                                      </p:tavLst>
-                                    </p:anim>
-                                  </p:childTnLst>
-                                </p:cTn>
-                              </p:par>
-                            </p:childTnLst>
-                          </p:cTn>
-                        </p:par>
-                      </p:childTnLst>
-                    </p:cTn>
-                  </p:par>
-                  <p:par>
-                    <p:cTn id="24" fill="hold">
-                      <p:stCondLst>
-                        <p:cond delay="indefinite"/>
-                      </p:stCondLst>
-                      <p:childTnLst>
-                        <p:par>
-                          <p:cTn id="25" fill="hold">
-                            <p:stCondLst>
-                              <p:cond delay="0"/>
-                            </p:stCondLst>
-                            <p:childTnLst>
-                              <p:par>
-                                <p:cTn id="26" presetID="10" presetClass="entr" presetSubtype="0" fill="hold" nodeType="clickEffect">
-                                  <p:stCondLst>
-                                    <p:cond delay="0"/>
-                                  </p:stCondLst>
-                                  <p:childTnLst>
-                                    <p:set>
-                                      <p:cBhvr>
-                                        <p:cTn id="27" dur="1" fill="hold">
-                                          <p:stCondLst>
-                                            <p:cond delay="0"/>
-                                          </p:stCondLst>
-                                        </p:cTn>
-                                        <p:tgtEl>
-                                          <p:spTgt spid="5"/>
-                                        </p:tgtEl>
-                                        <p:attrNameLst>
-                                          <p:attrName>style.visibility</p:attrName>
-                                        </p:attrNameLst>
-                                      </p:cBhvr>
-                                      <p:to>
-                                        <p:strVal val="visible"/>
-                                      </p:to>
-                                    </p:set>
-                                    <p:animEffect transition="in" filter="fade">
-                                      <p:cBhvr>
-                                        <p:cTn id="28" dur="500"/>
-                                        <p:tgtEl>
-                                          <p:spTgt spid="5"/>
-                                        </p:tgtEl>
-                                      </p:cBhvr>
-                                    </p:animEffect>
-                                  </p:childTnLst>
-                                </p:cTn>
-                              </p:par>
-                            </p:childTnLst>
-                          </p:cTn>
-                        </p:par>
-                      </p:childTnLst>
-                    </p:cTn>
-                  </p:par>
-                  <p:par>
-                    <p:cTn id="29" fill="hold">
-                      <p:stCondLst>
-                        <p:cond delay="indefinite"/>
-                      </p:stCondLst>
-                      <p:childTnLst>
-                        <p:par>
-                          <p:cTn id="30" fill="hold">
-                            <p:stCondLst>
-                              <p:cond delay="0"/>
-                            </p:stCondLst>
-                            <p:childTnLst>
-                              <p:par>
-                                <p:cTn id="31" presetID="2" presetClass="entr" presetSubtype="4" fill="hold" nodeType="clickEffect">
-                                  <p:stCondLst>
-                                    <p:cond delay="0"/>
-                                  </p:stCondLst>
-                                  <p:childTnLst>
-                                    <p:set>
-                                      <p:cBhvr>
-                                        <p:cTn id="32" dur="1" fill="hold">
-                                          <p:stCondLst>
-                                            <p:cond delay="0"/>
-                                          </p:stCondLst>
-                                        </p:cTn>
-                                        <p:tgtEl>
-                                          <p:spTgt spid="13"/>
-                                        </p:tgtEl>
-                                        <p:attrNameLst>
-                                          <p:attrName>style.visibility</p:attrName>
-                                        </p:attrNameLst>
-                                      </p:cBhvr>
-                                      <p:to>
-                                        <p:strVal val="visible"/>
-                                      </p:to>
-                                    </p:set>
-                                    <p:anim calcmode="lin" valueType="num">
-                                      <p:cBhvr additive="base">
-                                        <p:cTn id="33" dur="500" fill="hold"/>
-                                        <p:tgtEl>
-                                          <p:spTgt spid="13"/>
-                                        </p:tgtEl>
-                                        <p:attrNameLst>
-                                          <p:attrName>ppt_x</p:attrName>
-                                        </p:attrNameLst>
-                                      </p:cBhvr>
-                                      <p:tavLst>
-                                        <p:tav tm="0">
-                                          <p:val>
-                                            <p:strVal val="#ppt_x"/>
-                                          </p:val>
-                                        </p:tav>
-                                        <p:tav tm="100000">
-                                          <p:val>
-                                            <p:strVal val="#ppt_x"/>
-                                          </p:val>
-                                        </p:tav>
-                                      </p:tavLst>
-                                    </p:anim>
-                                    <p:anim calcmode="lin" valueType="num">
-                                      <p:cBhvr additive="base">
-                                        <p:cTn id="34" dur="500" fill="hold"/>
-                                        <p:tgtEl>
-                                          <p:spTgt spid="13"/>
-                                        </p:tgtEl>
-                                        <p:attrNameLst>
-                                          <p:attrName>ppt_y</p:attrName>
-                                        </p:attrNameLst>
-                                      </p:cBhvr>
-                                      <p:tavLst>
-                                        <p:tav tm="0">
-                                          <p:val>
-                                            <p:strVal val="1+#ppt_h/2"/>
-                                          </p:val>
-                                        </p:tav>
-                                        <p:tav tm="100000">
-                                          <p:val>
-                                            <p:strVal val="#ppt_y"/>
-                                          </p:val>
-                                        </p:tav>
-                                      </p:tavLst>
-                                    </p:anim>
-                                  </p:childTnLst>
-                                </p:cTn>
-                              </p:par>
-                              <p:par>
-                                <p:cTn id="35" presetID="2" presetClass="entr" presetSubtype="4" fill="hold" grpId="0" nodeType="withEffect">
-                                  <p:stCondLst>
-                                    <p:cond delay="0"/>
-                                  </p:stCondLst>
-                                  <p:childTnLst>
-                                    <p:set>
-                                      <p:cBhvr>
-                                        <p:cTn id="36" dur="1" fill="hold">
-                                          <p:stCondLst>
-                                            <p:cond delay="0"/>
-                                          </p:stCondLst>
-                                        </p:cTn>
-                                        <p:tgtEl>
-                                          <p:spTgt spid="11"/>
-                                        </p:tgtEl>
-                                        <p:attrNameLst>
-                                          <p:attrName>style.visibility</p:attrName>
-                                        </p:attrNameLst>
-                                      </p:cBhvr>
-                                      <p:to>
-                                        <p:strVal val="visible"/>
-                                      </p:to>
-                                    </p:set>
-                                    <p:anim calcmode="lin" valueType="num">
-                                      <p:cBhvr additive="base">
-                                        <p:cTn id="37" dur="500" fill="hold"/>
-                                        <p:tgtEl>
-                                          <p:spTgt spid="11"/>
-                                        </p:tgtEl>
-                                        <p:attrNameLst>
-                                          <p:attrName>ppt_x</p:attrName>
-                                        </p:attrNameLst>
-                                      </p:cBhvr>
-                                      <p:tavLst>
-                                        <p:tav tm="0">
-                                          <p:val>
-                                            <p:strVal val="#ppt_x"/>
-                                          </p:val>
-                                        </p:tav>
-                                        <p:tav tm="100000">
-                                          <p:val>
-                                            <p:strVal val="#ppt_x"/>
-                                          </p:val>
-                                        </p:tav>
-                                      </p:tavLst>
-                                    </p:anim>
-                                    <p:anim calcmode="lin" valueType="num">
-                                      <p:cBhvr additive="base">
-                                        <p:cTn id="38" dur="500" fill="hold"/>
-                                        <p:tgtEl>
-                                          <p:spTgt spid="11"/>
-                                        </p:tgtEl>
-                                        <p:attrNameLst>
-                                          <p:attrName>ppt_y</p:attrName>
-                                        </p:attrNameLst>
-                                      </p:cBhvr>
-                                      <p:tavLst>
-                                        <p:tav tm="0">
-                                          <p:val>
-                                            <p:strVal val="1+#ppt_h/2"/>
-                                          </p:val>
-                                        </p:tav>
-                                        <p:tav tm="100000">
-                                          <p:val>
-                                            <p:strVal val="#ppt_y"/>
-                                          </p:val>
-                                        </p:tav>
-                                      </p:tavLst>
-                                    </p:anim>
-                                  </p:childTnLst>
-                                </p:cTn>
-                              </p:par>
-                              <p:par>
-                                <p:cTn id="39" presetID="2" presetClass="entr" presetSubtype="4" fill="hold" nodeType="withEffect">
-                                  <p:stCondLst>
-                                    <p:cond delay="0"/>
-                                  </p:stCondLst>
-                                  <p:childTnLst>
-                                    <p:set>
-                                      <p:cBhvr>
-                                        <p:cTn id="40" dur="1" fill="hold">
-                                          <p:stCondLst>
-                                            <p:cond delay="0"/>
-                                          </p:stCondLst>
-                                        </p:cTn>
-                                        <p:tgtEl>
-                                          <p:spTgt spid="6">
-                                            <p:txEl>
-                                              <p:pRg st="9" end="9"/>
-                                            </p:txEl>
-                                          </p:spTgt>
-                                        </p:tgtEl>
-                                        <p:attrNameLst>
-                                          <p:attrName>style.visibility</p:attrName>
-                                        </p:attrNameLst>
-                                      </p:cBhvr>
-                                      <p:to>
-                                        <p:strVal val="visible"/>
-                                      </p:to>
-                                    </p:set>
-                                    <p:anim calcmode="lin" valueType="num">
-                                      <p:cBhvr additive="base">
-                                        <p:cTn id="41" dur="500" fill="hold"/>
-                                        <p:tgtEl>
-                                          <p:spTgt spid="6">
-                                            <p:txEl>
-                                              <p:pRg st="9" end="9"/>
-                                            </p:txEl>
-                                          </p:spTgt>
-                                        </p:tgtEl>
-                                        <p:attrNameLst>
-                                          <p:attrName>ppt_x</p:attrName>
-                                        </p:attrNameLst>
-                                      </p:cBhvr>
-                                      <p:tavLst>
-                                        <p:tav tm="0">
-                                          <p:val>
-                                            <p:strVal val="#ppt_x"/>
-                                          </p:val>
-                                        </p:tav>
-                                        <p:tav tm="100000">
-                                          <p:val>
-                                            <p:strVal val="#ppt_x"/>
-                                          </p:val>
-                                        </p:tav>
-                                      </p:tavLst>
-                                    </p:anim>
-                                    <p:anim calcmode="lin" valueType="num">
-                                      <p:cBhvr additive="base">
-                                        <p:cTn id="42" dur="500" fill="hold"/>
-                                        <p:tgtEl>
-                                          <p:spTgt spid="6">
-                                            <p:txEl>
-                                              <p:pRg st="9" end="9"/>
-                                            </p:txEl>
-                                          </p:spTgt>
-                                        </p:tgtEl>
-                                        <p:attrNameLst>
-                                          <p:attrName>ppt_y</p:attrName>
-                                        </p:attrNameLst>
-                                      </p:cBhvr>
-                                      <p:tavLst>
-                                        <p:tav tm="0">
-                                          <p:val>
-                                            <p:strVal val="1+#ppt_h/2"/>
-                                          </p:val>
-                                        </p:tav>
-                                        <p:tav tm="100000">
-                                          <p:val>
-                                            <p:strVal val="#ppt_y"/>
-                                          </p:val>
-                                        </p:tav>
-                                      </p:tavLst>
-                                    </p:anim>
-                                  </p:childTnLst>
-                                </p:cTn>
-                              </p:par>
-                            </p:childTnLst>
-                          </p:cTn>
-                        </p:par>
-                      </p:childTnLst>
-                    </p:cTn>
-                  </p:par>
-                </p:childTnLst>
-              </p:cTn>
-              <p:prevCondLst>
-                <p:cond evt="onPrev" delay="0">
-                  <p:tgtEl>
-                    <p:sldTgt/>
-                  </p:tgtEl>
-                </p:cond>
-              </p:prevCondLst>
-              <p:nextCondLst>
-                <p:cond evt="onNext" delay="0">
-                  <p:tgtEl>
-                    <p:sldTgt/>
-                  </p:tgtEl>
-                </p:cond>
-              </p:nextCondLst>
-            </p:seq>
-          </p:childTnLst>
-        </p:cTn>
-      </p:par>
-    </p:tnLst>
-    <p:bldLst>
-      <p:bldP spid="8" grpId="0" animBg="1"/>
-      <p:bldP spid="11" grpId="0" animBg="1"/>
-    </p:bldLst>
-  </p:timing>
-</p:sld>
-</file>
-
-<file path=ppt/slides/slide18.xml><?xml version="1.0" encoding="utf-8"?>
-<p:sld xmlns:a="http://schemas.openxmlformats.org/drawingml/2006/main" xmlns:r="http://schemas.openxmlformats.org/officeDocument/2006/relationships" xmlns:p="http://schemas.openxmlformats.org/presentationml/2006/main">
-  <p:cSld>
-    <p:spTree>
-      <p:nvGrpSpPr>
-        <p:cNvPr id="1" name=""/>
-        <p:cNvGrpSpPr/>
-        <p:nvPr/>
-      </p:nvGrpSpPr>
-      <p:grpSpPr>
-        <a:xfrm>
-          <a:off x="0" y="0"/>
-          <a:ext cx="0" cy="0"/>
-          <a:chOff x="0" y="0"/>
-          <a:chExt cx="0" cy="0"/>
-        </a:xfrm>
-      </p:grpSpPr>
-      <p:sp>
-        <p:nvSpPr>
-          <p:cNvPr id="2" name="Title 1"/>
-          <p:cNvSpPr>
-            <a:spLocks noGrp="1"/>
-          </p:cNvSpPr>
-          <p:nvPr>
-            <p:ph type="title"/>
-          </p:nvPr>
-        </p:nvSpPr>
-        <p:spPr>
-          <a:xfrm>
             <a:off x="685800" y="304800"/>
             <a:ext cx="7772400" cy="762000"/>
           </a:xfrm>
@@ -21567,7 +19878,7 @@
           <a:p>
             <a:r>
               <a:rPr lang="en-US" dirty="0"/>
-              <a:t>Example 8.1 </a:t>
+              <a:t>Example 2 </a:t>
             </a:r>
             <a:r>
               <a:rPr lang="en-US" dirty="0" err="1"/>
@@ -23160,7 +21471,7 @@
           <a:p>
             <a:fld id="{A9A949EE-02F8-4E24-B346-EA33FC0EA551}" type="slidenum">
               <a:rPr lang="en-US" smtClean="0"/>
-              <a:t>18</a:t>
+              <a:t>17</a:t>
             </a:fld>
             <a:endParaRPr lang="en-US"/>
           </a:p>
@@ -23744,7 +22055,7 @@
 </p:sld>
 </file>
 
-<file path=ppt/slides/slide19.xml><?xml version="1.0" encoding="utf-8"?>
+<file path=ppt/slides/slide18.xml><?xml version="1.0" encoding="utf-8"?>
 <p:sld xmlns:a="http://schemas.openxmlformats.org/drawingml/2006/main" xmlns:r="http://schemas.openxmlformats.org/officeDocument/2006/relationships" xmlns:p="http://schemas.openxmlformats.org/presentationml/2006/main">
   <p:cSld>
     <p:spTree>
@@ -23783,7 +22094,7 @@
           <a:p>
             <a:r>
               <a:rPr lang="en-US" dirty="0"/>
-              <a:t>Example 8.1 </a:t>
+              <a:t>Example 2 </a:t>
             </a:r>
             <a:r>
               <a:rPr lang="en-US" dirty="0" err="1"/>
@@ -24872,7 +23183,7 @@
           <a:p>
             <a:fld id="{A9A949EE-02F8-4E24-B346-EA33FC0EA551}" type="slidenum">
               <a:rPr lang="en-US" smtClean="0"/>
-              <a:t>19</a:t>
+              <a:t>18</a:t>
             </a:fld>
             <a:endParaRPr lang="en-US"/>
           </a:p>
@@ -25539,6 +23850,544 @@
                                               <p:pRg st="11" end="11"/>
                                             </p:txEl>
                                           </p:spTgt>
+                                        </p:tgtEl>
+                                      </p:cBhvr>
+                                    </p:animEffect>
+                                  </p:childTnLst>
+                                </p:cTn>
+                              </p:par>
+                            </p:childTnLst>
+                          </p:cTn>
+                        </p:par>
+                      </p:childTnLst>
+                    </p:cTn>
+                  </p:par>
+                </p:childTnLst>
+              </p:cTn>
+              <p:prevCondLst>
+                <p:cond evt="onPrev" delay="0">
+                  <p:tgtEl>
+                    <p:sldTgt/>
+                  </p:tgtEl>
+                </p:cond>
+              </p:prevCondLst>
+              <p:nextCondLst>
+                <p:cond evt="onNext" delay="0">
+                  <p:tgtEl>
+                    <p:sldTgt/>
+                  </p:tgtEl>
+                </p:cond>
+              </p:nextCondLst>
+            </p:seq>
+          </p:childTnLst>
+        </p:cTn>
+      </p:par>
+    </p:tnLst>
+  </p:timing>
+</p:sld>
+</file>
+
+<file path=ppt/slides/slide19.xml><?xml version="1.0" encoding="utf-8"?>
+<p:sld xmlns:a="http://schemas.openxmlformats.org/drawingml/2006/main" xmlns:r="http://schemas.openxmlformats.org/officeDocument/2006/relationships" xmlns:p="http://schemas.openxmlformats.org/presentationml/2006/main">
+  <p:cSld>
+    <p:spTree>
+      <p:nvGrpSpPr>
+        <p:cNvPr id="1" name=""/>
+        <p:cNvGrpSpPr/>
+        <p:nvPr/>
+      </p:nvGrpSpPr>
+      <p:grpSpPr>
+        <a:xfrm>
+          <a:off x="0" y="0"/>
+          <a:ext cx="0" cy="0"/>
+          <a:chOff x="0" y="0"/>
+          <a:chExt cx="0" cy="0"/>
+        </a:xfrm>
+      </p:grpSpPr>
+      <p:sp>
+        <p:nvSpPr>
+          <p:cNvPr id="2" name="Title 1"/>
+          <p:cNvSpPr>
+            <a:spLocks noGrp="1"/>
+          </p:cNvSpPr>
+          <p:nvPr>
+            <p:ph type="title"/>
+          </p:nvPr>
+        </p:nvSpPr>
+        <p:spPr>
+          <a:xfrm>
+            <a:off x="685800" y="228600"/>
+            <a:ext cx="7772400" cy="762000"/>
+          </a:xfrm>
+        </p:spPr>
+        <p:txBody>
+          <a:bodyPr/>
+          <a:lstStyle/>
+          <a:p>
+            <a:r>
+              <a:rPr lang="en-US" dirty="0"/>
+              <a:t>Example 8.1 </a:t>
+            </a:r>
+            <a:r>
+              <a:rPr lang="en-US" dirty="0" err="1"/>
+              <a:t>Anova</a:t>
+            </a:r>
+            <a:r>
+              <a:rPr lang="en-US" dirty="0"/>
+              <a:t> table</a:t>
+            </a:r>
+          </a:p>
+        </p:txBody>
+      </p:sp>
+      <p:sp>
+        <p:nvSpPr>
+          <p:cNvPr id="3" name="Content Placeholder 2"/>
+          <p:cNvSpPr>
+            <a:spLocks noGrp="1"/>
+          </p:cNvSpPr>
+          <p:nvPr>
+            <p:ph idx="1"/>
+          </p:nvPr>
+        </p:nvSpPr>
+        <p:spPr>
+          <a:xfrm>
+            <a:off x="685800" y="1219200"/>
+            <a:ext cx="7772400" cy="4495800"/>
+          </a:xfrm>
+        </p:spPr>
+        <p:txBody>
+          <a:bodyPr/>
+          <a:lstStyle/>
+          <a:p>
+            <a:endParaRPr lang="en-US" dirty="0"/>
+          </a:p>
+          <a:p>
+            <a:endParaRPr lang="en-US" dirty="0"/>
+          </a:p>
+          <a:p>
+            <a:endParaRPr lang="en-US" dirty="0"/>
+          </a:p>
+          <a:p>
+            <a:endParaRPr lang="en-US" dirty="0"/>
+          </a:p>
+          <a:p>
+            <a:endParaRPr lang="en-US" dirty="0"/>
+          </a:p>
+          <a:p>
+            <a:r>
+              <a:rPr lang="en-US" dirty="0"/>
+              <a:t>In R</a:t>
+            </a:r>
+          </a:p>
+          <a:p>
+            <a:pPr lvl="1" indent="-342900">
+              <a:buFont typeface="Wingdings" panose="05000000000000000000" pitchFamily="2" charset="2"/>
+              <a:buChar char="Ø"/>
+            </a:pPr>
+            <a:r>
+              <a:rPr lang="en-US" sz="2400" dirty="0">
+                <a:latin typeface="Calibri" panose="020F0502020204030204" pitchFamily="34" charset="0"/>
+                <a:ea typeface="Calibri" panose="020F0502020204030204" pitchFamily="34" charset="0"/>
+                <a:cs typeface="Calibri" panose="020F0502020204030204" pitchFamily="34" charset="0"/>
+              </a:rPr>
+              <a:t>summary(</a:t>
+            </a:r>
+            <a:r>
+              <a:rPr lang="en-US" sz="2400" dirty="0" err="1">
+                <a:latin typeface="Calibri" panose="020F0502020204030204" pitchFamily="34" charset="0"/>
+                <a:ea typeface="Calibri" panose="020F0502020204030204" pitchFamily="34" charset="0"/>
+                <a:cs typeface="Calibri" panose="020F0502020204030204" pitchFamily="34" charset="0"/>
+              </a:rPr>
+              <a:t>aov</a:t>
+            </a:r>
+            <a:r>
+              <a:rPr lang="en-US" sz="2400" dirty="0">
+                <a:latin typeface="Calibri" panose="020F0502020204030204" pitchFamily="34" charset="0"/>
+                <a:ea typeface="Calibri" panose="020F0502020204030204" pitchFamily="34" charset="0"/>
+                <a:cs typeface="Calibri" panose="020F0502020204030204" pitchFamily="34" charset="0"/>
+              </a:rPr>
+              <a:t>(</a:t>
+            </a:r>
+            <a:r>
+              <a:rPr lang="en-US" sz="2400" dirty="0" err="1">
+                <a:latin typeface="Calibri" panose="020F0502020204030204" pitchFamily="34" charset="0"/>
+                <a:ea typeface="Calibri" panose="020F0502020204030204" pitchFamily="34" charset="0"/>
+                <a:cs typeface="Calibri" panose="020F0502020204030204" pitchFamily="34" charset="0"/>
+              </a:rPr>
+              <a:t>isof</a:t>
+            </a:r>
+            <a:r>
+              <a:rPr lang="en-US" sz="2400" dirty="0">
+                <a:latin typeface="Calibri" panose="020F0502020204030204" pitchFamily="34" charset="0"/>
+                <a:ea typeface="Calibri" panose="020F0502020204030204" pitchFamily="34" charset="0"/>
+                <a:cs typeface="Calibri" panose="020F0502020204030204" pitchFamily="34" charset="0"/>
+              </a:rPr>
+              <a:t> ~ source, data=exmp8.1))</a:t>
+            </a:r>
+          </a:p>
+          <a:p>
+            <a:pPr marL="400050" lvl="1" indent="0">
+              <a:buNone/>
+            </a:pPr>
+            <a:endParaRPr lang="en-US" dirty="0"/>
+          </a:p>
+        </p:txBody>
+      </p:sp>
+      <p:sp>
+        <p:nvSpPr>
+          <p:cNvPr id="4" name="Slide Number Placeholder 3"/>
+          <p:cNvSpPr>
+            <a:spLocks noGrp="1"/>
+          </p:cNvSpPr>
+          <p:nvPr>
+            <p:ph type="sldNum" sz="quarter" idx="4"/>
+          </p:nvPr>
+        </p:nvSpPr>
+        <p:spPr/>
+        <p:txBody>
+          <a:bodyPr/>
+          <a:lstStyle/>
+          <a:p>
+            <a:fld id="{A9A949EE-02F8-4E24-B346-EA33FC0EA551}" type="slidenum">
+              <a:rPr lang="en-US" smtClean="0"/>
+              <a:t>19</a:t>
+            </a:fld>
+            <a:endParaRPr lang="en-US"/>
+          </a:p>
+        </p:txBody>
+      </p:sp>
+      <p:pic>
+        <p:nvPicPr>
+          <p:cNvPr id="15" name="Content Placeholder 13"/>
+          <p:cNvPicPr>
+            <a:picLocks noChangeAspect="1"/>
+          </p:cNvPicPr>
+          <p:nvPr/>
+        </p:nvPicPr>
+        <p:blipFill>
+          <a:blip r:embed="rId2"/>
+          <a:stretch>
+            <a:fillRect/>
+          </a:stretch>
+        </p:blipFill>
+        <p:spPr bwMode="auto">
+          <a:xfrm>
+            <a:off x="1819656" y="1295400"/>
+            <a:ext cx="5504688" cy="1829683"/>
+          </a:xfrm>
+          <a:prstGeom prst="rect">
+            <a:avLst/>
+          </a:prstGeom>
+          <a:noFill/>
+          <a:ln>
+            <a:noFill/>
+          </a:ln>
+          <a:extLst>
+            <a:ext uri="{909E8E84-426E-40DD-AFC4-6F175D3DCCD1}">
+              <a14:hiddenFill xmlns:a14="http://schemas.microsoft.com/office/drawing/2010/main">
+                <a:solidFill>
+                  <a:srgbClr val="FFFFFF"/>
+                </a:solidFill>
+              </a14:hiddenFill>
+            </a:ext>
+            <a:ext uri="{91240B29-F687-4F45-9708-019B960494DF}">
+              <a14:hiddenLine xmlns:a14="http://schemas.microsoft.com/office/drawing/2010/main" w="9525">
+                <a:solidFill>
+                  <a:srgbClr val="000000"/>
+                </a:solidFill>
+                <a:miter lim="800000"/>
+                <a:headEnd/>
+                <a:tailEnd/>
+              </a14:hiddenLine>
+            </a:ext>
+          </a:extLst>
+        </p:spPr>
+      </p:pic>
+      <p:pic>
+        <p:nvPicPr>
+          <p:cNvPr id="17" name="Picture 16"/>
+          <p:cNvPicPr>
+            <a:picLocks noChangeAspect="1"/>
+          </p:cNvPicPr>
+          <p:nvPr/>
+        </p:nvPicPr>
+        <p:blipFill>
+          <a:blip r:embed="rId3"/>
+          <a:stretch>
+            <a:fillRect/>
+          </a:stretch>
+        </p:blipFill>
+        <p:spPr>
+          <a:xfrm>
+            <a:off x="1935956" y="4648200"/>
+            <a:ext cx="5272088" cy="1828800"/>
+          </a:xfrm>
+          <a:prstGeom prst="rect">
+            <a:avLst/>
+          </a:prstGeom>
+        </p:spPr>
+      </p:pic>
+    </p:spTree>
+    <p:extLst>
+      <p:ext uri="{BB962C8B-B14F-4D97-AF65-F5344CB8AC3E}">
+        <p14:creationId xmlns:p14="http://schemas.microsoft.com/office/powerpoint/2010/main" val="2696752664"/>
+      </p:ext>
+    </p:extLst>
+  </p:cSld>
+  <p:clrMapOvr>
+    <a:masterClrMapping/>
+  </p:clrMapOvr>
+  <p:transition advClick="0"/>
+  <p:timing>
+    <p:tnLst>
+      <p:par>
+        <p:cTn id="1" dur="indefinite" restart="never" nodeType="tmRoot">
+          <p:childTnLst>
+            <p:seq concurrent="1" nextAc="seek">
+              <p:cTn id="2" dur="indefinite" nodeType="mainSeq">
+                <p:childTnLst>
+                  <p:par>
+                    <p:cTn id="3" fill="hold">
+                      <p:stCondLst>
+                        <p:cond delay="indefinite"/>
+                      </p:stCondLst>
+                      <p:childTnLst>
+                        <p:par>
+                          <p:cTn id="4" fill="hold">
+                            <p:stCondLst>
+                              <p:cond delay="0"/>
+                            </p:stCondLst>
+                            <p:childTnLst>
+                              <p:par>
+                                <p:cTn id="5" presetID="2" presetClass="entr" presetSubtype="4" fill="hold" nodeType="clickEffect">
+                                  <p:stCondLst>
+                                    <p:cond delay="0"/>
+                                  </p:stCondLst>
+                                  <p:childTnLst>
+                                    <p:set>
+                                      <p:cBhvr>
+                                        <p:cTn id="6" dur="1" fill="hold">
+                                          <p:stCondLst>
+                                            <p:cond delay="0"/>
+                                          </p:stCondLst>
+                                        </p:cTn>
+                                        <p:tgtEl>
+                                          <p:spTgt spid="3">
+                                            <p:txEl>
+                                              <p:pRg st="5" end="5"/>
+                                            </p:txEl>
+                                          </p:spTgt>
+                                        </p:tgtEl>
+                                        <p:attrNameLst>
+                                          <p:attrName>style.visibility</p:attrName>
+                                        </p:attrNameLst>
+                                      </p:cBhvr>
+                                      <p:to>
+                                        <p:strVal val="visible"/>
+                                      </p:to>
+                                    </p:set>
+                                    <p:anim calcmode="lin" valueType="num">
+                                      <p:cBhvr additive="base">
+                                        <p:cTn id="7" dur="500" fill="hold"/>
+                                        <p:tgtEl>
+                                          <p:spTgt spid="3">
+                                            <p:txEl>
+                                              <p:pRg st="5" end="5"/>
+                                            </p:txEl>
+                                          </p:spTgt>
+                                        </p:tgtEl>
+                                        <p:attrNameLst>
+                                          <p:attrName>ppt_x</p:attrName>
+                                        </p:attrNameLst>
+                                      </p:cBhvr>
+                                      <p:tavLst>
+                                        <p:tav tm="0">
+                                          <p:val>
+                                            <p:strVal val="#ppt_x"/>
+                                          </p:val>
+                                        </p:tav>
+                                        <p:tav tm="100000">
+                                          <p:val>
+                                            <p:strVal val="#ppt_x"/>
+                                          </p:val>
+                                        </p:tav>
+                                      </p:tavLst>
+                                    </p:anim>
+                                    <p:anim calcmode="lin" valueType="num">
+                                      <p:cBhvr additive="base">
+                                        <p:cTn id="8" dur="500" fill="hold"/>
+                                        <p:tgtEl>
+                                          <p:spTgt spid="3">
+                                            <p:txEl>
+                                              <p:pRg st="5" end="5"/>
+                                            </p:txEl>
+                                          </p:spTgt>
+                                        </p:tgtEl>
+                                        <p:attrNameLst>
+                                          <p:attrName>ppt_y</p:attrName>
+                                        </p:attrNameLst>
+                                      </p:cBhvr>
+                                      <p:tavLst>
+                                        <p:tav tm="0">
+                                          <p:val>
+                                            <p:strVal val="1+#ppt_h/2"/>
+                                          </p:val>
+                                        </p:tav>
+                                        <p:tav tm="100000">
+                                          <p:val>
+                                            <p:strVal val="#ppt_y"/>
+                                          </p:val>
+                                        </p:tav>
+                                      </p:tavLst>
+                                    </p:anim>
+                                  </p:childTnLst>
+                                </p:cTn>
+                              </p:par>
+                            </p:childTnLst>
+                          </p:cTn>
+                        </p:par>
+                        <p:par>
+                          <p:cTn id="9" fill="hold">
+                            <p:stCondLst>
+                              <p:cond delay="500"/>
+                            </p:stCondLst>
+                            <p:childTnLst>
+                              <p:par>
+                                <p:cTn id="10" presetID="10" presetClass="entr" presetSubtype="0" fill="hold" nodeType="afterEffect">
+                                  <p:stCondLst>
+                                    <p:cond delay="0"/>
+                                  </p:stCondLst>
+                                  <p:childTnLst>
+                                    <p:set>
+                                      <p:cBhvr>
+                                        <p:cTn id="11" dur="1" fill="hold">
+                                          <p:stCondLst>
+                                            <p:cond delay="0"/>
+                                          </p:stCondLst>
+                                        </p:cTn>
+                                        <p:tgtEl>
+                                          <p:spTgt spid="3">
+                                            <p:txEl>
+                                              <p:pRg st="6" end="6"/>
+                                            </p:txEl>
+                                          </p:spTgt>
+                                        </p:tgtEl>
+                                        <p:attrNameLst>
+                                          <p:attrName>style.visibility</p:attrName>
+                                        </p:attrNameLst>
+                                      </p:cBhvr>
+                                      <p:to>
+                                        <p:strVal val="visible"/>
+                                      </p:to>
+                                    </p:set>
+                                    <p:animEffect transition="in" filter="fade">
+                                      <p:cBhvr>
+                                        <p:cTn id="12" dur="500"/>
+                                        <p:tgtEl>
+                                          <p:spTgt spid="3">
+                                            <p:txEl>
+                                              <p:pRg st="6" end="6"/>
+                                            </p:txEl>
+                                          </p:spTgt>
+                                        </p:tgtEl>
+                                      </p:cBhvr>
+                                    </p:animEffect>
+                                  </p:childTnLst>
+                                </p:cTn>
+                              </p:par>
+                            </p:childTnLst>
+                          </p:cTn>
+                        </p:par>
+                      </p:childTnLst>
+                    </p:cTn>
+                  </p:par>
+                  <p:par>
+                    <p:cTn id="13" fill="hold">
+                      <p:stCondLst>
+                        <p:cond delay="indefinite"/>
+                      </p:stCondLst>
+                      <p:childTnLst>
+                        <p:par>
+                          <p:cTn id="14" fill="hold">
+                            <p:stCondLst>
+                              <p:cond delay="0"/>
+                            </p:stCondLst>
+                            <p:childTnLst>
+                              <p:par>
+                                <p:cTn id="15" presetID="53" presetClass="entr" presetSubtype="16" fill="hold" nodeType="clickEffect">
+                                  <p:stCondLst>
+                                    <p:cond delay="0"/>
+                                  </p:stCondLst>
+                                  <p:childTnLst>
+                                    <p:set>
+                                      <p:cBhvr>
+                                        <p:cTn id="16" dur="1" fill="hold">
+                                          <p:stCondLst>
+                                            <p:cond delay="0"/>
+                                          </p:stCondLst>
+                                        </p:cTn>
+                                        <p:tgtEl>
+                                          <p:spTgt spid="17"/>
+                                        </p:tgtEl>
+                                        <p:attrNameLst>
+                                          <p:attrName>style.visibility</p:attrName>
+                                        </p:attrNameLst>
+                                      </p:cBhvr>
+                                      <p:to>
+                                        <p:strVal val="visible"/>
+                                      </p:to>
+                                    </p:set>
+                                    <p:anim calcmode="lin" valueType="num">
+                                      <p:cBhvr>
+                                        <p:cTn id="17" dur="500" fill="hold"/>
+                                        <p:tgtEl>
+                                          <p:spTgt spid="17"/>
+                                        </p:tgtEl>
+                                        <p:attrNameLst>
+                                          <p:attrName>ppt_w</p:attrName>
+                                        </p:attrNameLst>
+                                      </p:cBhvr>
+                                      <p:tavLst>
+                                        <p:tav tm="0">
+                                          <p:val>
+                                            <p:fltVal val="0"/>
+                                          </p:val>
+                                        </p:tav>
+                                        <p:tav tm="100000">
+                                          <p:val>
+                                            <p:strVal val="#ppt_w"/>
+                                          </p:val>
+                                        </p:tav>
+                                      </p:tavLst>
+                                    </p:anim>
+                                    <p:anim calcmode="lin" valueType="num">
+                                      <p:cBhvr>
+                                        <p:cTn id="18" dur="500" fill="hold"/>
+                                        <p:tgtEl>
+                                          <p:spTgt spid="17"/>
+                                        </p:tgtEl>
+                                        <p:attrNameLst>
+                                          <p:attrName>ppt_h</p:attrName>
+                                        </p:attrNameLst>
+                                      </p:cBhvr>
+                                      <p:tavLst>
+                                        <p:tav tm="0">
+                                          <p:val>
+                                            <p:fltVal val="0"/>
+                                          </p:val>
+                                        </p:tav>
+                                        <p:tav tm="100000">
+                                          <p:val>
+                                            <p:strVal val="#ppt_h"/>
+                                          </p:val>
+                                        </p:tav>
+                                      </p:tavLst>
+                                    </p:anim>
+                                    <p:animEffect transition="in" filter="fade">
+                                      <p:cBhvr>
+                                        <p:cTn id="19" dur="500"/>
+                                        <p:tgtEl>
+                                          <p:spTgt spid="17"/>
                                         </p:tgtEl>
                                       </p:cBhvr>
                                     </p:animEffect>
@@ -26742,544 +25591,6 @@
         </p:nvSpPr>
         <p:spPr>
           <a:xfrm>
-            <a:off x="685800" y="228600"/>
-            <a:ext cx="7772400" cy="762000"/>
-          </a:xfrm>
-        </p:spPr>
-        <p:txBody>
-          <a:bodyPr/>
-          <a:lstStyle/>
-          <a:p>
-            <a:r>
-              <a:rPr lang="en-US" dirty="0"/>
-              <a:t>Example 8.1 </a:t>
-            </a:r>
-            <a:r>
-              <a:rPr lang="en-US" dirty="0" err="1"/>
-              <a:t>Anova</a:t>
-            </a:r>
-            <a:r>
-              <a:rPr lang="en-US" dirty="0"/>
-              <a:t> table</a:t>
-            </a:r>
-          </a:p>
-        </p:txBody>
-      </p:sp>
-      <p:sp>
-        <p:nvSpPr>
-          <p:cNvPr id="3" name="Content Placeholder 2"/>
-          <p:cNvSpPr>
-            <a:spLocks noGrp="1"/>
-          </p:cNvSpPr>
-          <p:nvPr>
-            <p:ph idx="1"/>
-          </p:nvPr>
-        </p:nvSpPr>
-        <p:spPr>
-          <a:xfrm>
-            <a:off x="685800" y="1219200"/>
-            <a:ext cx="7772400" cy="4495800"/>
-          </a:xfrm>
-        </p:spPr>
-        <p:txBody>
-          <a:bodyPr/>
-          <a:lstStyle/>
-          <a:p>
-            <a:endParaRPr lang="en-US" dirty="0"/>
-          </a:p>
-          <a:p>
-            <a:endParaRPr lang="en-US" dirty="0"/>
-          </a:p>
-          <a:p>
-            <a:endParaRPr lang="en-US" dirty="0"/>
-          </a:p>
-          <a:p>
-            <a:endParaRPr lang="en-US" dirty="0"/>
-          </a:p>
-          <a:p>
-            <a:endParaRPr lang="en-US" dirty="0"/>
-          </a:p>
-          <a:p>
-            <a:r>
-              <a:rPr lang="en-US" dirty="0"/>
-              <a:t>In R</a:t>
-            </a:r>
-          </a:p>
-          <a:p>
-            <a:pPr lvl="1" indent="-342900">
-              <a:buFont typeface="Wingdings" panose="05000000000000000000" pitchFamily="2" charset="2"/>
-              <a:buChar char="Ø"/>
-            </a:pPr>
-            <a:r>
-              <a:rPr lang="en-US" sz="2400" dirty="0">
-                <a:latin typeface="Calibri" panose="020F0502020204030204" pitchFamily="34" charset="0"/>
-                <a:ea typeface="Calibri" panose="020F0502020204030204" pitchFamily="34" charset="0"/>
-                <a:cs typeface="Calibri" panose="020F0502020204030204" pitchFamily="34" charset="0"/>
-              </a:rPr>
-              <a:t>summary(</a:t>
-            </a:r>
-            <a:r>
-              <a:rPr lang="en-US" sz="2400" dirty="0" err="1">
-                <a:latin typeface="Calibri" panose="020F0502020204030204" pitchFamily="34" charset="0"/>
-                <a:ea typeface="Calibri" panose="020F0502020204030204" pitchFamily="34" charset="0"/>
-                <a:cs typeface="Calibri" panose="020F0502020204030204" pitchFamily="34" charset="0"/>
-              </a:rPr>
-              <a:t>aov</a:t>
-            </a:r>
-            <a:r>
-              <a:rPr lang="en-US" sz="2400" dirty="0">
-                <a:latin typeface="Calibri" panose="020F0502020204030204" pitchFamily="34" charset="0"/>
-                <a:ea typeface="Calibri" panose="020F0502020204030204" pitchFamily="34" charset="0"/>
-                <a:cs typeface="Calibri" panose="020F0502020204030204" pitchFamily="34" charset="0"/>
-              </a:rPr>
-              <a:t>(</a:t>
-            </a:r>
-            <a:r>
-              <a:rPr lang="en-US" sz="2400" dirty="0" err="1">
-                <a:latin typeface="Calibri" panose="020F0502020204030204" pitchFamily="34" charset="0"/>
-                <a:ea typeface="Calibri" panose="020F0502020204030204" pitchFamily="34" charset="0"/>
-                <a:cs typeface="Calibri" panose="020F0502020204030204" pitchFamily="34" charset="0"/>
-              </a:rPr>
-              <a:t>isof</a:t>
-            </a:r>
-            <a:r>
-              <a:rPr lang="en-US" sz="2400" dirty="0">
-                <a:latin typeface="Calibri" panose="020F0502020204030204" pitchFamily="34" charset="0"/>
-                <a:ea typeface="Calibri" panose="020F0502020204030204" pitchFamily="34" charset="0"/>
-                <a:cs typeface="Calibri" panose="020F0502020204030204" pitchFamily="34" charset="0"/>
-              </a:rPr>
-              <a:t> ~ source, data=exmp8.1))</a:t>
-            </a:r>
-          </a:p>
-          <a:p>
-            <a:pPr marL="400050" lvl="1" indent="0">
-              <a:buNone/>
-            </a:pPr>
-            <a:endParaRPr lang="en-US" dirty="0"/>
-          </a:p>
-        </p:txBody>
-      </p:sp>
-      <p:sp>
-        <p:nvSpPr>
-          <p:cNvPr id="4" name="Slide Number Placeholder 3"/>
-          <p:cNvSpPr>
-            <a:spLocks noGrp="1"/>
-          </p:cNvSpPr>
-          <p:nvPr>
-            <p:ph type="sldNum" sz="quarter" idx="4"/>
-          </p:nvPr>
-        </p:nvSpPr>
-        <p:spPr/>
-        <p:txBody>
-          <a:bodyPr/>
-          <a:lstStyle/>
-          <a:p>
-            <a:fld id="{A9A949EE-02F8-4E24-B346-EA33FC0EA551}" type="slidenum">
-              <a:rPr lang="en-US" smtClean="0"/>
-              <a:t>20</a:t>
-            </a:fld>
-            <a:endParaRPr lang="en-US"/>
-          </a:p>
-        </p:txBody>
-      </p:sp>
-      <p:pic>
-        <p:nvPicPr>
-          <p:cNvPr id="15" name="Content Placeholder 13"/>
-          <p:cNvPicPr>
-            <a:picLocks noChangeAspect="1"/>
-          </p:cNvPicPr>
-          <p:nvPr/>
-        </p:nvPicPr>
-        <p:blipFill>
-          <a:blip r:embed="rId2"/>
-          <a:stretch>
-            <a:fillRect/>
-          </a:stretch>
-        </p:blipFill>
-        <p:spPr bwMode="auto">
-          <a:xfrm>
-            <a:off x="1819656" y="1295400"/>
-            <a:ext cx="5504688" cy="1829683"/>
-          </a:xfrm>
-          <a:prstGeom prst="rect">
-            <a:avLst/>
-          </a:prstGeom>
-          <a:noFill/>
-          <a:ln>
-            <a:noFill/>
-          </a:ln>
-          <a:extLst>
-            <a:ext uri="{909E8E84-426E-40DD-AFC4-6F175D3DCCD1}">
-              <a14:hiddenFill xmlns:a14="http://schemas.microsoft.com/office/drawing/2010/main">
-                <a:solidFill>
-                  <a:srgbClr val="FFFFFF"/>
-                </a:solidFill>
-              </a14:hiddenFill>
-            </a:ext>
-            <a:ext uri="{91240B29-F687-4F45-9708-019B960494DF}">
-              <a14:hiddenLine xmlns:a14="http://schemas.microsoft.com/office/drawing/2010/main" w="9525">
-                <a:solidFill>
-                  <a:srgbClr val="000000"/>
-                </a:solidFill>
-                <a:miter lim="800000"/>
-                <a:headEnd/>
-                <a:tailEnd/>
-              </a14:hiddenLine>
-            </a:ext>
-          </a:extLst>
-        </p:spPr>
-      </p:pic>
-      <p:pic>
-        <p:nvPicPr>
-          <p:cNvPr id="17" name="Picture 16"/>
-          <p:cNvPicPr>
-            <a:picLocks noChangeAspect="1"/>
-          </p:cNvPicPr>
-          <p:nvPr/>
-        </p:nvPicPr>
-        <p:blipFill>
-          <a:blip r:embed="rId3"/>
-          <a:stretch>
-            <a:fillRect/>
-          </a:stretch>
-        </p:blipFill>
-        <p:spPr>
-          <a:xfrm>
-            <a:off x="1935956" y="4648200"/>
-            <a:ext cx="5272088" cy="1828800"/>
-          </a:xfrm>
-          <a:prstGeom prst="rect">
-            <a:avLst/>
-          </a:prstGeom>
-        </p:spPr>
-      </p:pic>
-    </p:spTree>
-    <p:extLst>
-      <p:ext uri="{BB962C8B-B14F-4D97-AF65-F5344CB8AC3E}">
-        <p14:creationId xmlns:p14="http://schemas.microsoft.com/office/powerpoint/2010/main" val="2696752664"/>
-      </p:ext>
-    </p:extLst>
-  </p:cSld>
-  <p:clrMapOvr>
-    <a:masterClrMapping/>
-  </p:clrMapOvr>
-  <p:transition advClick="0"/>
-  <p:timing>
-    <p:tnLst>
-      <p:par>
-        <p:cTn id="1" dur="indefinite" restart="never" nodeType="tmRoot">
-          <p:childTnLst>
-            <p:seq concurrent="1" nextAc="seek">
-              <p:cTn id="2" dur="indefinite" nodeType="mainSeq">
-                <p:childTnLst>
-                  <p:par>
-                    <p:cTn id="3" fill="hold">
-                      <p:stCondLst>
-                        <p:cond delay="indefinite"/>
-                      </p:stCondLst>
-                      <p:childTnLst>
-                        <p:par>
-                          <p:cTn id="4" fill="hold">
-                            <p:stCondLst>
-                              <p:cond delay="0"/>
-                            </p:stCondLst>
-                            <p:childTnLst>
-                              <p:par>
-                                <p:cTn id="5" presetID="2" presetClass="entr" presetSubtype="4" fill="hold" nodeType="clickEffect">
-                                  <p:stCondLst>
-                                    <p:cond delay="0"/>
-                                  </p:stCondLst>
-                                  <p:childTnLst>
-                                    <p:set>
-                                      <p:cBhvr>
-                                        <p:cTn id="6" dur="1" fill="hold">
-                                          <p:stCondLst>
-                                            <p:cond delay="0"/>
-                                          </p:stCondLst>
-                                        </p:cTn>
-                                        <p:tgtEl>
-                                          <p:spTgt spid="3">
-                                            <p:txEl>
-                                              <p:pRg st="5" end="5"/>
-                                            </p:txEl>
-                                          </p:spTgt>
-                                        </p:tgtEl>
-                                        <p:attrNameLst>
-                                          <p:attrName>style.visibility</p:attrName>
-                                        </p:attrNameLst>
-                                      </p:cBhvr>
-                                      <p:to>
-                                        <p:strVal val="visible"/>
-                                      </p:to>
-                                    </p:set>
-                                    <p:anim calcmode="lin" valueType="num">
-                                      <p:cBhvr additive="base">
-                                        <p:cTn id="7" dur="500" fill="hold"/>
-                                        <p:tgtEl>
-                                          <p:spTgt spid="3">
-                                            <p:txEl>
-                                              <p:pRg st="5" end="5"/>
-                                            </p:txEl>
-                                          </p:spTgt>
-                                        </p:tgtEl>
-                                        <p:attrNameLst>
-                                          <p:attrName>ppt_x</p:attrName>
-                                        </p:attrNameLst>
-                                      </p:cBhvr>
-                                      <p:tavLst>
-                                        <p:tav tm="0">
-                                          <p:val>
-                                            <p:strVal val="#ppt_x"/>
-                                          </p:val>
-                                        </p:tav>
-                                        <p:tav tm="100000">
-                                          <p:val>
-                                            <p:strVal val="#ppt_x"/>
-                                          </p:val>
-                                        </p:tav>
-                                      </p:tavLst>
-                                    </p:anim>
-                                    <p:anim calcmode="lin" valueType="num">
-                                      <p:cBhvr additive="base">
-                                        <p:cTn id="8" dur="500" fill="hold"/>
-                                        <p:tgtEl>
-                                          <p:spTgt spid="3">
-                                            <p:txEl>
-                                              <p:pRg st="5" end="5"/>
-                                            </p:txEl>
-                                          </p:spTgt>
-                                        </p:tgtEl>
-                                        <p:attrNameLst>
-                                          <p:attrName>ppt_y</p:attrName>
-                                        </p:attrNameLst>
-                                      </p:cBhvr>
-                                      <p:tavLst>
-                                        <p:tav tm="0">
-                                          <p:val>
-                                            <p:strVal val="1+#ppt_h/2"/>
-                                          </p:val>
-                                        </p:tav>
-                                        <p:tav tm="100000">
-                                          <p:val>
-                                            <p:strVal val="#ppt_y"/>
-                                          </p:val>
-                                        </p:tav>
-                                      </p:tavLst>
-                                    </p:anim>
-                                  </p:childTnLst>
-                                </p:cTn>
-                              </p:par>
-                            </p:childTnLst>
-                          </p:cTn>
-                        </p:par>
-                        <p:par>
-                          <p:cTn id="9" fill="hold">
-                            <p:stCondLst>
-                              <p:cond delay="500"/>
-                            </p:stCondLst>
-                            <p:childTnLst>
-                              <p:par>
-                                <p:cTn id="10" presetID="10" presetClass="entr" presetSubtype="0" fill="hold" nodeType="afterEffect">
-                                  <p:stCondLst>
-                                    <p:cond delay="0"/>
-                                  </p:stCondLst>
-                                  <p:childTnLst>
-                                    <p:set>
-                                      <p:cBhvr>
-                                        <p:cTn id="11" dur="1" fill="hold">
-                                          <p:stCondLst>
-                                            <p:cond delay="0"/>
-                                          </p:stCondLst>
-                                        </p:cTn>
-                                        <p:tgtEl>
-                                          <p:spTgt spid="3">
-                                            <p:txEl>
-                                              <p:pRg st="6" end="6"/>
-                                            </p:txEl>
-                                          </p:spTgt>
-                                        </p:tgtEl>
-                                        <p:attrNameLst>
-                                          <p:attrName>style.visibility</p:attrName>
-                                        </p:attrNameLst>
-                                      </p:cBhvr>
-                                      <p:to>
-                                        <p:strVal val="visible"/>
-                                      </p:to>
-                                    </p:set>
-                                    <p:animEffect transition="in" filter="fade">
-                                      <p:cBhvr>
-                                        <p:cTn id="12" dur="500"/>
-                                        <p:tgtEl>
-                                          <p:spTgt spid="3">
-                                            <p:txEl>
-                                              <p:pRg st="6" end="6"/>
-                                            </p:txEl>
-                                          </p:spTgt>
-                                        </p:tgtEl>
-                                      </p:cBhvr>
-                                    </p:animEffect>
-                                  </p:childTnLst>
-                                </p:cTn>
-                              </p:par>
-                            </p:childTnLst>
-                          </p:cTn>
-                        </p:par>
-                      </p:childTnLst>
-                    </p:cTn>
-                  </p:par>
-                  <p:par>
-                    <p:cTn id="13" fill="hold">
-                      <p:stCondLst>
-                        <p:cond delay="indefinite"/>
-                      </p:stCondLst>
-                      <p:childTnLst>
-                        <p:par>
-                          <p:cTn id="14" fill="hold">
-                            <p:stCondLst>
-                              <p:cond delay="0"/>
-                            </p:stCondLst>
-                            <p:childTnLst>
-                              <p:par>
-                                <p:cTn id="15" presetID="53" presetClass="entr" presetSubtype="16" fill="hold" nodeType="clickEffect">
-                                  <p:stCondLst>
-                                    <p:cond delay="0"/>
-                                  </p:stCondLst>
-                                  <p:childTnLst>
-                                    <p:set>
-                                      <p:cBhvr>
-                                        <p:cTn id="16" dur="1" fill="hold">
-                                          <p:stCondLst>
-                                            <p:cond delay="0"/>
-                                          </p:stCondLst>
-                                        </p:cTn>
-                                        <p:tgtEl>
-                                          <p:spTgt spid="17"/>
-                                        </p:tgtEl>
-                                        <p:attrNameLst>
-                                          <p:attrName>style.visibility</p:attrName>
-                                        </p:attrNameLst>
-                                      </p:cBhvr>
-                                      <p:to>
-                                        <p:strVal val="visible"/>
-                                      </p:to>
-                                    </p:set>
-                                    <p:anim calcmode="lin" valueType="num">
-                                      <p:cBhvr>
-                                        <p:cTn id="17" dur="500" fill="hold"/>
-                                        <p:tgtEl>
-                                          <p:spTgt spid="17"/>
-                                        </p:tgtEl>
-                                        <p:attrNameLst>
-                                          <p:attrName>ppt_w</p:attrName>
-                                        </p:attrNameLst>
-                                      </p:cBhvr>
-                                      <p:tavLst>
-                                        <p:tav tm="0">
-                                          <p:val>
-                                            <p:fltVal val="0"/>
-                                          </p:val>
-                                        </p:tav>
-                                        <p:tav tm="100000">
-                                          <p:val>
-                                            <p:strVal val="#ppt_w"/>
-                                          </p:val>
-                                        </p:tav>
-                                      </p:tavLst>
-                                    </p:anim>
-                                    <p:anim calcmode="lin" valueType="num">
-                                      <p:cBhvr>
-                                        <p:cTn id="18" dur="500" fill="hold"/>
-                                        <p:tgtEl>
-                                          <p:spTgt spid="17"/>
-                                        </p:tgtEl>
-                                        <p:attrNameLst>
-                                          <p:attrName>ppt_h</p:attrName>
-                                        </p:attrNameLst>
-                                      </p:cBhvr>
-                                      <p:tavLst>
-                                        <p:tav tm="0">
-                                          <p:val>
-                                            <p:fltVal val="0"/>
-                                          </p:val>
-                                        </p:tav>
-                                        <p:tav tm="100000">
-                                          <p:val>
-                                            <p:strVal val="#ppt_h"/>
-                                          </p:val>
-                                        </p:tav>
-                                      </p:tavLst>
-                                    </p:anim>
-                                    <p:animEffect transition="in" filter="fade">
-                                      <p:cBhvr>
-                                        <p:cTn id="19" dur="500"/>
-                                        <p:tgtEl>
-                                          <p:spTgt spid="17"/>
-                                        </p:tgtEl>
-                                      </p:cBhvr>
-                                    </p:animEffect>
-                                  </p:childTnLst>
-                                </p:cTn>
-                              </p:par>
-                            </p:childTnLst>
-                          </p:cTn>
-                        </p:par>
-                      </p:childTnLst>
-                    </p:cTn>
-                  </p:par>
-                </p:childTnLst>
-              </p:cTn>
-              <p:prevCondLst>
-                <p:cond evt="onPrev" delay="0">
-                  <p:tgtEl>
-                    <p:sldTgt/>
-                  </p:tgtEl>
-                </p:cond>
-              </p:prevCondLst>
-              <p:nextCondLst>
-                <p:cond evt="onNext" delay="0">
-                  <p:tgtEl>
-                    <p:sldTgt/>
-                  </p:tgtEl>
-                </p:cond>
-              </p:nextCondLst>
-            </p:seq>
-          </p:childTnLst>
-        </p:cTn>
-      </p:par>
-    </p:tnLst>
-  </p:timing>
-</p:sld>
-</file>
-
-<file path=ppt/slides/slide21.xml><?xml version="1.0" encoding="utf-8"?>
-<p:sld xmlns:a="http://schemas.openxmlformats.org/drawingml/2006/main" xmlns:r="http://schemas.openxmlformats.org/officeDocument/2006/relationships" xmlns:p="http://schemas.openxmlformats.org/presentationml/2006/main">
-  <p:cSld>
-    <p:spTree>
-      <p:nvGrpSpPr>
-        <p:cNvPr id="1" name=""/>
-        <p:cNvGrpSpPr/>
-        <p:nvPr/>
-      </p:nvGrpSpPr>
-      <p:grpSpPr>
-        <a:xfrm>
-          <a:off x="0" y="0"/>
-          <a:ext cx="0" cy="0"/>
-          <a:chOff x="0" y="0"/>
-          <a:chExt cx="0" cy="0"/>
-        </a:xfrm>
-      </p:grpSpPr>
-      <p:sp>
-        <p:nvSpPr>
-          <p:cNvPr id="2" name="Title 1"/>
-          <p:cNvSpPr>
-            <a:spLocks noGrp="1"/>
-          </p:cNvSpPr>
-          <p:nvPr>
-            <p:ph type="title"/>
-          </p:nvPr>
-        </p:nvSpPr>
-        <p:spPr>
-          <a:xfrm>
             <a:off x="685800" y="152400"/>
             <a:ext cx="7772400" cy="762000"/>
           </a:xfrm>
@@ -27779,7 +26090,7 @@
           <a:p>
             <a:fld id="{A9A949EE-02F8-4E24-B346-EA33FC0EA551}" type="slidenum">
               <a:rPr lang="en-US" smtClean="0"/>
-              <a:t>21</a:t>
+              <a:t>20</a:t>
             </a:fld>
             <a:endParaRPr lang="en-US"/>
           </a:p>
@@ -28726,7 +27037,7 @@
 </p:sld>
 </file>
 
-<file path=ppt/slides/slide22.xml><?xml version="1.0" encoding="utf-8"?>
+<file path=ppt/slides/slide21.xml><?xml version="1.0" encoding="utf-8"?>
 <p:sld xmlns:a="http://schemas.openxmlformats.org/drawingml/2006/main" xmlns:r="http://schemas.openxmlformats.org/officeDocument/2006/relationships" xmlns:p="http://schemas.openxmlformats.org/presentationml/2006/main">
   <p:cSld>
     <p:spTree>
@@ -29351,7 +27662,7 @@
           <a:p>
             <a:fld id="{A9A949EE-02F8-4E24-B346-EA33FC0EA551}" type="slidenum">
               <a:rPr lang="en-US" smtClean="0"/>
-              <a:t>22</a:t>
+              <a:t>21</a:t>
             </a:fld>
             <a:endParaRPr lang="en-US"/>
           </a:p>

</xml_diff>

<commit_message>
Deploying to gh-pages from @ shnezam/BUAD1560@34b516409df38ee3250dfa7fe3db21c13b6ba34b 🚀
</commit_message>
<xml_diff>
--- a/slides/pdf/Chapt9.pptx
+++ b/slides/pdf/Chapt9.pptx
@@ -5,10 +5,10 @@
     <p:sldMasterId id="2147483701" r:id="rId1"/>
   </p:sldMasterIdLst>
   <p:notesMasterIdLst>
-    <p:notesMasterId r:id="rId23"/>
+    <p:notesMasterId r:id="rId21"/>
   </p:notesMasterIdLst>
   <p:handoutMasterIdLst>
-    <p:handoutMasterId r:id="rId24"/>
+    <p:handoutMasterId r:id="rId22"/>
   </p:handoutMasterIdLst>
   <p:sldIdLst>
     <p:sldId id="392" r:id="rId2"/>
@@ -30,8 +30,6 @@
     <p:sldId id="378" r:id="rId18"/>
     <p:sldId id="385" r:id="rId19"/>
     <p:sldId id="386" r:id="rId20"/>
-    <p:sldId id="379" r:id="rId21"/>
-    <p:sldId id="391" r:id="rId22"/>
   </p:sldIdLst>
   <p:sldSz cx="9144000" cy="6858000" type="screen4x3"/>
   <p:notesSz cx="6858000" cy="9144000"/>
@@ -9637,7 +9635,7 @@
             </p:nvSpPr>
             <p:spPr>
               <a:xfrm>
-                <a:off x="685800" y="1066800"/>
+                <a:off x="609600" y="947530"/>
                 <a:ext cx="7772400" cy="4495800"/>
               </a:xfrm>
             </p:spPr>
@@ -10908,13 +10906,13 @@
             </p:nvSpPr>
             <p:spPr>
               <a:xfrm>
-                <a:off x="685800" y="1066800"/>
+                <a:off x="609600" y="947530"/>
                 <a:ext cx="7772400" cy="4495800"/>
               </a:xfrm>
               <a:blipFill>
                 <a:blip r:embed="rId3"/>
                 <a:stretch>
-                  <a:fillRect l="-1176" t="-949" r="-314" b="-33875"/>
+                  <a:fillRect l="-1176" t="-813" r="-392" b="-33875"/>
                 </a:stretch>
               </a:blipFill>
             </p:spPr>
@@ -25562,2465 +25560,6 @@
 </p:sld>
 </file>
 
-<file path=ppt/slides/slide20.xml><?xml version="1.0" encoding="utf-8"?>
-<p:sld xmlns:a="http://schemas.openxmlformats.org/drawingml/2006/main" xmlns:r="http://schemas.openxmlformats.org/officeDocument/2006/relationships" xmlns:p="http://schemas.openxmlformats.org/presentationml/2006/main">
-  <p:cSld>
-    <p:spTree>
-      <p:nvGrpSpPr>
-        <p:cNvPr id="1" name=""/>
-        <p:cNvGrpSpPr/>
-        <p:nvPr/>
-      </p:nvGrpSpPr>
-      <p:grpSpPr>
-        <a:xfrm>
-          <a:off x="0" y="0"/>
-          <a:ext cx="0" cy="0"/>
-          <a:chOff x="0" y="0"/>
-          <a:chExt cx="0" cy="0"/>
-        </a:xfrm>
-      </p:grpSpPr>
-      <p:sp>
-        <p:nvSpPr>
-          <p:cNvPr id="2" name="Title 1"/>
-          <p:cNvSpPr>
-            <a:spLocks noGrp="1"/>
-          </p:cNvSpPr>
-          <p:nvPr>
-            <p:ph type="title"/>
-          </p:nvPr>
-        </p:nvSpPr>
-        <p:spPr>
-          <a:xfrm>
-            <a:off x="685800" y="152400"/>
-            <a:ext cx="7772400" cy="762000"/>
-          </a:xfrm>
-        </p:spPr>
-        <p:txBody>
-          <a:bodyPr/>
-          <a:lstStyle/>
-          <a:p>
-            <a:r>
-              <a:rPr lang="en-US" sz="2800" dirty="0"/>
-              <a:t>Normality Assumption Fails</a:t>
-            </a:r>
-            <a:br>
-              <a:rPr lang="en-US" sz="2800" dirty="0"/>
-            </a:br>
-            <a:r>
-              <a:rPr lang="en-US" sz="2800" dirty="0"/>
-              <a:t>Non-Parametric Method</a:t>
-            </a:r>
-          </a:p>
-        </p:txBody>
-      </p:sp>
-      <mc:AlternateContent xmlns:mc="http://schemas.openxmlformats.org/markup-compatibility/2006" xmlns:a14="http://schemas.microsoft.com/office/drawing/2010/main">
-        <mc:Choice Requires="a14">
-          <p:sp>
-            <p:nvSpPr>
-              <p:cNvPr id="3" name="Content Placeholder 2"/>
-              <p:cNvSpPr>
-                <a:spLocks noGrp="1"/>
-              </p:cNvSpPr>
-              <p:nvPr>
-                <p:ph idx="1"/>
-              </p:nvPr>
-            </p:nvSpPr>
-            <p:spPr>
-              <a:xfrm>
-                <a:off x="685800" y="1066800"/>
-                <a:ext cx="7772400" cy="4495800"/>
-              </a:xfrm>
-            </p:spPr>
-            <p:txBody>
-              <a:bodyPr/>
-              <a:lstStyle/>
-              <a:p>
-                <a:r>
-                  <a:rPr lang="en-US" sz="2400" dirty="0"/>
-                  <a:t>In the ANOVA method, we assume that the sample from each treatment level is drawn from normal population. What if the distribution is non-normal.</a:t>
-                </a:r>
-              </a:p>
-              <a:p>
-                <a:endParaRPr lang="en-US" sz="1050" dirty="0">
-                  <a:solidFill>
-                    <a:srgbClr val="C00000"/>
-                  </a:solidFill>
-                </a:endParaRPr>
-              </a:p>
-              <a:p>
-                <a:r>
-                  <a:rPr lang="en-US" sz="2400" dirty="0">
-                    <a:solidFill>
-                      <a:srgbClr val="C00000"/>
-                    </a:solidFill>
-                  </a:rPr>
-                  <a:t> The </a:t>
-                </a:r>
-                <a:r>
-                  <a:rPr lang="en-US" sz="2400" dirty="0" err="1">
-                    <a:solidFill>
-                      <a:srgbClr val="C00000"/>
-                    </a:solidFill>
-                  </a:rPr>
-                  <a:t>Kruskal</a:t>
-                </a:r>
-                <a:r>
-                  <a:rPr lang="en-US" sz="2400" dirty="0">
-                    <a:solidFill>
-                      <a:srgbClr val="C00000"/>
-                    </a:solidFill>
-                  </a:rPr>
-                  <a:t>-Wallis Test</a:t>
-                </a:r>
-              </a:p>
-              <a:p>
-                <a:endParaRPr lang="en-US" sz="1050" dirty="0">
-                  <a:solidFill>
-                    <a:srgbClr val="C00000"/>
-                  </a:solidFill>
-                </a:endParaRPr>
-              </a:p>
-              <a:p>
-                <a14:m>
-                  <m:oMath xmlns:m="http://schemas.openxmlformats.org/officeDocument/2006/math">
-                    <m:sSub>
-                      <m:sSubPr>
-                        <m:ctrlPr>
-                          <a:rPr lang="en-US" sz="2400" i="1" smtClean="0">
-                            <a:solidFill>
-                              <a:srgbClr val="C00000"/>
-                            </a:solidFill>
-                            <a:latin typeface="Cambria Math" panose="02040503050406030204" pitchFamily="18" charset="0"/>
-                          </a:rPr>
-                        </m:ctrlPr>
-                      </m:sSubPr>
-                      <m:e>
-                        <m:r>
-                          <a:rPr lang="en-US" sz="2400" i="1">
-                            <a:solidFill>
-                              <a:srgbClr val="C00000"/>
-                            </a:solidFill>
-                            <a:latin typeface="Cambria Math"/>
-                          </a:rPr>
-                          <m:t>𝐻</m:t>
-                        </m:r>
-                      </m:e>
-                      <m:sub>
-                        <m:r>
-                          <a:rPr lang="en-US" sz="2400" i="1">
-                            <a:solidFill>
-                              <a:srgbClr val="C00000"/>
-                            </a:solidFill>
-                            <a:latin typeface="Cambria Math"/>
-                          </a:rPr>
-                          <m:t>0</m:t>
-                        </m:r>
-                      </m:sub>
-                    </m:sSub>
-                    <m:r>
-                      <a:rPr lang="en-US" sz="2400" i="1">
-                        <a:solidFill>
-                          <a:srgbClr val="C00000"/>
-                        </a:solidFill>
-                        <a:latin typeface="Cambria Math"/>
-                      </a:rPr>
-                      <m:t>:</m:t>
-                    </m:r>
-                  </m:oMath>
-                </a14:m>
-                <a:r>
-                  <a:rPr lang="en-US" sz="2400" dirty="0">
-                    <a:solidFill>
-                      <a:srgbClr val="C00000"/>
-                    </a:solidFill>
-                  </a:rPr>
-                  <a:t> </a:t>
-                </a:r>
-                <a:r>
-                  <a:rPr lang="en-US" sz="2400" dirty="0"/>
-                  <a:t>All </a:t>
-                </a:r>
-                <a14:m>
-                  <m:oMath xmlns:m="http://schemas.openxmlformats.org/officeDocument/2006/math">
-                    <m:r>
-                      <a:rPr lang="en-US" sz="2400" i="1" dirty="0" smtClean="0">
-                        <a:latin typeface="Cambria Math" panose="02040503050406030204" pitchFamily="18" charset="0"/>
-                      </a:rPr>
-                      <m:t>𝑡</m:t>
-                    </m:r>
-                  </m:oMath>
-                </a14:m>
-                <a:r>
-                  <a:rPr lang="en-US" sz="2400" dirty="0"/>
-                  <a:t> distributions are identical</a:t>
-                </a:r>
-              </a:p>
-              <a:p>
-                <a14:m>
-                  <m:oMath xmlns:m="http://schemas.openxmlformats.org/officeDocument/2006/math">
-                    <m:sSub>
-                      <m:sSubPr>
-                        <m:ctrlPr>
-                          <a:rPr lang="en-US" sz="2400" i="1" smtClean="0">
-                            <a:solidFill>
-                              <a:srgbClr val="C00000"/>
-                            </a:solidFill>
-                            <a:latin typeface="Cambria Math" panose="02040503050406030204" pitchFamily="18" charset="0"/>
-                          </a:rPr>
-                        </m:ctrlPr>
-                      </m:sSubPr>
-                      <m:e>
-                        <m:r>
-                          <a:rPr lang="en-US" sz="2400" i="1">
-                            <a:solidFill>
-                              <a:srgbClr val="C00000"/>
-                            </a:solidFill>
-                            <a:latin typeface="Cambria Math"/>
-                          </a:rPr>
-                          <m:t>𝐻</m:t>
-                        </m:r>
-                      </m:e>
-                      <m:sub>
-                        <m:r>
-                          <a:rPr lang="en-US" sz="2400" i="1">
-                            <a:solidFill>
-                              <a:srgbClr val="C00000"/>
-                            </a:solidFill>
-                            <a:latin typeface="Cambria Math"/>
-                          </a:rPr>
-                          <m:t>𝑎</m:t>
-                        </m:r>
-                      </m:sub>
-                    </m:sSub>
-                    <m:r>
-                      <a:rPr lang="en-US" sz="2400" i="1">
-                        <a:solidFill>
-                          <a:srgbClr val="C00000"/>
-                        </a:solidFill>
-                        <a:latin typeface="Cambria Math"/>
-                      </a:rPr>
-                      <m:t>: </m:t>
-                    </m:r>
-                  </m:oMath>
-                </a14:m>
-                <a:r>
-                  <a:rPr lang="en-US" sz="2400" dirty="0">
-                    <a:solidFill>
-                      <a:srgbClr val="C00000"/>
-                    </a:solidFill>
-                  </a:rPr>
-                  <a:t> </a:t>
-                </a:r>
-                <a:r>
-                  <a:rPr lang="en-US" sz="2400" dirty="0"/>
-                  <a:t>Not all distributions are the same.</a:t>
-                </a:r>
-              </a:p>
-              <a:p>
-                <a:endParaRPr lang="en-US" sz="1050" dirty="0">
-                  <a:solidFill>
-                    <a:srgbClr val="C00000"/>
-                  </a:solidFill>
-                </a:endParaRPr>
-              </a:p>
-              <a:p>
-                <a:r>
-                  <a:rPr lang="en-US" sz="2400" dirty="0">
-                    <a:solidFill>
-                      <a:srgbClr val="C00000"/>
-                    </a:solidFill>
-                  </a:rPr>
-                  <a:t>TS:</a:t>
-                </a:r>
-              </a:p>
-              <a:p>
-                <a:pPr marL="857250" lvl="1" indent="-457200">
-                  <a:buAutoNum type="arabicPeriod"/>
-                </a:pPr>
-                <a:r>
-                  <a:rPr lang="en-US" sz="1800" dirty="0"/>
-                  <a:t>Rank all samples from the lowest to the highest.</a:t>
-                </a:r>
-              </a:p>
-              <a:p>
-                <a:pPr marL="857250" lvl="1" indent="-457200">
-                  <a:buAutoNum type="arabicPeriod"/>
-                </a:pPr>
-                <a:r>
-                  <a:rPr lang="en-US" sz="1800" dirty="0"/>
-                  <a:t>The test statistics </a:t>
-                </a:r>
-                <a14:m>
-                  <m:oMath xmlns:m="http://schemas.openxmlformats.org/officeDocument/2006/math">
-                    <m:r>
-                      <a:rPr lang="en-US" sz="1800" i="1">
-                        <a:latin typeface="Cambria Math"/>
-                      </a:rPr>
-                      <m:t>𝐻</m:t>
-                    </m:r>
-                    <m:r>
-                      <a:rPr lang="en-US" sz="1800" i="1">
-                        <a:latin typeface="Cambria Math"/>
-                      </a:rPr>
-                      <m:t> </m:t>
-                    </m:r>
-                  </m:oMath>
-                </a14:m>
-                <a:r>
-                  <a:rPr lang="en-US" sz="1800" dirty="0"/>
-                  <a:t>is similar to the F-statistic based on the ranks.</a:t>
-                </a:r>
-              </a:p>
-              <a:p>
-                <a:pPr marL="0" indent="0">
-                  <a:buNone/>
-                </a:pPr>
-                <a:endParaRPr lang="en-US" sz="1050" dirty="0"/>
-              </a:p>
-              <a:p>
-                <a:r>
-                  <a:rPr lang="en-US" sz="2400" dirty="0">
-                    <a:solidFill>
-                      <a:srgbClr val="C00000"/>
-                    </a:solidFill>
-                  </a:rPr>
-                  <a:t>Decision Rule</a:t>
-                </a:r>
-                <a:r>
-                  <a:rPr lang="en-US" sz="2400" dirty="0"/>
-                  <a:t>: Reject </a:t>
-                </a:r>
-                <a14:m>
-                  <m:oMath xmlns:m="http://schemas.openxmlformats.org/officeDocument/2006/math">
-                    <m:sSub>
-                      <m:sSubPr>
-                        <m:ctrlPr>
-                          <a:rPr lang="en-US" sz="2400" i="1">
-                            <a:latin typeface="Cambria Math" panose="02040503050406030204" pitchFamily="18" charset="0"/>
-                          </a:rPr>
-                        </m:ctrlPr>
-                      </m:sSubPr>
-                      <m:e>
-                        <m:r>
-                          <a:rPr lang="en-US" sz="2400" i="1">
-                            <a:latin typeface="Cambria Math"/>
-                          </a:rPr>
-                          <m:t>𝐻</m:t>
-                        </m:r>
-                      </m:e>
-                      <m:sub>
-                        <m:r>
-                          <a:rPr lang="en-US" sz="2400" i="1">
-                            <a:latin typeface="Cambria Math"/>
-                          </a:rPr>
-                          <m:t>0</m:t>
-                        </m:r>
-                      </m:sub>
-                    </m:sSub>
-                  </m:oMath>
-                </a14:m>
-                <a:r>
-                  <a:rPr lang="en-US" sz="2400" dirty="0"/>
-                  <a:t> if  </a:t>
-                </a:r>
-                <a14:m>
-                  <m:oMath xmlns:m="http://schemas.openxmlformats.org/officeDocument/2006/math">
-                    <m:r>
-                      <a:rPr lang="en-US" sz="2400" i="1">
-                        <a:latin typeface="Cambria Math"/>
-                      </a:rPr>
-                      <m:t>𝐻</m:t>
-                    </m:r>
-                    <m:r>
-                      <a:rPr lang="en-US" sz="2400" i="1">
-                        <a:latin typeface="Cambria Math"/>
-                      </a:rPr>
-                      <m:t>&gt;</m:t>
-                    </m:r>
-                    <m:sSubSup>
-                      <m:sSubSupPr>
-                        <m:ctrlPr>
-                          <a:rPr lang="en-US" sz="2400" i="1">
-                            <a:latin typeface="Cambria Math" panose="02040503050406030204" pitchFamily="18" charset="0"/>
-                          </a:rPr>
-                        </m:ctrlPr>
-                      </m:sSubSupPr>
-                      <m:e>
-                        <m:r>
-                          <a:rPr lang="en-US" sz="2400" i="1">
-                            <a:latin typeface="Cambria Math"/>
-                          </a:rPr>
-                          <m:t>𝜒</m:t>
-                        </m:r>
-                      </m:e>
-                      <m:sub>
-                        <m:r>
-                          <a:rPr lang="en-US" sz="2400" i="1">
-                            <a:latin typeface="Cambria Math"/>
-                          </a:rPr>
-                          <m:t>𝛼</m:t>
-                        </m:r>
-                      </m:sub>
-                      <m:sup>
-                        <m:r>
-                          <a:rPr lang="en-US" sz="2400" i="1">
-                            <a:latin typeface="Cambria Math"/>
-                          </a:rPr>
-                          <m:t>2</m:t>
-                        </m:r>
-                      </m:sup>
-                    </m:sSubSup>
-                    <m:r>
-                      <a:rPr lang="en-US" sz="2400" i="1">
-                        <a:latin typeface="Cambria Math"/>
-                      </a:rPr>
-                      <m:t>(</m:t>
-                    </m:r>
-                    <m:r>
-                      <a:rPr lang="en-US" sz="2400" i="1">
-                        <a:latin typeface="Cambria Math"/>
-                      </a:rPr>
-                      <m:t>𝑑𝑓</m:t>
-                    </m:r>
-                    <m:r>
-                      <a:rPr lang="en-US" sz="2400" i="1">
-                        <a:latin typeface="Cambria Math"/>
-                      </a:rPr>
-                      <m:t>=</m:t>
-                    </m:r>
-                    <m:r>
-                      <a:rPr lang="en-US" sz="2400" i="1">
-                        <a:latin typeface="Cambria Math"/>
-                      </a:rPr>
-                      <m:t>𝑡</m:t>
-                    </m:r>
-                    <m:r>
-                      <a:rPr lang="en-US" sz="2400" i="1">
-                        <a:latin typeface="Cambria Math"/>
-                      </a:rPr>
-                      <m:t>−1)</m:t>
-                    </m:r>
-                  </m:oMath>
-                </a14:m>
-                <a:endParaRPr lang="en-US" sz="2400" dirty="0"/>
-              </a:p>
-              <a:p>
-                <a:r>
-                  <a:rPr lang="en-US" dirty="0"/>
-                  <a:t>In R:</a:t>
-                </a:r>
-              </a:p>
-              <a:p>
-                <a:pPr lvl="1" indent="-342900">
-                  <a:buFont typeface="Wingdings" panose="05000000000000000000" pitchFamily="2" charset="2"/>
-                  <a:buChar char="Ø"/>
-                </a:pPr>
-                <a:r>
-                  <a:rPr lang="en-US" sz="2400" dirty="0" err="1">
-                    <a:latin typeface="Calibri" panose="020F0502020204030204" pitchFamily="34" charset="0"/>
-                    <a:ea typeface="Calibri" panose="020F0502020204030204" pitchFamily="34" charset="0"/>
-                    <a:cs typeface="Calibri" panose="020F0502020204030204" pitchFamily="34" charset="0"/>
-                  </a:rPr>
-                  <a:t>kruskal.test</a:t>
-                </a:r>
-                <a:r>
-                  <a:rPr lang="en-US" sz="2400" dirty="0">
-                    <a:latin typeface="Calibri" panose="020F0502020204030204" pitchFamily="34" charset="0"/>
-                    <a:ea typeface="Calibri" panose="020F0502020204030204" pitchFamily="34" charset="0"/>
-                    <a:cs typeface="Calibri" panose="020F0502020204030204" pitchFamily="34" charset="0"/>
-                  </a:rPr>
-                  <a:t>(x, g)</a:t>
-                </a:r>
-              </a:p>
-            </p:txBody>
-          </p:sp>
-        </mc:Choice>
-        <mc:Fallback xmlns="">
-          <p:sp>
-            <p:nvSpPr>
-              <p:cNvPr id="3" name="Content Placeholder 2"/>
-              <p:cNvSpPr>
-                <a:spLocks noGrp="1" noRot="1" noChangeAspect="1" noMove="1" noResize="1" noEditPoints="1" noAdjustHandles="1" noChangeArrowheads="1" noChangeShapeType="1" noTextEdit="1"/>
-              </p:cNvSpPr>
-              <p:nvPr>
-                <p:ph idx="1"/>
-              </p:nvPr>
-            </p:nvSpPr>
-            <p:spPr>
-              <a:xfrm>
-                <a:off x="685800" y="1066800"/>
-                <a:ext cx="7772400" cy="4495800"/>
-              </a:xfrm>
-              <a:blipFill>
-                <a:blip r:embed="rId2"/>
-                <a:stretch>
-                  <a:fillRect l="-1255" t="-949" b="-30352"/>
-                </a:stretch>
-              </a:blipFill>
-            </p:spPr>
-            <p:txBody>
-              <a:bodyPr/>
-              <a:lstStyle/>
-              <a:p>
-                <a:r>
-                  <a:rPr lang="en-US">
-                    <a:noFill/>
-                  </a:rPr>
-                  <a:t> </a:t>
-                </a:r>
-              </a:p>
-            </p:txBody>
-          </p:sp>
-        </mc:Fallback>
-      </mc:AlternateContent>
-      <p:sp>
-        <p:nvSpPr>
-          <p:cNvPr id="4" name="Slide Number Placeholder 3"/>
-          <p:cNvSpPr>
-            <a:spLocks noGrp="1"/>
-          </p:cNvSpPr>
-          <p:nvPr>
-            <p:ph type="sldNum" sz="quarter" idx="4"/>
-          </p:nvPr>
-        </p:nvSpPr>
-        <p:spPr/>
-        <p:txBody>
-          <a:bodyPr/>
-          <a:lstStyle/>
-          <a:p>
-            <a:fld id="{A9A949EE-02F8-4E24-B346-EA33FC0EA551}" type="slidenum">
-              <a:rPr lang="en-US" smtClean="0"/>
-              <a:t>20</a:t>
-            </a:fld>
-            <a:endParaRPr lang="en-US"/>
-          </a:p>
-        </p:txBody>
-      </p:sp>
-    </p:spTree>
-    <p:extLst>
-      <p:ext uri="{BB962C8B-B14F-4D97-AF65-F5344CB8AC3E}">
-        <p14:creationId xmlns:p14="http://schemas.microsoft.com/office/powerpoint/2010/main" val="1780598392"/>
-      </p:ext>
-    </p:extLst>
-  </p:cSld>
-  <p:clrMapOvr>
-    <a:masterClrMapping/>
-  </p:clrMapOvr>
-  <p:transition advClick="0"/>
-  <p:timing>
-    <p:tnLst>
-      <p:par>
-        <p:cTn id="1" dur="indefinite" restart="never" nodeType="tmRoot">
-          <p:childTnLst>
-            <p:seq concurrent="1" nextAc="seek">
-              <p:cTn id="2" dur="indefinite" nodeType="mainSeq">
-                <p:childTnLst>
-                  <p:par>
-                    <p:cTn id="3" fill="hold">
-                      <p:stCondLst>
-                        <p:cond delay="indefinite"/>
-                      </p:stCondLst>
-                      <p:childTnLst>
-                        <p:par>
-                          <p:cTn id="4" fill="hold">
-                            <p:stCondLst>
-                              <p:cond delay="0"/>
-                            </p:stCondLst>
-                            <p:childTnLst>
-                              <p:par>
-                                <p:cTn id="5" presetID="31" presetClass="entr" presetSubtype="0" fill="hold" nodeType="clickEffect">
-                                  <p:stCondLst>
-                                    <p:cond delay="0"/>
-                                  </p:stCondLst>
-                                  <p:childTnLst>
-                                    <p:set>
-                                      <p:cBhvr>
-                                        <p:cTn id="6" dur="1" fill="hold">
-                                          <p:stCondLst>
-                                            <p:cond delay="0"/>
-                                          </p:stCondLst>
-                                        </p:cTn>
-                                        <p:tgtEl>
-                                          <p:spTgt spid="3">
-                                            <p:txEl>
-                                              <p:pRg st="2" end="2"/>
-                                            </p:txEl>
-                                          </p:spTgt>
-                                        </p:tgtEl>
-                                        <p:attrNameLst>
-                                          <p:attrName>style.visibility</p:attrName>
-                                        </p:attrNameLst>
-                                      </p:cBhvr>
-                                      <p:to>
-                                        <p:strVal val="visible"/>
-                                      </p:to>
-                                    </p:set>
-                                    <p:anim calcmode="lin" valueType="num">
-                                      <p:cBhvr>
-                                        <p:cTn id="7" dur="1000" fill="hold"/>
-                                        <p:tgtEl>
-                                          <p:spTgt spid="3">
-                                            <p:txEl>
-                                              <p:pRg st="2" end="2"/>
-                                            </p:txEl>
-                                          </p:spTgt>
-                                        </p:tgtEl>
-                                        <p:attrNameLst>
-                                          <p:attrName>ppt_w</p:attrName>
-                                        </p:attrNameLst>
-                                      </p:cBhvr>
-                                      <p:tavLst>
-                                        <p:tav tm="0">
-                                          <p:val>
-                                            <p:fltVal val="0"/>
-                                          </p:val>
-                                        </p:tav>
-                                        <p:tav tm="100000">
-                                          <p:val>
-                                            <p:strVal val="#ppt_w"/>
-                                          </p:val>
-                                        </p:tav>
-                                      </p:tavLst>
-                                    </p:anim>
-                                    <p:anim calcmode="lin" valueType="num">
-                                      <p:cBhvr>
-                                        <p:cTn id="8" dur="1000" fill="hold"/>
-                                        <p:tgtEl>
-                                          <p:spTgt spid="3">
-                                            <p:txEl>
-                                              <p:pRg st="2" end="2"/>
-                                            </p:txEl>
-                                          </p:spTgt>
-                                        </p:tgtEl>
-                                        <p:attrNameLst>
-                                          <p:attrName>ppt_h</p:attrName>
-                                        </p:attrNameLst>
-                                      </p:cBhvr>
-                                      <p:tavLst>
-                                        <p:tav tm="0">
-                                          <p:val>
-                                            <p:fltVal val="0"/>
-                                          </p:val>
-                                        </p:tav>
-                                        <p:tav tm="100000">
-                                          <p:val>
-                                            <p:strVal val="#ppt_h"/>
-                                          </p:val>
-                                        </p:tav>
-                                      </p:tavLst>
-                                    </p:anim>
-                                    <p:anim calcmode="lin" valueType="num">
-                                      <p:cBhvr>
-                                        <p:cTn id="9" dur="1000" fill="hold"/>
-                                        <p:tgtEl>
-                                          <p:spTgt spid="3">
-                                            <p:txEl>
-                                              <p:pRg st="2" end="2"/>
-                                            </p:txEl>
-                                          </p:spTgt>
-                                        </p:tgtEl>
-                                        <p:attrNameLst>
-                                          <p:attrName>style.rotation</p:attrName>
-                                        </p:attrNameLst>
-                                      </p:cBhvr>
-                                      <p:tavLst>
-                                        <p:tav tm="0">
-                                          <p:val>
-                                            <p:fltVal val="90"/>
-                                          </p:val>
-                                        </p:tav>
-                                        <p:tav tm="100000">
-                                          <p:val>
-                                            <p:fltVal val="0"/>
-                                          </p:val>
-                                        </p:tav>
-                                      </p:tavLst>
-                                    </p:anim>
-                                    <p:animEffect transition="in" filter="fade">
-                                      <p:cBhvr>
-                                        <p:cTn id="10" dur="1000"/>
-                                        <p:tgtEl>
-                                          <p:spTgt spid="3">
-                                            <p:txEl>
-                                              <p:pRg st="2" end="2"/>
-                                            </p:txEl>
-                                          </p:spTgt>
-                                        </p:tgtEl>
-                                      </p:cBhvr>
-                                    </p:animEffect>
-                                  </p:childTnLst>
-                                </p:cTn>
-                              </p:par>
-                            </p:childTnLst>
-                          </p:cTn>
-                        </p:par>
-                      </p:childTnLst>
-                    </p:cTn>
-                  </p:par>
-                  <p:par>
-                    <p:cTn id="11" fill="hold">
-                      <p:stCondLst>
-                        <p:cond delay="indefinite"/>
-                      </p:stCondLst>
-                      <p:childTnLst>
-                        <p:par>
-                          <p:cTn id="12" fill="hold">
-                            <p:stCondLst>
-                              <p:cond delay="0"/>
-                            </p:stCondLst>
-                            <p:childTnLst>
-                              <p:par>
-                                <p:cTn id="13" presetID="2" presetClass="entr" presetSubtype="4" fill="hold" nodeType="clickEffect">
-                                  <p:stCondLst>
-                                    <p:cond delay="0"/>
-                                  </p:stCondLst>
-                                  <p:childTnLst>
-                                    <p:set>
-                                      <p:cBhvr>
-                                        <p:cTn id="14" dur="1" fill="hold">
-                                          <p:stCondLst>
-                                            <p:cond delay="0"/>
-                                          </p:stCondLst>
-                                        </p:cTn>
-                                        <p:tgtEl>
-                                          <p:spTgt spid="3">
-                                            <p:txEl>
-                                              <p:pRg st="4" end="4"/>
-                                            </p:txEl>
-                                          </p:spTgt>
-                                        </p:tgtEl>
-                                        <p:attrNameLst>
-                                          <p:attrName>style.visibility</p:attrName>
-                                        </p:attrNameLst>
-                                      </p:cBhvr>
-                                      <p:to>
-                                        <p:strVal val="visible"/>
-                                      </p:to>
-                                    </p:set>
-                                    <p:anim calcmode="lin" valueType="num">
-                                      <p:cBhvr additive="base">
-                                        <p:cTn id="15" dur="500" fill="hold"/>
-                                        <p:tgtEl>
-                                          <p:spTgt spid="3">
-                                            <p:txEl>
-                                              <p:pRg st="4" end="4"/>
-                                            </p:txEl>
-                                          </p:spTgt>
-                                        </p:tgtEl>
-                                        <p:attrNameLst>
-                                          <p:attrName>ppt_x</p:attrName>
-                                        </p:attrNameLst>
-                                      </p:cBhvr>
-                                      <p:tavLst>
-                                        <p:tav tm="0">
-                                          <p:val>
-                                            <p:strVal val="#ppt_x"/>
-                                          </p:val>
-                                        </p:tav>
-                                        <p:tav tm="100000">
-                                          <p:val>
-                                            <p:strVal val="#ppt_x"/>
-                                          </p:val>
-                                        </p:tav>
-                                      </p:tavLst>
-                                    </p:anim>
-                                    <p:anim calcmode="lin" valueType="num">
-                                      <p:cBhvr additive="base">
-                                        <p:cTn id="16" dur="500" fill="hold"/>
-                                        <p:tgtEl>
-                                          <p:spTgt spid="3">
-                                            <p:txEl>
-                                              <p:pRg st="4" end="4"/>
-                                            </p:txEl>
-                                          </p:spTgt>
-                                        </p:tgtEl>
-                                        <p:attrNameLst>
-                                          <p:attrName>ppt_y</p:attrName>
-                                        </p:attrNameLst>
-                                      </p:cBhvr>
-                                      <p:tavLst>
-                                        <p:tav tm="0">
-                                          <p:val>
-                                            <p:strVal val="1+#ppt_h/2"/>
-                                          </p:val>
-                                        </p:tav>
-                                        <p:tav tm="100000">
-                                          <p:val>
-                                            <p:strVal val="#ppt_y"/>
-                                          </p:val>
-                                        </p:tav>
-                                      </p:tavLst>
-                                    </p:anim>
-                                  </p:childTnLst>
-                                </p:cTn>
-                              </p:par>
-                              <p:par>
-                                <p:cTn id="17" presetID="2" presetClass="entr" presetSubtype="4" fill="hold" nodeType="withEffect">
-                                  <p:stCondLst>
-                                    <p:cond delay="0"/>
-                                  </p:stCondLst>
-                                  <p:childTnLst>
-                                    <p:set>
-                                      <p:cBhvr>
-                                        <p:cTn id="18" dur="1" fill="hold">
-                                          <p:stCondLst>
-                                            <p:cond delay="0"/>
-                                          </p:stCondLst>
-                                        </p:cTn>
-                                        <p:tgtEl>
-                                          <p:spTgt spid="3">
-                                            <p:txEl>
-                                              <p:pRg st="5" end="5"/>
-                                            </p:txEl>
-                                          </p:spTgt>
-                                        </p:tgtEl>
-                                        <p:attrNameLst>
-                                          <p:attrName>style.visibility</p:attrName>
-                                        </p:attrNameLst>
-                                      </p:cBhvr>
-                                      <p:to>
-                                        <p:strVal val="visible"/>
-                                      </p:to>
-                                    </p:set>
-                                    <p:anim calcmode="lin" valueType="num">
-                                      <p:cBhvr additive="base">
-                                        <p:cTn id="19" dur="500" fill="hold"/>
-                                        <p:tgtEl>
-                                          <p:spTgt spid="3">
-                                            <p:txEl>
-                                              <p:pRg st="5" end="5"/>
-                                            </p:txEl>
-                                          </p:spTgt>
-                                        </p:tgtEl>
-                                        <p:attrNameLst>
-                                          <p:attrName>ppt_x</p:attrName>
-                                        </p:attrNameLst>
-                                      </p:cBhvr>
-                                      <p:tavLst>
-                                        <p:tav tm="0">
-                                          <p:val>
-                                            <p:strVal val="#ppt_x"/>
-                                          </p:val>
-                                        </p:tav>
-                                        <p:tav tm="100000">
-                                          <p:val>
-                                            <p:strVal val="#ppt_x"/>
-                                          </p:val>
-                                        </p:tav>
-                                      </p:tavLst>
-                                    </p:anim>
-                                    <p:anim calcmode="lin" valueType="num">
-                                      <p:cBhvr additive="base">
-                                        <p:cTn id="20" dur="500" fill="hold"/>
-                                        <p:tgtEl>
-                                          <p:spTgt spid="3">
-                                            <p:txEl>
-                                              <p:pRg st="5" end="5"/>
-                                            </p:txEl>
-                                          </p:spTgt>
-                                        </p:tgtEl>
-                                        <p:attrNameLst>
-                                          <p:attrName>ppt_y</p:attrName>
-                                        </p:attrNameLst>
-                                      </p:cBhvr>
-                                      <p:tavLst>
-                                        <p:tav tm="0">
-                                          <p:val>
-                                            <p:strVal val="1+#ppt_h/2"/>
-                                          </p:val>
-                                        </p:tav>
-                                        <p:tav tm="100000">
-                                          <p:val>
-                                            <p:strVal val="#ppt_y"/>
-                                          </p:val>
-                                        </p:tav>
-                                      </p:tavLst>
-                                    </p:anim>
-                                  </p:childTnLst>
-                                </p:cTn>
-                              </p:par>
-                            </p:childTnLst>
-                          </p:cTn>
-                        </p:par>
-                      </p:childTnLst>
-                    </p:cTn>
-                  </p:par>
-                  <p:par>
-                    <p:cTn id="21" fill="hold">
-                      <p:stCondLst>
-                        <p:cond delay="indefinite"/>
-                      </p:stCondLst>
-                      <p:childTnLst>
-                        <p:par>
-                          <p:cTn id="22" fill="hold">
-                            <p:stCondLst>
-                              <p:cond delay="0"/>
-                            </p:stCondLst>
-                            <p:childTnLst>
-                              <p:par>
-                                <p:cTn id="23" presetID="53" presetClass="entr" presetSubtype="16" fill="hold" nodeType="clickEffect">
-                                  <p:stCondLst>
-                                    <p:cond delay="0"/>
-                                  </p:stCondLst>
-                                  <p:childTnLst>
-                                    <p:set>
-                                      <p:cBhvr>
-                                        <p:cTn id="24" dur="1" fill="hold">
-                                          <p:stCondLst>
-                                            <p:cond delay="0"/>
-                                          </p:stCondLst>
-                                        </p:cTn>
-                                        <p:tgtEl>
-                                          <p:spTgt spid="3">
-                                            <p:txEl>
-                                              <p:pRg st="7" end="7"/>
-                                            </p:txEl>
-                                          </p:spTgt>
-                                        </p:tgtEl>
-                                        <p:attrNameLst>
-                                          <p:attrName>style.visibility</p:attrName>
-                                        </p:attrNameLst>
-                                      </p:cBhvr>
-                                      <p:to>
-                                        <p:strVal val="visible"/>
-                                      </p:to>
-                                    </p:set>
-                                    <p:anim calcmode="lin" valueType="num">
-                                      <p:cBhvr>
-                                        <p:cTn id="25" dur="500" fill="hold"/>
-                                        <p:tgtEl>
-                                          <p:spTgt spid="3">
-                                            <p:txEl>
-                                              <p:pRg st="7" end="7"/>
-                                            </p:txEl>
-                                          </p:spTgt>
-                                        </p:tgtEl>
-                                        <p:attrNameLst>
-                                          <p:attrName>ppt_w</p:attrName>
-                                        </p:attrNameLst>
-                                      </p:cBhvr>
-                                      <p:tavLst>
-                                        <p:tav tm="0">
-                                          <p:val>
-                                            <p:fltVal val="0"/>
-                                          </p:val>
-                                        </p:tav>
-                                        <p:tav tm="100000">
-                                          <p:val>
-                                            <p:strVal val="#ppt_w"/>
-                                          </p:val>
-                                        </p:tav>
-                                      </p:tavLst>
-                                    </p:anim>
-                                    <p:anim calcmode="lin" valueType="num">
-                                      <p:cBhvr>
-                                        <p:cTn id="26" dur="500" fill="hold"/>
-                                        <p:tgtEl>
-                                          <p:spTgt spid="3">
-                                            <p:txEl>
-                                              <p:pRg st="7" end="7"/>
-                                            </p:txEl>
-                                          </p:spTgt>
-                                        </p:tgtEl>
-                                        <p:attrNameLst>
-                                          <p:attrName>ppt_h</p:attrName>
-                                        </p:attrNameLst>
-                                      </p:cBhvr>
-                                      <p:tavLst>
-                                        <p:tav tm="0">
-                                          <p:val>
-                                            <p:fltVal val="0"/>
-                                          </p:val>
-                                        </p:tav>
-                                        <p:tav tm="100000">
-                                          <p:val>
-                                            <p:strVal val="#ppt_h"/>
-                                          </p:val>
-                                        </p:tav>
-                                      </p:tavLst>
-                                    </p:anim>
-                                    <p:animEffect transition="in" filter="fade">
-                                      <p:cBhvr>
-                                        <p:cTn id="27" dur="500"/>
-                                        <p:tgtEl>
-                                          <p:spTgt spid="3">
-                                            <p:txEl>
-                                              <p:pRg st="7" end="7"/>
-                                            </p:txEl>
-                                          </p:spTgt>
-                                        </p:tgtEl>
-                                      </p:cBhvr>
-                                    </p:animEffect>
-                                  </p:childTnLst>
-                                </p:cTn>
-                              </p:par>
-                              <p:par>
-                                <p:cTn id="28" presetID="53" presetClass="entr" presetSubtype="16" fill="hold" nodeType="withEffect">
-                                  <p:stCondLst>
-                                    <p:cond delay="0"/>
-                                  </p:stCondLst>
-                                  <p:childTnLst>
-                                    <p:set>
-                                      <p:cBhvr>
-                                        <p:cTn id="29" dur="1" fill="hold">
-                                          <p:stCondLst>
-                                            <p:cond delay="0"/>
-                                          </p:stCondLst>
-                                        </p:cTn>
-                                        <p:tgtEl>
-                                          <p:spTgt spid="3">
-                                            <p:txEl>
-                                              <p:pRg st="8" end="8"/>
-                                            </p:txEl>
-                                          </p:spTgt>
-                                        </p:tgtEl>
-                                        <p:attrNameLst>
-                                          <p:attrName>style.visibility</p:attrName>
-                                        </p:attrNameLst>
-                                      </p:cBhvr>
-                                      <p:to>
-                                        <p:strVal val="visible"/>
-                                      </p:to>
-                                    </p:set>
-                                    <p:anim calcmode="lin" valueType="num">
-                                      <p:cBhvr>
-                                        <p:cTn id="30" dur="500" fill="hold"/>
-                                        <p:tgtEl>
-                                          <p:spTgt spid="3">
-                                            <p:txEl>
-                                              <p:pRg st="8" end="8"/>
-                                            </p:txEl>
-                                          </p:spTgt>
-                                        </p:tgtEl>
-                                        <p:attrNameLst>
-                                          <p:attrName>ppt_w</p:attrName>
-                                        </p:attrNameLst>
-                                      </p:cBhvr>
-                                      <p:tavLst>
-                                        <p:tav tm="0">
-                                          <p:val>
-                                            <p:fltVal val="0"/>
-                                          </p:val>
-                                        </p:tav>
-                                        <p:tav tm="100000">
-                                          <p:val>
-                                            <p:strVal val="#ppt_w"/>
-                                          </p:val>
-                                        </p:tav>
-                                      </p:tavLst>
-                                    </p:anim>
-                                    <p:anim calcmode="lin" valueType="num">
-                                      <p:cBhvr>
-                                        <p:cTn id="31" dur="500" fill="hold"/>
-                                        <p:tgtEl>
-                                          <p:spTgt spid="3">
-                                            <p:txEl>
-                                              <p:pRg st="8" end="8"/>
-                                            </p:txEl>
-                                          </p:spTgt>
-                                        </p:tgtEl>
-                                        <p:attrNameLst>
-                                          <p:attrName>ppt_h</p:attrName>
-                                        </p:attrNameLst>
-                                      </p:cBhvr>
-                                      <p:tavLst>
-                                        <p:tav tm="0">
-                                          <p:val>
-                                            <p:fltVal val="0"/>
-                                          </p:val>
-                                        </p:tav>
-                                        <p:tav tm="100000">
-                                          <p:val>
-                                            <p:strVal val="#ppt_h"/>
-                                          </p:val>
-                                        </p:tav>
-                                      </p:tavLst>
-                                    </p:anim>
-                                    <p:animEffect transition="in" filter="fade">
-                                      <p:cBhvr>
-                                        <p:cTn id="32" dur="500"/>
-                                        <p:tgtEl>
-                                          <p:spTgt spid="3">
-                                            <p:txEl>
-                                              <p:pRg st="8" end="8"/>
-                                            </p:txEl>
-                                          </p:spTgt>
-                                        </p:tgtEl>
-                                      </p:cBhvr>
-                                    </p:animEffect>
-                                  </p:childTnLst>
-                                </p:cTn>
-                              </p:par>
-                              <p:par>
-                                <p:cTn id="33" presetID="53" presetClass="entr" presetSubtype="16" fill="hold" nodeType="withEffect">
-                                  <p:stCondLst>
-                                    <p:cond delay="0"/>
-                                  </p:stCondLst>
-                                  <p:childTnLst>
-                                    <p:set>
-                                      <p:cBhvr>
-                                        <p:cTn id="34" dur="1" fill="hold">
-                                          <p:stCondLst>
-                                            <p:cond delay="0"/>
-                                          </p:stCondLst>
-                                        </p:cTn>
-                                        <p:tgtEl>
-                                          <p:spTgt spid="3">
-                                            <p:txEl>
-                                              <p:pRg st="9" end="9"/>
-                                            </p:txEl>
-                                          </p:spTgt>
-                                        </p:tgtEl>
-                                        <p:attrNameLst>
-                                          <p:attrName>style.visibility</p:attrName>
-                                        </p:attrNameLst>
-                                      </p:cBhvr>
-                                      <p:to>
-                                        <p:strVal val="visible"/>
-                                      </p:to>
-                                    </p:set>
-                                    <p:anim calcmode="lin" valueType="num">
-                                      <p:cBhvr>
-                                        <p:cTn id="35" dur="500" fill="hold"/>
-                                        <p:tgtEl>
-                                          <p:spTgt spid="3">
-                                            <p:txEl>
-                                              <p:pRg st="9" end="9"/>
-                                            </p:txEl>
-                                          </p:spTgt>
-                                        </p:tgtEl>
-                                        <p:attrNameLst>
-                                          <p:attrName>ppt_w</p:attrName>
-                                        </p:attrNameLst>
-                                      </p:cBhvr>
-                                      <p:tavLst>
-                                        <p:tav tm="0">
-                                          <p:val>
-                                            <p:fltVal val="0"/>
-                                          </p:val>
-                                        </p:tav>
-                                        <p:tav tm="100000">
-                                          <p:val>
-                                            <p:strVal val="#ppt_w"/>
-                                          </p:val>
-                                        </p:tav>
-                                      </p:tavLst>
-                                    </p:anim>
-                                    <p:anim calcmode="lin" valueType="num">
-                                      <p:cBhvr>
-                                        <p:cTn id="36" dur="500" fill="hold"/>
-                                        <p:tgtEl>
-                                          <p:spTgt spid="3">
-                                            <p:txEl>
-                                              <p:pRg st="9" end="9"/>
-                                            </p:txEl>
-                                          </p:spTgt>
-                                        </p:tgtEl>
-                                        <p:attrNameLst>
-                                          <p:attrName>ppt_h</p:attrName>
-                                        </p:attrNameLst>
-                                      </p:cBhvr>
-                                      <p:tavLst>
-                                        <p:tav tm="0">
-                                          <p:val>
-                                            <p:fltVal val="0"/>
-                                          </p:val>
-                                        </p:tav>
-                                        <p:tav tm="100000">
-                                          <p:val>
-                                            <p:strVal val="#ppt_h"/>
-                                          </p:val>
-                                        </p:tav>
-                                      </p:tavLst>
-                                    </p:anim>
-                                    <p:animEffect transition="in" filter="fade">
-                                      <p:cBhvr>
-                                        <p:cTn id="37" dur="500"/>
-                                        <p:tgtEl>
-                                          <p:spTgt spid="3">
-                                            <p:txEl>
-                                              <p:pRg st="9" end="9"/>
-                                            </p:txEl>
-                                          </p:spTgt>
-                                        </p:tgtEl>
-                                      </p:cBhvr>
-                                    </p:animEffect>
-                                  </p:childTnLst>
-                                </p:cTn>
-                              </p:par>
-                            </p:childTnLst>
-                          </p:cTn>
-                        </p:par>
-                      </p:childTnLst>
-                    </p:cTn>
-                  </p:par>
-                  <p:par>
-                    <p:cTn id="38" fill="hold">
-                      <p:stCondLst>
-                        <p:cond delay="indefinite"/>
-                      </p:stCondLst>
-                      <p:childTnLst>
-                        <p:par>
-                          <p:cTn id="39" fill="hold">
-                            <p:stCondLst>
-                              <p:cond delay="0"/>
-                            </p:stCondLst>
-                            <p:childTnLst>
-                              <p:par>
-                                <p:cTn id="40" presetID="2" presetClass="entr" presetSubtype="4" fill="hold" nodeType="clickEffect">
-                                  <p:stCondLst>
-                                    <p:cond delay="0"/>
-                                  </p:stCondLst>
-                                  <p:childTnLst>
-                                    <p:set>
-                                      <p:cBhvr>
-                                        <p:cTn id="41" dur="1" fill="hold">
-                                          <p:stCondLst>
-                                            <p:cond delay="0"/>
-                                          </p:stCondLst>
-                                        </p:cTn>
-                                        <p:tgtEl>
-                                          <p:spTgt spid="3">
-                                            <p:txEl>
-                                              <p:pRg st="11" end="11"/>
-                                            </p:txEl>
-                                          </p:spTgt>
-                                        </p:tgtEl>
-                                        <p:attrNameLst>
-                                          <p:attrName>style.visibility</p:attrName>
-                                        </p:attrNameLst>
-                                      </p:cBhvr>
-                                      <p:to>
-                                        <p:strVal val="visible"/>
-                                      </p:to>
-                                    </p:set>
-                                    <p:anim calcmode="lin" valueType="num">
-                                      <p:cBhvr additive="base">
-                                        <p:cTn id="42" dur="500" fill="hold"/>
-                                        <p:tgtEl>
-                                          <p:spTgt spid="3">
-                                            <p:txEl>
-                                              <p:pRg st="11" end="11"/>
-                                            </p:txEl>
-                                          </p:spTgt>
-                                        </p:tgtEl>
-                                        <p:attrNameLst>
-                                          <p:attrName>ppt_x</p:attrName>
-                                        </p:attrNameLst>
-                                      </p:cBhvr>
-                                      <p:tavLst>
-                                        <p:tav tm="0">
-                                          <p:val>
-                                            <p:strVal val="#ppt_x"/>
-                                          </p:val>
-                                        </p:tav>
-                                        <p:tav tm="100000">
-                                          <p:val>
-                                            <p:strVal val="#ppt_x"/>
-                                          </p:val>
-                                        </p:tav>
-                                      </p:tavLst>
-                                    </p:anim>
-                                    <p:anim calcmode="lin" valueType="num">
-                                      <p:cBhvr additive="base">
-                                        <p:cTn id="43" dur="500" fill="hold"/>
-                                        <p:tgtEl>
-                                          <p:spTgt spid="3">
-                                            <p:txEl>
-                                              <p:pRg st="11" end="11"/>
-                                            </p:txEl>
-                                          </p:spTgt>
-                                        </p:tgtEl>
-                                        <p:attrNameLst>
-                                          <p:attrName>ppt_y</p:attrName>
-                                        </p:attrNameLst>
-                                      </p:cBhvr>
-                                      <p:tavLst>
-                                        <p:tav tm="0">
-                                          <p:val>
-                                            <p:strVal val="1+#ppt_h/2"/>
-                                          </p:val>
-                                        </p:tav>
-                                        <p:tav tm="100000">
-                                          <p:val>
-                                            <p:strVal val="#ppt_y"/>
-                                          </p:val>
-                                        </p:tav>
-                                      </p:tavLst>
-                                    </p:anim>
-                                  </p:childTnLst>
-                                </p:cTn>
-                              </p:par>
-                            </p:childTnLst>
-                          </p:cTn>
-                        </p:par>
-                      </p:childTnLst>
-                    </p:cTn>
-                  </p:par>
-                  <p:par>
-                    <p:cTn id="44" fill="hold">
-                      <p:stCondLst>
-                        <p:cond delay="indefinite"/>
-                      </p:stCondLst>
-                      <p:childTnLst>
-                        <p:par>
-                          <p:cTn id="45" fill="hold">
-                            <p:stCondLst>
-                              <p:cond delay="0"/>
-                            </p:stCondLst>
-                            <p:childTnLst>
-                              <p:par>
-                                <p:cTn id="46" presetID="2" presetClass="entr" presetSubtype="4" fill="hold" nodeType="clickEffect">
-                                  <p:stCondLst>
-                                    <p:cond delay="0"/>
-                                  </p:stCondLst>
-                                  <p:childTnLst>
-                                    <p:set>
-                                      <p:cBhvr>
-                                        <p:cTn id="47" dur="1" fill="hold">
-                                          <p:stCondLst>
-                                            <p:cond delay="0"/>
-                                          </p:stCondLst>
-                                        </p:cTn>
-                                        <p:tgtEl>
-                                          <p:spTgt spid="3">
-                                            <p:txEl>
-                                              <p:pRg st="12" end="12"/>
-                                            </p:txEl>
-                                          </p:spTgt>
-                                        </p:tgtEl>
-                                        <p:attrNameLst>
-                                          <p:attrName>style.visibility</p:attrName>
-                                        </p:attrNameLst>
-                                      </p:cBhvr>
-                                      <p:to>
-                                        <p:strVal val="visible"/>
-                                      </p:to>
-                                    </p:set>
-                                    <p:anim calcmode="lin" valueType="num">
-                                      <p:cBhvr additive="base">
-                                        <p:cTn id="48" dur="500" fill="hold"/>
-                                        <p:tgtEl>
-                                          <p:spTgt spid="3">
-                                            <p:txEl>
-                                              <p:pRg st="12" end="12"/>
-                                            </p:txEl>
-                                          </p:spTgt>
-                                        </p:tgtEl>
-                                        <p:attrNameLst>
-                                          <p:attrName>ppt_x</p:attrName>
-                                        </p:attrNameLst>
-                                      </p:cBhvr>
-                                      <p:tavLst>
-                                        <p:tav tm="0">
-                                          <p:val>
-                                            <p:strVal val="#ppt_x"/>
-                                          </p:val>
-                                        </p:tav>
-                                        <p:tav tm="100000">
-                                          <p:val>
-                                            <p:strVal val="#ppt_x"/>
-                                          </p:val>
-                                        </p:tav>
-                                      </p:tavLst>
-                                    </p:anim>
-                                    <p:anim calcmode="lin" valueType="num">
-                                      <p:cBhvr additive="base">
-                                        <p:cTn id="49" dur="500" fill="hold"/>
-                                        <p:tgtEl>
-                                          <p:spTgt spid="3">
-                                            <p:txEl>
-                                              <p:pRg st="12" end="12"/>
-                                            </p:txEl>
-                                          </p:spTgt>
-                                        </p:tgtEl>
-                                        <p:attrNameLst>
-                                          <p:attrName>ppt_y</p:attrName>
-                                        </p:attrNameLst>
-                                      </p:cBhvr>
-                                      <p:tavLst>
-                                        <p:tav tm="0">
-                                          <p:val>
-                                            <p:strVal val="1+#ppt_h/2"/>
-                                          </p:val>
-                                        </p:tav>
-                                        <p:tav tm="100000">
-                                          <p:val>
-                                            <p:strVal val="#ppt_y"/>
-                                          </p:val>
-                                        </p:tav>
-                                      </p:tavLst>
-                                    </p:anim>
-                                  </p:childTnLst>
-                                </p:cTn>
-                              </p:par>
-                            </p:childTnLst>
-                          </p:cTn>
-                        </p:par>
-                        <p:par>
-                          <p:cTn id="50" fill="hold">
-                            <p:stCondLst>
-                              <p:cond delay="500"/>
-                            </p:stCondLst>
-                            <p:childTnLst>
-                              <p:par>
-                                <p:cTn id="51" presetID="10" presetClass="entr" presetSubtype="0" fill="hold" nodeType="afterEffect">
-                                  <p:stCondLst>
-                                    <p:cond delay="0"/>
-                                  </p:stCondLst>
-                                  <p:childTnLst>
-                                    <p:set>
-                                      <p:cBhvr>
-                                        <p:cTn id="52" dur="1" fill="hold">
-                                          <p:stCondLst>
-                                            <p:cond delay="0"/>
-                                          </p:stCondLst>
-                                        </p:cTn>
-                                        <p:tgtEl>
-                                          <p:spTgt spid="3">
-                                            <p:txEl>
-                                              <p:pRg st="13" end="13"/>
-                                            </p:txEl>
-                                          </p:spTgt>
-                                        </p:tgtEl>
-                                        <p:attrNameLst>
-                                          <p:attrName>style.visibility</p:attrName>
-                                        </p:attrNameLst>
-                                      </p:cBhvr>
-                                      <p:to>
-                                        <p:strVal val="visible"/>
-                                      </p:to>
-                                    </p:set>
-                                    <p:animEffect transition="in" filter="fade">
-                                      <p:cBhvr>
-                                        <p:cTn id="53" dur="500"/>
-                                        <p:tgtEl>
-                                          <p:spTgt spid="3">
-                                            <p:txEl>
-                                              <p:pRg st="13" end="13"/>
-                                            </p:txEl>
-                                          </p:spTgt>
-                                        </p:tgtEl>
-                                      </p:cBhvr>
-                                    </p:animEffect>
-                                  </p:childTnLst>
-                                </p:cTn>
-                              </p:par>
-                            </p:childTnLst>
-                          </p:cTn>
-                        </p:par>
-                      </p:childTnLst>
-                    </p:cTn>
-                  </p:par>
-                </p:childTnLst>
-              </p:cTn>
-              <p:prevCondLst>
-                <p:cond evt="onPrev" delay="0">
-                  <p:tgtEl>
-                    <p:sldTgt/>
-                  </p:tgtEl>
-                </p:cond>
-              </p:prevCondLst>
-              <p:nextCondLst>
-                <p:cond evt="onNext" delay="0">
-                  <p:tgtEl>
-                    <p:sldTgt/>
-                  </p:tgtEl>
-                </p:cond>
-              </p:nextCondLst>
-            </p:seq>
-          </p:childTnLst>
-        </p:cTn>
-      </p:par>
-    </p:tnLst>
-  </p:timing>
-</p:sld>
-</file>
-
-<file path=ppt/slides/slide21.xml><?xml version="1.0" encoding="utf-8"?>
-<p:sld xmlns:a="http://schemas.openxmlformats.org/drawingml/2006/main" xmlns:r="http://schemas.openxmlformats.org/officeDocument/2006/relationships" xmlns:p="http://schemas.openxmlformats.org/presentationml/2006/main">
-  <p:cSld>
-    <p:spTree>
-      <p:nvGrpSpPr>
-        <p:cNvPr id="1" name=""/>
-        <p:cNvGrpSpPr/>
-        <p:nvPr/>
-      </p:nvGrpSpPr>
-      <p:grpSpPr>
-        <a:xfrm>
-          <a:off x="0" y="0"/>
-          <a:ext cx="0" cy="0"/>
-          <a:chOff x="0" y="0"/>
-          <a:chExt cx="0" cy="0"/>
-        </a:xfrm>
-      </p:grpSpPr>
-      <p:sp>
-        <p:nvSpPr>
-          <p:cNvPr id="2" name="Title 1"/>
-          <p:cNvSpPr>
-            <a:spLocks noGrp="1"/>
-          </p:cNvSpPr>
-          <p:nvPr>
-            <p:ph type="title"/>
-          </p:nvPr>
-        </p:nvSpPr>
-        <p:spPr>
-          <a:xfrm>
-            <a:off x="685800" y="304800"/>
-            <a:ext cx="7772400" cy="762000"/>
-          </a:xfrm>
-        </p:spPr>
-        <p:txBody>
-          <a:bodyPr/>
-          <a:lstStyle/>
-          <a:p>
-            <a:r>
-              <a:rPr lang="en-US" dirty="0"/>
-              <a:t>What if Equality of the Variances </a:t>
-            </a:r>
-            <a:br>
-              <a:rPr lang="en-US" dirty="0"/>
-            </a:br>
-            <a:r>
-              <a:rPr lang="en-US" dirty="0">
-                <a:solidFill>
-                  <a:srgbClr val="C00000"/>
-                </a:solidFill>
-              </a:rPr>
-              <a:t>FAIL</a:t>
-            </a:r>
-            <a:r>
-              <a:rPr lang="en-US" dirty="0"/>
-              <a:t>?</a:t>
-            </a:r>
-          </a:p>
-        </p:txBody>
-      </p:sp>
-      <mc:AlternateContent xmlns:mc="http://schemas.openxmlformats.org/markup-compatibility/2006" xmlns:a14="http://schemas.microsoft.com/office/drawing/2010/main">
-        <mc:Choice Requires="a14">
-          <p:sp>
-            <p:nvSpPr>
-              <p:cNvPr id="3" name="Content Placeholder 2"/>
-              <p:cNvSpPr>
-                <a:spLocks noGrp="1"/>
-              </p:cNvSpPr>
-              <p:nvPr>
-                <p:ph idx="1"/>
-              </p:nvPr>
-            </p:nvSpPr>
-            <p:spPr>
-              <a:xfrm>
-                <a:off x="685800" y="1143000"/>
-                <a:ext cx="7772400" cy="4495800"/>
-              </a:xfrm>
-            </p:spPr>
-            <p:txBody>
-              <a:bodyPr/>
-              <a:lstStyle/>
-              <a:p>
-                <a:r>
-                  <a:rPr lang="en-US" sz="2400" dirty="0"/>
-                  <a:t>The assumption that the sample are generated from normal distribution is not very important as long as the total sample size is </a:t>
-                </a:r>
-                <a:r>
-                  <a:rPr lang="en-US" sz="2400" dirty="0">
-                    <a:solidFill>
-                      <a:srgbClr val="C00000"/>
-                    </a:solidFill>
-                  </a:rPr>
-                  <a:t>large</a:t>
-                </a:r>
-                <a:r>
-                  <a:rPr lang="en-US" sz="2400" dirty="0"/>
-                  <a:t>. </a:t>
-                </a:r>
-              </a:p>
-              <a:p>
-                <a:endParaRPr lang="en-US" sz="2400" dirty="0"/>
-              </a:p>
-              <a:p>
-                <a:r>
-                  <a:rPr lang="en-US" sz="2400" dirty="0"/>
-                  <a:t>Note that conceptually the test statistic </a:t>
-                </a:r>
-                <a14:m>
-                  <m:oMath xmlns:m="http://schemas.openxmlformats.org/officeDocument/2006/math">
-                    <m:r>
-                      <a:rPr lang="en-US" sz="2400" i="1">
-                        <a:latin typeface="Cambria Math"/>
-                      </a:rPr>
-                      <m:t>𝐹</m:t>
-                    </m:r>
-                    <m:r>
-                      <a:rPr lang="en-US" sz="2400" i="1">
-                        <a:latin typeface="Cambria Math"/>
-                      </a:rPr>
-                      <m:t>=</m:t>
-                    </m:r>
-                    <m:f>
-                      <m:fPr>
-                        <m:ctrlPr>
-                          <a:rPr lang="en-US" sz="2400" i="1">
-                            <a:latin typeface="Cambria Math" panose="02040503050406030204" pitchFamily="18" charset="0"/>
-                          </a:rPr>
-                        </m:ctrlPr>
-                      </m:fPr>
-                      <m:num>
-                        <m:r>
-                          <a:rPr lang="en-US" sz="2400" i="1">
-                            <a:latin typeface="Cambria Math"/>
-                          </a:rPr>
-                          <m:t>𝑆𝑆</m:t>
-                        </m:r>
-                        <m:r>
-                          <a:rPr lang="en-US" sz="2400" i="1" baseline="-25000">
-                            <a:latin typeface="Cambria Math"/>
-                          </a:rPr>
-                          <m:t>𝐵</m:t>
-                        </m:r>
-                        <m:r>
-                          <a:rPr lang="en-US" sz="2400" i="1">
-                            <a:latin typeface="Cambria Math"/>
-                          </a:rPr>
-                          <m:t>/</m:t>
-                        </m:r>
-                        <m:r>
-                          <a:rPr lang="en-US" sz="2400" i="1">
-                            <a:latin typeface="Cambria Math"/>
-                          </a:rPr>
-                          <m:t>𝑑</m:t>
-                        </m:r>
-                        <m:sSub>
-                          <m:sSubPr>
-                            <m:ctrlPr>
-                              <a:rPr lang="en-US" sz="2400" i="1">
-                                <a:latin typeface="Cambria Math" panose="02040503050406030204" pitchFamily="18" charset="0"/>
-                              </a:rPr>
-                            </m:ctrlPr>
-                          </m:sSubPr>
-                          <m:e>
-                            <m:r>
-                              <a:rPr lang="en-US" sz="2400" i="1">
-                                <a:latin typeface="Cambria Math"/>
-                              </a:rPr>
-                              <m:t>𝑓</m:t>
-                            </m:r>
-                          </m:e>
-                          <m:sub>
-                            <m:r>
-                              <a:rPr lang="en-US" sz="2400" b="0" i="1" smtClean="0">
-                                <a:latin typeface="Cambria Math" panose="02040503050406030204" pitchFamily="18" charset="0"/>
-                              </a:rPr>
-                              <m:t>𝐵</m:t>
-                            </m:r>
-                          </m:sub>
-                        </m:sSub>
-                      </m:num>
-                      <m:den>
-                        <m:r>
-                          <a:rPr lang="en-US" sz="2400" i="1">
-                            <a:latin typeface="Cambria Math"/>
-                          </a:rPr>
-                          <m:t>𝑆𝑆</m:t>
-                        </m:r>
-                        <m:r>
-                          <a:rPr lang="en-US" sz="2400" i="1" baseline="-25000">
-                            <a:latin typeface="Cambria Math"/>
-                          </a:rPr>
-                          <m:t>𝐸</m:t>
-                        </m:r>
-                        <m:r>
-                          <a:rPr lang="en-US" sz="2400" i="1">
-                            <a:latin typeface="Cambria Math"/>
-                          </a:rPr>
-                          <m:t>/</m:t>
-                        </m:r>
-                        <m:r>
-                          <a:rPr lang="en-US" sz="2400" i="1">
-                            <a:latin typeface="Cambria Math"/>
-                          </a:rPr>
-                          <m:t>𝑑</m:t>
-                        </m:r>
-                        <m:sSub>
-                          <m:sSubPr>
-                            <m:ctrlPr>
-                              <a:rPr lang="en-US" sz="2400" i="1">
-                                <a:latin typeface="Cambria Math" panose="02040503050406030204" pitchFamily="18" charset="0"/>
-                              </a:rPr>
-                            </m:ctrlPr>
-                          </m:sSubPr>
-                          <m:e>
-                            <m:r>
-                              <a:rPr lang="en-US" sz="2400" i="1">
-                                <a:latin typeface="Cambria Math"/>
-                              </a:rPr>
-                              <m:t>𝑓</m:t>
-                            </m:r>
-                          </m:e>
-                          <m:sub>
-                            <m:r>
-                              <a:rPr lang="en-US" sz="2400" b="0" i="1" smtClean="0">
-                                <a:latin typeface="Cambria Math" panose="02040503050406030204" pitchFamily="18" charset="0"/>
-                              </a:rPr>
-                              <m:t>𝐸</m:t>
-                            </m:r>
-                          </m:sub>
-                        </m:sSub>
-                      </m:den>
-                    </m:f>
-                  </m:oMath>
-                </a14:m>
-                <a:r>
-                  <a:rPr lang="en-US" sz="2400" dirty="0"/>
-                  <a:t> </a:t>
-                </a:r>
-                <a:br>
-                  <a:rPr lang="en-US" sz="2400" dirty="0"/>
-                </a:br>
-                <a:r>
-                  <a:rPr lang="en-US" sz="2400" dirty="0"/>
-                  <a:t>still makes sense.  </a:t>
-                </a:r>
-              </a:p>
-              <a:p>
-                <a:endParaRPr lang="en-US" sz="2400" dirty="0"/>
-              </a:p>
-              <a:p>
-                <a:r>
-                  <a:rPr lang="en-US" sz="2400" dirty="0"/>
-                  <a:t>The major problem is with the assumption </a:t>
-                </a:r>
-                <a14:m>
-                  <m:oMath xmlns:m="http://schemas.openxmlformats.org/officeDocument/2006/math">
-                    <m:sSub>
-                      <m:sSubPr>
-                        <m:ctrlPr>
-                          <a:rPr lang="en-US" sz="2400" i="1">
-                            <a:latin typeface="Cambria Math" panose="02040503050406030204" pitchFamily="18" charset="0"/>
-                          </a:rPr>
-                        </m:ctrlPr>
-                      </m:sSubPr>
-                      <m:e>
-                        <m:r>
-                          <a:rPr lang="en-US" sz="2400" i="1">
-                            <a:latin typeface="Cambria Math"/>
-                          </a:rPr>
-                          <m:t>𝜎</m:t>
-                        </m:r>
-                      </m:e>
-                      <m:sub>
-                        <m:r>
-                          <a:rPr lang="en-US" sz="2400" i="1">
-                            <a:latin typeface="Cambria Math"/>
-                          </a:rPr>
-                          <m:t>1</m:t>
-                        </m:r>
-                      </m:sub>
-                    </m:sSub>
-                    <m:r>
-                      <a:rPr lang="en-US" sz="2400" i="1">
-                        <a:latin typeface="Cambria Math"/>
-                      </a:rPr>
-                      <m:t>=</m:t>
-                    </m:r>
-                    <m:sSub>
-                      <m:sSubPr>
-                        <m:ctrlPr>
-                          <a:rPr lang="en-US" sz="2400" i="1">
-                            <a:latin typeface="Cambria Math" panose="02040503050406030204" pitchFamily="18" charset="0"/>
-                          </a:rPr>
-                        </m:ctrlPr>
-                      </m:sSubPr>
-                      <m:e>
-                        <m:r>
-                          <a:rPr lang="en-US" sz="2400" i="1">
-                            <a:latin typeface="Cambria Math"/>
-                          </a:rPr>
-                          <m:t>𝜎</m:t>
-                        </m:r>
-                      </m:e>
-                      <m:sub>
-                        <m:r>
-                          <a:rPr lang="en-US" sz="2400" i="1">
-                            <a:latin typeface="Cambria Math"/>
-                          </a:rPr>
-                          <m:t>2</m:t>
-                        </m:r>
-                      </m:sub>
-                    </m:sSub>
-                    <m:r>
-                      <a:rPr lang="en-US" sz="2400" i="1">
-                        <a:latin typeface="Cambria Math"/>
-                      </a:rPr>
-                      <m:t>=…=</m:t>
-                    </m:r>
-                    <m:sSub>
-                      <m:sSubPr>
-                        <m:ctrlPr>
-                          <a:rPr lang="en-US" sz="2400" i="1">
-                            <a:latin typeface="Cambria Math" panose="02040503050406030204" pitchFamily="18" charset="0"/>
-                          </a:rPr>
-                        </m:ctrlPr>
-                      </m:sSubPr>
-                      <m:e>
-                        <m:r>
-                          <a:rPr lang="en-US" sz="2400" i="1">
-                            <a:latin typeface="Cambria Math"/>
-                          </a:rPr>
-                          <m:t>𝜎</m:t>
-                        </m:r>
-                      </m:e>
-                      <m:sub>
-                        <m:r>
-                          <a:rPr lang="en-US" sz="2400" i="1">
-                            <a:latin typeface="Cambria Math"/>
-                          </a:rPr>
-                          <m:t>𝑡</m:t>
-                        </m:r>
-                      </m:sub>
-                    </m:sSub>
-                  </m:oMath>
-                </a14:m>
-                <a:r>
-                  <a:rPr lang="en-US" sz="2400" dirty="0"/>
-                  <a:t>.  If this cannot be assumed, F- test </a:t>
-                </a:r>
-                <a:r>
-                  <a:rPr lang="en-US" sz="2400" dirty="0">
-                    <a:solidFill>
-                      <a:srgbClr val="C00000"/>
-                    </a:solidFill>
-                  </a:rPr>
-                  <a:t>must not be used</a:t>
-                </a:r>
-                <a:r>
-                  <a:rPr lang="en-US" sz="2400" dirty="0"/>
-                  <a:t>.</a:t>
-                </a:r>
-              </a:p>
-              <a:p>
-                <a:endParaRPr lang="en-US" sz="2400" dirty="0"/>
-              </a:p>
-              <a:p>
-                <a:r>
-                  <a:rPr lang="en-US" sz="2400" dirty="0"/>
-                  <a:t>If </a:t>
-                </a:r>
-                <a14:m>
-                  <m:oMath xmlns:m="http://schemas.openxmlformats.org/officeDocument/2006/math">
-                    <m:sSub>
-                      <m:sSubPr>
-                        <m:ctrlPr>
-                          <a:rPr lang="en-US" sz="2400" i="1">
-                            <a:latin typeface="Cambria Math" panose="02040503050406030204" pitchFamily="18" charset="0"/>
-                          </a:rPr>
-                        </m:ctrlPr>
-                      </m:sSubPr>
-                      <m:e>
-                        <m:r>
-                          <a:rPr lang="en-US" sz="2400" i="1">
-                            <a:latin typeface="Cambria Math"/>
-                          </a:rPr>
-                          <m:t>𝐻</m:t>
-                        </m:r>
-                      </m:e>
-                      <m:sub>
-                        <m:r>
-                          <a:rPr lang="en-US" sz="2400" i="1">
-                            <a:latin typeface="Cambria Math"/>
-                          </a:rPr>
-                          <m:t>0</m:t>
-                        </m:r>
-                      </m:sub>
-                    </m:sSub>
-                    <m:r>
-                      <a:rPr lang="en-US" sz="2400" i="1">
-                        <a:latin typeface="Cambria Math"/>
-                      </a:rPr>
-                      <m:t>: </m:t>
-                    </m:r>
-                    <m:sSub>
-                      <m:sSubPr>
-                        <m:ctrlPr>
-                          <a:rPr lang="en-US" sz="2400" i="1">
-                            <a:latin typeface="Cambria Math" panose="02040503050406030204" pitchFamily="18" charset="0"/>
-                          </a:rPr>
-                        </m:ctrlPr>
-                      </m:sSubPr>
-                      <m:e>
-                        <m:r>
-                          <a:rPr lang="en-US" sz="2400" i="1">
-                            <a:latin typeface="Cambria Math"/>
-                          </a:rPr>
-                          <m:t>𝜎</m:t>
-                        </m:r>
-                      </m:e>
-                      <m:sub>
-                        <m:r>
-                          <a:rPr lang="en-US" sz="2400" i="1">
-                            <a:latin typeface="Cambria Math"/>
-                          </a:rPr>
-                          <m:t>1</m:t>
-                        </m:r>
-                      </m:sub>
-                    </m:sSub>
-                    <m:r>
-                      <a:rPr lang="en-US" sz="2400" i="1">
-                        <a:latin typeface="Cambria Math"/>
-                      </a:rPr>
-                      <m:t>=</m:t>
-                    </m:r>
-                    <m:sSub>
-                      <m:sSubPr>
-                        <m:ctrlPr>
-                          <a:rPr lang="en-US" sz="2400" i="1">
-                            <a:latin typeface="Cambria Math" panose="02040503050406030204" pitchFamily="18" charset="0"/>
-                          </a:rPr>
-                        </m:ctrlPr>
-                      </m:sSubPr>
-                      <m:e>
-                        <m:r>
-                          <a:rPr lang="en-US" sz="2400" i="1">
-                            <a:latin typeface="Cambria Math"/>
-                          </a:rPr>
-                          <m:t>𝜎</m:t>
-                        </m:r>
-                      </m:e>
-                      <m:sub>
-                        <m:r>
-                          <a:rPr lang="en-US" sz="2400" i="1">
-                            <a:latin typeface="Cambria Math"/>
-                          </a:rPr>
-                          <m:t>2</m:t>
-                        </m:r>
-                      </m:sub>
-                    </m:sSub>
-                    <m:r>
-                      <a:rPr lang="en-US" sz="2400" i="1">
-                        <a:latin typeface="Cambria Math"/>
-                      </a:rPr>
-                      <m:t>=…=</m:t>
-                    </m:r>
-                    <m:sSub>
-                      <m:sSubPr>
-                        <m:ctrlPr>
-                          <a:rPr lang="en-US" sz="2400" i="1">
-                            <a:latin typeface="Cambria Math" panose="02040503050406030204" pitchFamily="18" charset="0"/>
-                          </a:rPr>
-                        </m:ctrlPr>
-                      </m:sSubPr>
-                      <m:e>
-                        <m:r>
-                          <a:rPr lang="en-US" sz="2400" i="1">
-                            <a:latin typeface="Cambria Math"/>
-                          </a:rPr>
-                          <m:t>𝜎</m:t>
-                        </m:r>
-                      </m:e>
-                      <m:sub>
-                        <m:r>
-                          <a:rPr lang="en-US" sz="2400" i="1">
-                            <a:latin typeface="Cambria Math"/>
-                          </a:rPr>
-                          <m:t>𝑡</m:t>
-                        </m:r>
-                      </m:sub>
-                    </m:sSub>
-                  </m:oMath>
-                </a14:m>
-                <a:r>
-                  <a:rPr lang="en-US" sz="2400" dirty="0"/>
-                  <a:t> is </a:t>
-                </a:r>
-                <a:r>
-                  <a:rPr lang="en-US" sz="2400" dirty="0">
-                    <a:solidFill>
-                      <a:srgbClr val="C00000"/>
-                    </a:solidFill>
-                  </a:rPr>
-                  <a:t>rejected</a:t>
-                </a:r>
-                <a:r>
-                  <a:rPr lang="en-US" sz="2400" dirty="0"/>
-                  <a:t>, then one approach is to </a:t>
-                </a:r>
-                <a:r>
-                  <a:rPr lang="en-US" sz="2400" dirty="0">
-                    <a:solidFill>
-                      <a:srgbClr val="C00000"/>
-                    </a:solidFill>
-                  </a:rPr>
-                  <a:t>transform</a:t>
-                </a:r>
-                <a:r>
-                  <a:rPr lang="en-US" sz="2400" dirty="0"/>
-                  <a:t> the data if the variances </a:t>
-                </a:r>
-                <a14:m>
-                  <m:oMath xmlns:m="http://schemas.openxmlformats.org/officeDocument/2006/math">
-                    <m:sSup>
-                      <m:sSupPr>
-                        <m:ctrlPr>
-                          <a:rPr lang="en-US" sz="2400" i="1">
-                            <a:latin typeface="Cambria Math" panose="02040503050406030204" pitchFamily="18" charset="0"/>
-                          </a:rPr>
-                        </m:ctrlPr>
-                      </m:sSupPr>
-                      <m:e>
-                        <m:r>
-                          <a:rPr lang="en-US" sz="2400" i="1">
-                            <a:latin typeface="Cambria Math"/>
-                          </a:rPr>
-                          <m:t>𝜎</m:t>
-                        </m:r>
-                      </m:e>
-                      <m:sup>
-                        <m:r>
-                          <a:rPr lang="en-US" sz="2400" i="1">
-                            <a:latin typeface="Cambria Math"/>
-                          </a:rPr>
-                          <m:t>2</m:t>
-                        </m:r>
-                      </m:sup>
-                    </m:sSup>
-                  </m:oMath>
-                </a14:m>
-                <a:r>
-                  <a:rPr lang="en-US" sz="2400" dirty="0"/>
-                  <a:t> is a function of the mean </a:t>
-                </a:r>
-                <a14:m>
-                  <m:oMath xmlns:m="http://schemas.openxmlformats.org/officeDocument/2006/math">
-                    <m:r>
-                      <a:rPr lang="en-US" sz="2400" i="1">
-                        <a:latin typeface="Cambria Math"/>
-                      </a:rPr>
-                      <m:t>𝜇</m:t>
-                    </m:r>
-                  </m:oMath>
-                </a14:m>
-                <a:r>
-                  <a:rPr lang="en-US" sz="2400" dirty="0"/>
-                  <a:t>.</a:t>
-                </a:r>
-              </a:p>
-            </p:txBody>
-          </p:sp>
-        </mc:Choice>
-        <mc:Fallback xmlns="">
-          <p:sp>
-            <p:nvSpPr>
-              <p:cNvPr id="3" name="Content Placeholder 2"/>
-              <p:cNvSpPr>
-                <a:spLocks noGrp="1" noRot="1" noChangeAspect="1" noMove="1" noResize="1" noEditPoints="1" noAdjustHandles="1" noChangeArrowheads="1" noChangeShapeType="1" noTextEdit="1"/>
-              </p:cNvSpPr>
-              <p:nvPr>
-                <p:ph idx="1"/>
-              </p:nvPr>
-            </p:nvSpPr>
-            <p:spPr>
-              <a:xfrm>
-                <a:off x="685800" y="1143000"/>
-                <a:ext cx="7772400" cy="4495800"/>
-              </a:xfrm>
-              <a:blipFill rotWithShape="0">
-                <a:blip r:embed="rId2"/>
-                <a:stretch>
-                  <a:fillRect l="-1098" t="-950" r="-2353" b="-26323"/>
-                </a:stretch>
-              </a:blipFill>
-            </p:spPr>
-            <p:txBody>
-              <a:bodyPr/>
-              <a:lstStyle/>
-              <a:p>
-                <a:r>
-                  <a:rPr lang="en-US">
-                    <a:noFill/>
-                  </a:rPr>
-                  <a:t> </a:t>
-                </a:r>
-              </a:p>
-            </p:txBody>
-          </p:sp>
-        </mc:Fallback>
-      </mc:AlternateContent>
-      <p:sp>
-        <p:nvSpPr>
-          <p:cNvPr id="4" name="Slide Number Placeholder 3"/>
-          <p:cNvSpPr>
-            <a:spLocks noGrp="1"/>
-          </p:cNvSpPr>
-          <p:nvPr>
-            <p:ph type="sldNum" sz="quarter" idx="4"/>
-          </p:nvPr>
-        </p:nvSpPr>
-        <p:spPr/>
-        <p:txBody>
-          <a:bodyPr/>
-          <a:lstStyle/>
-          <a:p>
-            <a:fld id="{A9A949EE-02F8-4E24-B346-EA33FC0EA551}" type="slidenum">
-              <a:rPr lang="en-US" smtClean="0"/>
-              <a:t>21</a:t>
-            </a:fld>
-            <a:endParaRPr lang="en-US"/>
-          </a:p>
-        </p:txBody>
-      </p:sp>
-    </p:spTree>
-    <p:extLst>
-      <p:ext uri="{BB962C8B-B14F-4D97-AF65-F5344CB8AC3E}">
-        <p14:creationId xmlns:p14="http://schemas.microsoft.com/office/powerpoint/2010/main" val="2087254820"/>
-      </p:ext>
-    </p:extLst>
-  </p:cSld>
-  <p:clrMapOvr>
-    <a:masterClrMapping/>
-  </p:clrMapOvr>
-  <p:transition advClick="0"/>
-  <p:timing>
-    <p:tnLst>
-      <p:par>
-        <p:cTn id="1" dur="indefinite" restart="never" nodeType="tmRoot">
-          <p:childTnLst>
-            <p:seq concurrent="1" nextAc="seek">
-              <p:cTn id="2" dur="indefinite" nodeType="mainSeq">
-                <p:childTnLst>
-                  <p:par>
-                    <p:cTn id="3" fill="hold">
-                      <p:stCondLst>
-                        <p:cond delay="indefinite"/>
-                      </p:stCondLst>
-                      <p:childTnLst>
-                        <p:par>
-                          <p:cTn id="4" fill="hold">
-                            <p:stCondLst>
-                              <p:cond delay="0"/>
-                            </p:stCondLst>
-                            <p:childTnLst>
-                              <p:par>
-                                <p:cTn id="5" presetID="2" presetClass="entr" presetSubtype="4" fill="hold" nodeType="clickEffect">
-                                  <p:stCondLst>
-                                    <p:cond delay="0"/>
-                                  </p:stCondLst>
-                                  <p:childTnLst>
-                                    <p:set>
-                                      <p:cBhvr>
-                                        <p:cTn id="6" dur="1" fill="hold">
-                                          <p:stCondLst>
-                                            <p:cond delay="0"/>
-                                          </p:stCondLst>
-                                        </p:cTn>
-                                        <p:tgtEl>
-                                          <p:spTgt spid="3">
-                                            <p:txEl>
-                                              <p:pRg st="2" end="2"/>
-                                            </p:txEl>
-                                          </p:spTgt>
-                                        </p:tgtEl>
-                                        <p:attrNameLst>
-                                          <p:attrName>style.visibility</p:attrName>
-                                        </p:attrNameLst>
-                                      </p:cBhvr>
-                                      <p:to>
-                                        <p:strVal val="visible"/>
-                                      </p:to>
-                                    </p:set>
-                                    <p:anim calcmode="lin" valueType="num">
-                                      <p:cBhvr additive="base">
-                                        <p:cTn id="7" dur="500" fill="hold"/>
-                                        <p:tgtEl>
-                                          <p:spTgt spid="3">
-                                            <p:txEl>
-                                              <p:pRg st="2" end="2"/>
-                                            </p:txEl>
-                                          </p:spTgt>
-                                        </p:tgtEl>
-                                        <p:attrNameLst>
-                                          <p:attrName>ppt_x</p:attrName>
-                                        </p:attrNameLst>
-                                      </p:cBhvr>
-                                      <p:tavLst>
-                                        <p:tav tm="0">
-                                          <p:val>
-                                            <p:strVal val="#ppt_x"/>
-                                          </p:val>
-                                        </p:tav>
-                                        <p:tav tm="100000">
-                                          <p:val>
-                                            <p:strVal val="#ppt_x"/>
-                                          </p:val>
-                                        </p:tav>
-                                      </p:tavLst>
-                                    </p:anim>
-                                    <p:anim calcmode="lin" valueType="num">
-                                      <p:cBhvr additive="base">
-                                        <p:cTn id="8" dur="500" fill="hold"/>
-                                        <p:tgtEl>
-                                          <p:spTgt spid="3">
-                                            <p:txEl>
-                                              <p:pRg st="2" end="2"/>
-                                            </p:txEl>
-                                          </p:spTgt>
-                                        </p:tgtEl>
-                                        <p:attrNameLst>
-                                          <p:attrName>ppt_y</p:attrName>
-                                        </p:attrNameLst>
-                                      </p:cBhvr>
-                                      <p:tavLst>
-                                        <p:tav tm="0">
-                                          <p:val>
-                                            <p:strVal val="1+#ppt_h/2"/>
-                                          </p:val>
-                                        </p:tav>
-                                        <p:tav tm="100000">
-                                          <p:val>
-                                            <p:strVal val="#ppt_y"/>
-                                          </p:val>
-                                        </p:tav>
-                                      </p:tavLst>
-                                    </p:anim>
-                                  </p:childTnLst>
-                                </p:cTn>
-                              </p:par>
-                            </p:childTnLst>
-                          </p:cTn>
-                        </p:par>
-                      </p:childTnLst>
-                    </p:cTn>
-                  </p:par>
-                  <p:par>
-                    <p:cTn id="9" fill="hold">
-                      <p:stCondLst>
-                        <p:cond delay="indefinite"/>
-                      </p:stCondLst>
-                      <p:childTnLst>
-                        <p:par>
-                          <p:cTn id="10" fill="hold">
-                            <p:stCondLst>
-                              <p:cond delay="0"/>
-                            </p:stCondLst>
-                            <p:childTnLst>
-                              <p:par>
-                                <p:cTn id="11" presetID="2" presetClass="entr" presetSubtype="4" fill="hold" nodeType="clickEffect">
-                                  <p:stCondLst>
-                                    <p:cond delay="0"/>
-                                  </p:stCondLst>
-                                  <p:childTnLst>
-                                    <p:set>
-                                      <p:cBhvr>
-                                        <p:cTn id="12" dur="1" fill="hold">
-                                          <p:stCondLst>
-                                            <p:cond delay="0"/>
-                                          </p:stCondLst>
-                                        </p:cTn>
-                                        <p:tgtEl>
-                                          <p:spTgt spid="3">
-                                            <p:txEl>
-                                              <p:pRg st="4" end="4"/>
-                                            </p:txEl>
-                                          </p:spTgt>
-                                        </p:tgtEl>
-                                        <p:attrNameLst>
-                                          <p:attrName>style.visibility</p:attrName>
-                                        </p:attrNameLst>
-                                      </p:cBhvr>
-                                      <p:to>
-                                        <p:strVal val="visible"/>
-                                      </p:to>
-                                    </p:set>
-                                    <p:anim calcmode="lin" valueType="num">
-                                      <p:cBhvr additive="base">
-                                        <p:cTn id="13" dur="500" fill="hold"/>
-                                        <p:tgtEl>
-                                          <p:spTgt spid="3">
-                                            <p:txEl>
-                                              <p:pRg st="4" end="4"/>
-                                            </p:txEl>
-                                          </p:spTgt>
-                                        </p:tgtEl>
-                                        <p:attrNameLst>
-                                          <p:attrName>ppt_x</p:attrName>
-                                        </p:attrNameLst>
-                                      </p:cBhvr>
-                                      <p:tavLst>
-                                        <p:tav tm="0">
-                                          <p:val>
-                                            <p:strVal val="#ppt_x"/>
-                                          </p:val>
-                                        </p:tav>
-                                        <p:tav tm="100000">
-                                          <p:val>
-                                            <p:strVal val="#ppt_x"/>
-                                          </p:val>
-                                        </p:tav>
-                                      </p:tavLst>
-                                    </p:anim>
-                                    <p:anim calcmode="lin" valueType="num">
-                                      <p:cBhvr additive="base">
-                                        <p:cTn id="14" dur="500" fill="hold"/>
-                                        <p:tgtEl>
-                                          <p:spTgt spid="3">
-                                            <p:txEl>
-                                              <p:pRg st="4" end="4"/>
-                                            </p:txEl>
-                                          </p:spTgt>
-                                        </p:tgtEl>
-                                        <p:attrNameLst>
-                                          <p:attrName>ppt_y</p:attrName>
-                                        </p:attrNameLst>
-                                      </p:cBhvr>
-                                      <p:tavLst>
-                                        <p:tav tm="0">
-                                          <p:val>
-                                            <p:strVal val="1+#ppt_h/2"/>
-                                          </p:val>
-                                        </p:tav>
-                                        <p:tav tm="100000">
-                                          <p:val>
-                                            <p:strVal val="#ppt_y"/>
-                                          </p:val>
-                                        </p:tav>
-                                      </p:tavLst>
-                                    </p:anim>
-                                  </p:childTnLst>
-                                </p:cTn>
-                              </p:par>
-                            </p:childTnLst>
-                          </p:cTn>
-                        </p:par>
-                      </p:childTnLst>
-                    </p:cTn>
-                  </p:par>
-                  <p:par>
-                    <p:cTn id="15" fill="hold">
-                      <p:stCondLst>
-                        <p:cond delay="indefinite"/>
-                      </p:stCondLst>
-                      <p:childTnLst>
-                        <p:par>
-                          <p:cTn id="16" fill="hold">
-                            <p:stCondLst>
-                              <p:cond delay="0"/>
-                            </p:stCondLst>
-                            <p:childTnLst>
-                              <p:par>
-                                <p:cTn id="17" presetID="2" presetClass="entr" presetSubtype="4" fill="hold" nodeType="clickEffect">
-                                  <p:stCondLst>
-                                    <p:cond delay="0"/>
-                                  </p:stCondLst>
-                                  <p:childTnLst>
-                                    <p:set>
-                                      <p:cBhvr>
-                                        <p:cTn id="18" dur="1" fill="hold">
-                                          <p:stCondLst>
-                                            <p:cond delay="0"/>
-                                          </p:stCondLst>
-                                        </p:cTn>
-                                        <p:tgtEl>
-                                          <p:spTgt spid="3">
-                                            <p:txEl>
-                                              <p:pRg st="6" end="6"/>
-                                            </p:txEl>
-                                          </p:spTgt>
-                                        </p:tgtEl>
-                                        <p:attrNameLst>
-                                          <p:attrName>style.visibility</p:attrName>
-                                        </p:attrNameLst>
-                                      </p:cBhvr>
-                                      <p:to>
-                                        <p:strVal val="visible"/>
-                                      </p:to>
-                                    </p:set>
-                                    <p:anim calcmode="lin" valueType="num">
-                                      <p:cBhvr additive="base">
-                                        <p:cTn id="19" dur="500" fill="hold"/>
-                                        <p:tgtEl>
-                                          <p:spTgt spid="3">
-                                            <p:txEl>
-                                              <p:pRg st="6" end="6"/>
-                                            </p:txEl>
-                                          </p:spTgt>
-                                        </p:tgtEl>
-                                        <p:attrNameLst>
-                                          <p:attrName>ppt_x</p:attrName>
-                                        </p:attrNameLst>
-                                      </p:cBhvr>
-                                      <p:tavLst>
-                                        <p:tav tm="0">
-                                          <p:val>
-                                            <p:strVal val="#ppt_x"/>
-                                          </p:val>
-                                        </p:tav>
-                                        <p:tav tm="100000">
-                                          <p:val>
-                                            <p:strVal val="#ppt_x"/>
-                                          </p:val>
-                                        </p:tav>
-                                      </p:tavLst>
-                                    </p:anim>
-                                    <p:anim calcmode="lin" valueType="num">
-                                      <p:cBhvr additive="base">
-                                        <p:cTn id="20" dur="500" fill="hold"/>
-                                        <p:tgtEl>
-                                          <p:spTgt spid="3">
-                                            <p:txEl>
-                                              <p:pRg st="6" end="6"/>
-                                            </p:txEl>
-                                          </p:spTgt>
-                                        </p:tgtEl>
-                                        <p:attrNameLst>
-                                          <p:attrName>ppt_y</p:attrName>
-                                        </p:attrNameLst>
-                                      </p:cBhvr>
-                                      <p:tavLst>
-                                        <p:tav tm="0">
-                                          <p:val>
-                                            <p:strVal val="1+#ppt_h/2"/>
-                                          </p:val>
-                                        </p:tav>
-                                        <p:tav tm="100000">
-                                          <p:val>
-                                            <p:strVal val="#ppt_y"/>
-                                          </p:val>
-                                        </p:tav>
-                                      </p:tavLst>
-                                    </p:anim>
-                                  </p:childTnLst>
-                                </p:cTn>
-                              </p:par>
-                            </p:childTnLst>
-                          </p:cTn>
-                        </p:par>
-                      </p:childTnLst>
-                    </p:cTn>
-                  </p:par>
-                </p:childTnLst>
-              </p:cTn>
-              <p:prevCondLst>
-                <p:cond evt="onPrev" delay="0">
-                  <p:tgtEl>
-                    <p:sldTgt/>
-                  </p:tgtEl>
-                </p:cond>
-              </p:prevCondLst>
-              <p:nextCondLst>
-                <p:cond evt="onNext" delay="0">
-                  <p:tgtEl>
-                    <p:sldTgt/>
-                  </p:tgtEl>
-                </p:cond>
-              </p:nextCondLst>
-            </p:seq>
-          </p:childTnLst>
-        </p:cTn>
-      </p:par>
-    </p:tnLst>
-  </p:timing>
-</p:sld>
-</file>
-
 <file path=ppt/slides/slide3.xml><?xml version="1.0" encoding="utf-8"?>
 <p:sld xmlns:a="http://schemas.openxmlformats.org/drawingml/2006/main" xmlns:r="http://schemas.openxmlformats.org/officeDocument/2006/relationships" xmlns:p="http://schemas.openxmlformats.org/presentationml/2006/main">
   <p:cSld>
@@ -34518,7 +32057,7 @@
           <a:p>
             <a:r>
               <a:rPr lang="en-US" dirty="0"/>
-              <a:t>Test Statistics</a:t>
+              <a:t>Test Statistic</a:t>
             </a:r>
           </a:p>
         </p:txBody>

</xml_diff>